<commit_message>
Added more slides to presentation
</commit_message>
<xml_diff>
--- a/simdjs-presentation.pptx
+++ b/simdjs-presentation.pptx
@@ -7,6 +7,12 @@
   <p:sldIdLst>
     <p:sldId id="256" r:id="rId2"/>
     <p:sldId id="257" r:id="rId3"/>
+    <p:sldId id="258" r:id="rId4"/>
+    <p:sldId id="259" r:id="rId5"/>
+    <p:sldId id="260" r:id="rId6"/>
+    <p:sldId id="261" r:id="rId7"/>
+    <p:sldId id="262" r:id="rId8"/>
+    <p:sldId id="263" r:id="rId9"/>
   </p:sldIdLst>
   <p:sldSz cx="12192000" cy="6858000"/>
   <p:notesSz cx="6858000" cy="9144000"/>
@@ -105,6 +111,11 @@
       </a:defRPr>
     </a:lvl9pPr>
   </p:defaultTextStyle>
+  <p:extLst>
+    <p:ext uri="{EFAFB233-063F-42B5-8137-9DF3F51BA10A}">
+      <p15:sldGuideLst xmlns:p15="http://schemas.microsoft.com/office/powerpoint/2012/main"/>
+    </p:ext>
+  </p:extLst>
 </p:presentation>
 </file>
 
@@ -341,7 +352,7 @@
           <a:noFill/>
           <a:extLst>
             <a:ext uri="{909E8E84-426E-40dd-AFC4-6F175D3DCCD1}">
-              <a14:hiddenFill xmlns:a14="http://schemas.microsoft.com/office/drawing/2010/main" xmlns="">
+              <a14:hiddenFill xmlns="" xmlns:a14="http://schemas.microsoft.com/office/drawing/2010/main">
                 <a:solidFill>
                   <a:srgbClr val="FFFFFF"/>
                 </a:solidFill>
@@ -382,7 +393,7 @@
           <a:noFill/>
           <a:extLst>
             <a:ext uri="{909E8E84-426E-40dd-AFC4-6F175D3DCCD1}">
-              <a14:hiddenFill xmlns:a14="http://schemas.microsoft.com/office/drawing/2010/main" xmlns="">
+              <a14:hiddenFill xmlns="" xmlns:a14="http://schemas.microsoft.com/office/drawing/2010/main">
                 <a:solidFill>
                   <a:srgbClr val="FFFFFF"/>
                 </a:solidFill>
@@ -705,7 +716,7 @@
           <a:noFill/>
           <a:extLst>
             <a:ext uri="{909E8E84-426E-40dd-AFC4-6F175D3DCCD1}">
-              <a14:hiddenFill xmlns:a14="http://schemas.microsoft.com/office/drawing/2010/main" xmlns="">
+              <a14:hiddenFill xmlns="" xmlns:a14="http://schemas.microsoft.com/office/drawing/2010/main">
                 <a:solidFill>
                   <a:srgbClr val="FFFFFF"/>
                 </a:solidFill>
@@ -991,7 +1002,7 @@
           <a:noFill/>
           <a:extLst>
             <a:ext uri="{909E8E84-426E-40dd-AFC4-6F175D3DCCD1}">
-              <a14:hiddenFill xmlns:a14="http://schemas.microsoft.com/office/drawing/2010/main" xmlns="">
+              <a14:hiddenFill xmlns="" xmlns:a14="http://schemas.microsoft.com/office/drawing/2010/main">
                 <a:solidFill>
                   <a:srgbClr val="FFFFFF"/>
                 </a:solidFill>
@@ -1600,7 +1611,7 @@
           <a:noFill/>
           <a:extLst>
             <a:ext uri="{909E8E84-426E-40dd-AFC4-6F175D3DCCD1}">
-              <a14:hiddenFill xmlns:a14="http://schemas.microsoft.com/office/drawing/2010/main" xmlns="">
+              <a14:hiddenFill xmlns="" xmlns:a14="http://schemas.microsoft.com/office/drawing/2010/main">
                 <a:solidFill>
                   <a:srgbClr val="FFFFFF"/>
                 </a:solidFill>
@@ -2538,7 +2549,7 @@
           <a:noFill/>
           <a:extLst>
             <a:ext uri="{909E8E84-426E-40dd-AFC4-6F175D3DCCD1}">
-              <a14:hiddenFill xmlns:a14="http://schemas.microsoft.com/office/drawing/2010/main" xmlns="">
+              <a14:hiddenFill xmlns="" xmlns:a14="http://schemas.microsoft.com/office/drawing/2010/main">
                 <a:solidFill>
                   <a:srgbClr val="FFFFFF"/>
                 </a:solidFill>
@@ -4632,7 +4643,7 @@
           <a:noFill/>
           <a:extLst>
             <a:ext uri="{909E8E84-426E-40dd-AFC4-6F175D3DCCD1}">
-              <a14:hiddenFill xmlns:a14="http://schemas.microsoft.com/office/drawing/2010/main" xmlns="">
+              <a14:hiddenFill xmlns="" xmlns:a14="http://schemas.microsoft.com/office/drawing/2010/main">
                 <a:solidFill>
                   <a:srgbClr val="FFFFFF"/>
                 </a:solidFill>
@@ -5404,10 +5415,9 @@
               <a:buChar char="•"/>
             </a:pPr>
             <a:r>
-              <a:rPr lang="en-US" smtClean="0"/>
+              <a:rPr lang="en-US" dirty="0" smtClean="0"/>
               <a:t>Background/History</a:t>
             </a:r>
-            <a:endParaRPr lang="en-US" dirty="0" smtClean="0"/>
           </a:p>
           <a:p>
             <a:pPr marL="342900" indent="-342900">
@@ -5456,6 +5466,825 @@
     <p:extLst>
       <p:ext uri="{BB962C8B-B14F-4D97-AF65-F5344CB8AC3E}">
         <p14:creationId xmlns:p14="http://schemas.microsoft.com/office/powerpoint/2010/main" val="4258955792"/>
+      </p:ext>
+    </p:extLst>
+  </p:cSld>
+  <p:clrMapOvr>
+    <a:masterClrMapping/>
+  </p:clrMapOvr>
+</p:sld>
+</file>
+
+<file path=ppt/slides/slide3.xml><?xml version="1.0" encoding="utf-8"?>
+<p:sld xmlns:a="http://schemas.openxmlformats.org/drawingml/2006/main" xmlns:r="http://schemas.openxmlformats.org/officeDocument/2006/relationships" xmlns:p="http://schemas.openxmlformats.org/presentationml/2006/main">
+  <p:cSld>
+    <p:spTree>
+      <p:nvGrpSpPr>
+        <p:cNvPr id="1" name=""/>
+        <p:cNvGrpSpPr/>
+        <p:nvPr/>
+      </p:nvGrpSpPr>
+      <p:grpSpPr>
+        <a:xfrm>
+          <a:off x="0" y="0"/>
+          <a:ext cx="0" cy="0"/>
+          <a:chOff x="0" y="0"/>
+          <a:chExt cx="0" cy="0"/>
+        </a:xfrm>
+      </p:grpSpPr>
+      <p:sp>
+        <p:nvSpPr>
+          <p:cNvPr id="2" name="Title 1"/>
+          <p:cNvSpPr>
+            <a:spLocks noGrp="1"/>
+          </p:cNvSpPr>
+          <p:nvPr>
+            <p:ph type="title"/>
+          </p:nvPr>
+        </p:nvSpPr>
+        <p:spPr/>
+        <p:txBody>
+          <a:bodyPr/>
+          <a:lstStyle/>
+          <a:p>
+            <a:r>
+              <a:rPr lang="en-US" dirty="0" smtClean="0"/>
+              <a:t>SIMD: Single Instruction, Multiple Data</a:t>
+            </a:r>
+            <a:endParaRPr lang="en-US" dirty="0"/>
+          </a:p>
+        </p:txBody>
+      </p:sp>
+      <p:pic>
+        <p:nvPicPr>
+          <p:cNvPr id="4" name="Picture 3"/>
+          <p:cNvPicPr>
+            <a:picLocks noChangeAspect="1"/>
+          </p:cNvPicPr>
+          <p:nvPr/>
+        </p:nvPicPr>
+        <p:blipFill>
+          <a:blip r:embed="rId2">
+            <a:extLst>
+              <a:ext uri="{28A0092B-C50C-407E-A947-70E740481C1C}">
+                <a14:useLocalDpi xmlns:a14="http://schemas.microsoft.com/office/drawing/2010/main" val="0"/>
+              </a:ext>
+            </a:extLst>
+          </a:blip>
+          <a:stretch>
+            <a:fillRect/>
+          </a:stretch>
+        </p:blipFill>
+        <p:spPr>
+          <a:xfrm>
+            <a:off x="1064684" y="1411109"/>
+            <a:ext cx="10058400" cy="4916658"/>
+          </a:xfrm>
+          <a:prstGeom prst="rect">
+            <a:avLst/>
+          </a:prstGeom>
+        </p:spPr>
+      </p:pic>
+    </p:spTree>
+    <p:extLst>
+      <p:ext uri="{BB962C8B-B14F-4D97-AF65-F5344CB8AC3E}">
+        <p14:creationId xmlns:p14="http://schemas.microsoft.com/office/powerpoint/2010/main" val="272886899"/>
+      </p:ext>
+    </p:extLst>
+  </p:cSld>
+  <p:clrMapOvr>
+    <a:masterClrMapping/>
+  </p:clrMapOvr>
+</p:sld>
+</file>
+
+<file path=ppt/slides/slide4.xml><?xml version="1.0" encoding="utf-8"?>
+<p:sld xmlns:a="http://schemas.openxmlformats.org/drawingml/2006/main" xmlns:r="http://schemas.openxmlformats.org/officeDocument/2006/relationships" xmlns:p="http://schemas.openxmlformats.org/presentationml/2006/main">
+  <p:cSld>
+    <p:spTree>
+      <p:nvGrpSpPr>
+        <p:cNvPr id="1" name=""/>
+        <p:cNvGrpSpPr/>
+        <p:nvPr/>
+      </p:nvGrpSpPr>
+      <p:grpSpPr>
+        <a:xfrm>
+          <a:off x="0" y="0"/>
+          <a:ext cx="0" cy="0"/>
+          <a:chOff x="0" y="0"/>
+          <a:chExt cx="0" cy="0"/>
+        </a:xfrm>
+      </p:grpSpPr>
+      <p:sp>
+        <p:nvSpPr>
+          <p:cNvPr id="2" name="Title 1"/>
+          <p:cNvSpPr>
+            <a:spLocks noGrp="1"/>
+          </p:cNvSpPr>
+          <p:nvPr>
+            <p:ph type="title"/>
+          </p:nvPr>
+        </p:nvSpPr>
+        <p:spPr/>
+        <p:txBody>
+          <a:bodyPr/>
+          <a:lstStyle/>
+          <a:p>
+            <a:r>
+              <a:rPr lang="en-US" dirty="0" smtClean="0"/>
+              <a:t>JavaScript’s Popularity and Use on the Rise!</a:t>
+            </a:r>
+            <a:endParaRPr lang="en-US" dirty="0"/>
+          </a:p>
+        </p:txBody>
+      </p:sp>
+      <p:sp>
+        <p:nvSpPr>
+          <p:cNvPr id="3" name="Content Placeholder 2"/>
+          <p:cNvSpPr>
+            <a:spLocks noGrp="1"/>
+          </p:cNvSpPr>
+          <p:nvPr>
+            <p:ph sz="quarter" idx="13"/>
+          </p:nvPr>
+        </p:nvSpPr>
+        <p:spPr>
+          <a:xfrm>
+            <a:off x="607484" y="1604434"/>
+            <a:ext cx="5852693" cy="4567767"/>
+          </a:xfrm>
+        </p:spPr>
+        <p:txBody>
+          <a:bodyPr>
+            <a:normAutofit fontScale="92500" lnSpcReduction="10000"/>
+          </a:bodyPr>
+          <a:lstStyle/>
+          <a:p>
+            <a:pPr marL="342900" indent="-342900">
+              <a:buFont typeface="Arial" panose="020B0604020202020204" pitchFamily="34" charset="0"/>
+              <a:buChar char="•"/>
+            </a:pPr>
+            <a:r>
+              <a:rPr lang="en-US" dirty="0" smtClean="0"/>
+              <a:t>Games (Unreal, Unity) (via Emscripten/asm.js)</a:t>
+            </a:r>
+          </a:p>
+          <a:p>
+            <a:pPr marL="342900" indent="-342900">
+              <a:buFont typeface="Arial" panose="020B0604020202020204" pitchFamily="34" charset="0"/>
+              <a:buChar char="•"/>
+            </a:pPr>
+            <a:r>
+              <a:rPr lang="en-US" dirty="0" smtClean="0"/>
+              <a:t>Hybrid HTML5/JS apps for cross platform apps on mobile devices</a:t>
+            </a:r>
+          </a:p>
+          <a:p>
+            <a:pPr marL="342900" indent="-342900">
+              <a:buFont typeface="Arial" panose="020B0604020202020204" pitchFamily="34" charset="0"/>
+              <a:buChar char="•"/>
+            </a:pPr>
+            <a:r>
+              <a:rPr lang="en-US" dirty="0" smtClean="0"/>
+              <a:t>Pure HTML5/JS apps on </a:t>
+            </a:r>
+            <a:r>
+              <a:rPr lang="en-US" dirty="0" err="1" smtClean="0"/>
+              <a:t>ChromeOS</a:t>
+            </a:r>
+            <a:r>
+              <a:rPr lang="en-US" dirty="0" smtClean="0"/>
+              <a:t>/</a:t>
+            </a:r>
+            <a:r>
+              <a:rPr lang="en-US" dirty="0" err="1" smtClean="0"/>
+              <a:t>FirefoxOS</a:t>
+            </a:r>
+            <a:r>
+              <a:rPr lang="en-US" dirty="0" smtClean="0"/>
+              <a:t>/</a:t>
+            </a:r>
+            <a:r>
+              <a:rPr lang="en-US" dirty="0" err="1" smtClean="0"/>
+              <a:t>Tizen</a:t>
+            </a:r>
+            <a:endParaRPr lang="en-US" dirty="0" smtClean="0"/>
+          </a:p>
+          <a:p>
+            <a:pPr marL="342900" indent="-342900">
+              <a:buFont typeface="Arial" panose="020B0604020202020204" pitchFamily="34" charset="0"/>
+              <a:buChar char="•"/>
+            </a:pPr>
+            <a:r>
+              <a:rPr lang="en-US" dirty="0" smtClean="0"/>
+              <a:t>Standalone desktop JavaScript apps via NW.js (formerly node-</a:t>
+            </a:r>
+            <a:r>
+              <a:rPr lang="en-US" dirty="0" err="1" smtClean="0"/>
+              <a:t>webkit</a:t>
+            </a:r>
+            <a:r>
+              <a:rPr lang="en-US" dirty="0" smtClean="0"/>
+              <a:t>) (Intel XDK)</a:t>
+            </a:r>
+          </a:p>
+          <a:p>
+            <a:pPr marL="342900" indent="-342900">
+              <a:buFont typeface="Arial" panose="020B0604020202020204" pitchFamily="34" charset="0"/>
+              <a:buChar char="•"/>
+            </a:pPr>
+            <a:r>
+              <a:rPr lang="en-US" dirty="0" smtClean="0"/>
+              <a:t>Full featured browser based apps (Google Docs/maps, Office 365, …)</a:t>
+            </a:r>
+          </a:p>
+          <a:p>
+            <a:pPr marL="342900" indent="-342900">
+              <a:buFont typeface="Arial" panose="020B0604020202020204" pitchFamily="34" charset="0"/>
+              <a:buChar char="•"/>
+            </a:pPr>
+            <a:r>
+              <a:rPr lang="en-US" dirty="0" smtClean="0"/>
+              <a:t>Server side logic via node.js/io.js</a:t>
+            </a:r>
+            <a:endParaRPr lang="en-US" dirty="0"/>
+          </a:p>
+        </p:txBody>
+      </p:sp>
+      <p:pic>
+        <p:nvPicPr>
+          <p:cNvPr id="6" name="Picture 5"/>
+          <p:cNvPicPr>
+            <a:picLocks noChangeAspect="1"/>
+          </p:cNvPicPr>
+          <p:nvPr/>
+        </p:nvPicPr>
+        <p:blipFill>
+          <a:blip r:embed="rId2">
+            <a:extLst>
+              <a:ext uri="{28A0092B-C50C-407E-A947-70E740481C1C}">
+                <a14:useLocalDpi xmlns:a14="http://schemas.microsoft.com/office/drawing/2010/main" val="0"/>
+              </a:ext>
+            </a:extLst>
+          </a:blip>
+          <a:stretch>
+            <a:fillRect/>
+          </a:stretch>
+        </p:blipFill>
+        <p:spPr>
+          <a:xfrm>
+            <a:off x="6795103" y="1249879"/>
+            <a:ext cx="5132903" cy="4922322"/>
+          </a:xfrm>
+          <a:prstGeom prst="rect">
+            <a:avLst/>
+          </a:prstGeom>
+        </p:spPr>
+      </p:pic>
+    </p:spTree>
+    <p:extLst>
+      <p:ext uri="{BB962C8B-B14F-4D97-AF65-F5344CB8AC3E}">
+        <p14:creationId xmlns:p14="http://schemas.microsoft.com/office/powerpoint/2010/main" val="55542365"/>
+      </p:ext>
+    </p:extLst>
+  </p:cSld>
+  <p:clrMapOvr>
+    <a:masterClrMapping/>
+  </p:clrMapOvr>
+</p:sld>
+</file>
+
+<file path=ppt/slides/slide5.xml><?xml version="1.0" encoding="utf-8"?>
+<p:sld xmlns:a="http://schemas.openxmlformats.org/drawingml/2006/main" xmlns:r="http://schemas.openxmlformats.org/officeDocument/2006/relationships" xmlns:p="http://schemas.openxmlformats.org/presentationml/2006/main">
+  <p:cSld>
+    <p:spTree>
+      <p:nvGrpSpPr>
+        <p:cNvPr id="1" name=""/>
+        <p:cNvGrpSpPr/>
+        <p:nvPr/>
+      </p:nvGrpSpPr>
+      <p:grpSpPr>
+        <a:xfrm>
+          <a:off x="0" y="0"/>
+          <a:ext cx="0" cy="0"/>
+          <a:chOff x="0" y="0"/>
+          <a:chExt cx="0" cy="0"/>
+        </a:xfrm>
+      </p:grpSpPr>
+      <p:sp>
+        <p:nvSpPr>
+          <p:cNvPr id="2" name="Title 1"/>
+          <p:cNvSpPr>
+            <a:spLocks noGrp="1"/>
+          </p:cNvSpPr>
+          <p:nvPr>
+            <p:ph type="title"/>
+          </p:nvPr>
+        </p:nvSpPr>
+        <p:spPr/>
+        <p:txBody>
+          <a:bodyPr/>
+          <a:lstStyle/>
+          <a:p>
+            <a:r>
+              <a:rPr lang="en-US" dirty="0" smtClean="0"/>
+              <a:t>More Silicon Dedicated to Vector </a:t>
+            </a:r>
+            <a:r>
+              <a:rPr lang="en-US" dirty="0"/>
+              <a:t>P</a:t>
+            </a:r>
+            <a:r>
+              <a:rPr lang="en-US" dirty="0" smtClean="0"/>
+              <a:t>rocessing</a:t>
+            </a:r>
+            <a:endParaRPr lang="en-US" dirty="0"/>
+          </a:p>
+        </p:txBody>
+      </p:sp>
+      <p:grpSp>
+        <p:nvGrpSpPr>
+          <p:cNvPr id="6" name="Group 5"/>
+          <p:cNvGrpSpPr/>
+          <p:nvPr/>
+        </p:nvGrpSpPr>
+        <p:grpSpPr>
+          <a:xfrm>
+            <a:off x="2327656" y="1210590"/>
+            <a:ext cx="8019772" cy="5564777"/>
+            <a:chOff x="2327656" y="1210590"/>
+            <a:chExt cx="8019772" cy="5564777"/>
+          </a:xfrm>
+        </p:grpSpPr>
+        <p:pic>
+          <p:nvPicPr>
+            <p:cNvPr id="4" name="Picture 3"/>
+            <p:cNvPicPr>
+              <a:picLocks noChangeAspect="1"/>
+            </p:cNvPicPr>
+            <p:nvPr/>
+          </p:nvPicPr>
+          <p:blipFill>
+            <a:blip r:embed="rId2">
+              <a:extLst>
+                <a:ext uri="{28A0092B-C50C-407E-A947-70E740481C1C}">
+                  <a14:useLocalDpi xmlns:a14="http://schemas.microsoft.com/office/drawing/2010/main" val="0"/>
+                </a:ext>
+              </a:extLst>
+            </a:blip>
+            <a:stretch>
+              <a:fillRect/>
+            </a:stretch>
+          </p:blipFill>
+          <p:spPr>
+            <a:xfrm>
+              <a:off x="2327656" y="1447800"/>
+              <a:ext cx="7532455" cy="5090358"/>
+            </a:xfrm>
+            <a:prstGeom prst="rect">
+              <a:avLst/>
+            </a:prstGeom>
+          </p:spPr>
+        </p:pic>
+        <p:sp>
+          <p:nvSpPr>
+            <p:cNvPr id="5" name="Oval 4"/>
+            <p:cNvSpPr/>
+            <p:nvPr/>
+          </p:nvSpPr>
+          <p:spPr>
+            <a:xfrm>
+              <a:off x="7400505" y="1210590"/>
+              <a:ext cx="2946923" cy="5564777"/>
+            </a:xfrm>
+            <a:prstGeom prst="ellipse">
+              <a:avLst/>
+            </a:prstGeom>
+            <a:noFill/>
+            <a:ln w="82550">
+              <a:solidFill>
+                <a:srgbClr val="FF0000"/>
+              </a:solidFill>
+            </a:ln>
+            <a:effectLst/>
+          </p:spPr>
+          <p:style>
+            <a:lnRef idx="1">
+              <a:schemeClr val="accent1"/>
+            </a:lnRef>
+            <a:fillRef idx="3">
+              <a:schemeClr val="accent1"/>
+            </a:fillRef>
+            <a:effectRef idx="2">
+              <a:schemeClr val="accent1"/>
+            </a:effectRef>
+            <a:fontRef idx="minor">
+              <a:schemeClr val="lt1"/>
+            </a:fontRef>
+          </p:style>
+          <p:txBody>
+            <a:bodyPr rtlCol="0" anchor="ctr"/>
+            <a:lstStyle/>
+            <a:p>
+              <a:pPr algn="ctr"/>
+              <a:endParaRPr lang="en-US"/>
+            </a:p>
+          </p:txBody>
+        </p:sp>
+      </p:grpSp>
+    </p:spTree>
+    <p:extLst>
+      <p:ext uri="{BB962C8B-B14F-4D97-AF65-F5344CB8AC3E}">
+        <p14:creationId xmlns:p14="http://schemas.microsoft.com/office/powerpoint/2010/main" val="1910882012"/>
+      </p:ext>
+    </p:extLst>
+  </p:cSld>
+  <p:clrMapOvr>
+    <a:masterClrMapping/>
+  </p:clrMapOvr>
+</p:sld>
+</file>
+
+<file path=ppt/slides/slide6.xml><?xml version="1.0" encoding="utf-8"?>
+<p:sld xmlns:a="http://schemas.openxmlformats.org/drawingml/2006/main" xmlns:r="http://schemas.openxmlformats.org/officeDocument/2006/relationships" xmlns:p="http://schemas.openxmlformats.org/presentationml/2006/main">
+  <p:cSld>
+    <p:spTree>
+      <p:nvGrpSpPr>
+        <p:cNvPr id="1" name=""/>
+        <p:cNvGrpSpPr/>
+        <p:nvPr/>
+      </p:nvGrpSpPr>
+      <p:grpSpPr>
+        <a:xfrm>
+          <a:off x="0" y="0"/>
+          <a:ext cx="0" cy="0"/>
+          <a:chOff x="0" y="0"/>
+          <a:chExt cx="0" cy="0"/>
+        </a:xfrm>
+      </p:grpSpPr>
+      <p:sp>
+        <p:nvSpPr>
+          <p:cNvPr id="2" name="Title 1"/>
+          <p:cNvSpPr>
+            <a:spLocks noGrp="1"/>
+          </p:cNvSpPr>
+          <p:nvPr>
+            <p:ph type="title"/>
+          </p:nvPr>
+        </p:nvSpPr>
+        <p:spPr/>
+        <p:txBody>
+          <a:bodyPr/>
+          <a:lstStyle/>
+          <a:p>
+            <a:r>
+              <a:rPr lang="en-US" dirty="0" smtClean="0"/>
+              <a:t>Hardware/Software Gap</a:t>
+            </a:r>
+            <a:endParaRPr lang="en-US" dirty="0"/>
+          </a:p>
+        </p:txBody>
+      </p:sp>
+      <p:sp>
+        <p:nvSpPr>
+          <p:cNvPr id="3" name="Content Placeholder 2"/>
+          <p:cNvSpPr>
+            <a:spLocks noGrp="1"/>
+          </p:cNvSpPr>
+          <p:nvPr>
+            <p:ph sz="quarter" idx="13"/>
+          </p:nvPr>
+        </p:nvSpPr>
+        <p:spPr>
+          <a:xfrm>
+            <a:off x="607484" y="1604434"/>
+            <a:ext cx="10970683" cy="2136293"/>
+          </a:xfrm>
+        </p:spPr>
+        <p:txBody>
+          <a:bodyPr/>
+          <a:lstStyle/>
+          <a:p>
+            <a:pPr marL="342900" indent="-342900">
+              <a:buFont typeface="Arial" panose="020B0604020202020204" pitchFamily="34" charset="0"/>
+              <a:buChar char="•"/>
+            </a:pPr>
+            <a:r>
+              <a:rPr lang="en-US" dirty="0" smtClean="0"/>
+              <a:t>SIMD instructions are an increasingly larger portion of instruction set architectures of newer CPUs</a:t>
+            </a:r>
+          </a:p>
+          <a:p>
+            <a:pPr marL="342900" indent="-342900">
+              <a:buFont typeface="Arial" panose="020B0604020202020204" pitchFamily="34" charset="0"/>
+              <a:buChar char="•"/>
+            </a:pPr>
+            <a:r>
+              <a:rPr lang="en-US" dirty="0" smtClean="0"/>
+              <a:t>Currently, it’s not possible to utilize these powerful instructions from JavaScript programs</a:t>
+            </a:r>
+            <a:endParaRPr lang="en-US" dirty="0"/>
+          </a:p>
+        </p:txBody>
+      </p:sp>
+      <p:sp>
+        <p:nvSpPr>
+          <p:cNvPr id="4" name="TextBox 3"/>
+          <p:cNvSpPr txBox="1"/>
+          <p:nvPr/>
+        </p:nvSpPr>
+        <p:spPr>
+          <a:xfrm>
+            <a:off x="1089263" y="4488675"/>
+            <a:ext cx="10007124" cy="923330"/>
+          </a:xfrm>
+          <a:prstGeom prst="rect">
+            <a:avLst/>
+          </a:prstGeom>
+          <a:solidFill>
+            <a:srgbClr val="FF0000"/>
+          </a:solidFill>
+          <a:effectLst>
+            <a:reflection blurRad="6350" stA="50000" endA="300" endPos="55000" dir="5400000" sy="-100000" algn="bl" rotWithShape="0"/>
+          </a:effectLst>
+          <a:scene3d>
+            <a:camera prst="orthographicFront"/>
+            <a:lightRig rig="threePt" dir="t"/>
+          </a:scene3d>
+          <a:sp3d>
+            <a:bevelT/>
+          </a:sp3d>
+        </p:spPr>
+        <p:txBody>
+          <a:bodyPr wrap="square" tIns="182880" bIns="182880" rtlCol="0">
+            <a:spAutoFit/>
+          </a:bodyPr>
+          <a:lstStyle/>
+          <a:p>
+            <a:pPr algn="ctr"/>
+            <a:r>
+              <a:rPr lang="en-US" sz="3600" b="1" dirty="0" smtClean="0">
+                <a:solidFill>
+                  <a:schemeClr val="bg1"/>
+                </a:solidFill>
+                <a:cs typeface="Neo Sans Intel"/>
+              </a:rPr>
+              <a:t>SIMD.JS/Emscripten will bridge this gap </a:t>
+            </a:r>
+            <a:endParaRPr lang="en-US" sz="3600" b="1" dirty="0" smtClean="0">
+              <a:solidFill>
+                <a:schemeClr val="bg1"/>
+              </a:solidFill>
+              <a:cs typeface="Neo Sans Intel"/>
+            </a:endParaRPr>
+          </a:p>
+        </p:txBody>
+      </p:sp>
+    </p:spTree>
+    <p:extLst>
+      <p:ext uri="{BB962C8B-B14F-4D97-AF65-F5344CB8AC3E}">
+        <p14:creationId xmlns:p14="http://schemas.microsoft.com/office/powerpoint/2010/main" val="3993932885"/>
+      </p:ext>
+    </p:extLst>
+  </p:cSld>
+  <p:clrMapOvr>
+    <a:masterClrMapping/>
+  </p:clrMapOvr>
+</p:sld>
+</file>
+
+<file path=ppt/slides/slide7.xml><?xml version="1.0" encoding="utf-8"?>
+<p:sld xmlns:a="http://schemas.openxmlformats.org/drawingml/2006/main" xmlns:r="http://schemas.openxmlformats.org/officeDocument/2006/relationships" xmlns:p="http://schemas.openxmlformats.org/presentationml/2006/main">
+  <p:cSld>
+    <p:spTree>
+      <p:nvGrpSpPr>
+        <p:cNvPr id="1" name=""/>
+        <p:cNvGrpSpPr/>
+        <p:nvPr/>
+      </p:nvGrpSpPr>
+      <p:grpSpPr>
+        <a:xfrm>
+          <a:off x="0" y="0"/>
+          <a:ext cx="0" cy="0"/>
+          <a:chOff x="0" y="0"/>
+          <a:chExt cx="0" cy="0"/>
+        </a:xfrm>
+      </p:grpSpPr>
+      <p:sp>
+        <p:nvSpPr>
+          <p:cNvPr id="2" name="Title 1"/>
+          <p:cNvSpPr>
+            <a:spLocks noGrp="1"/>
+          </p:cNvSpPr>
+          <p:nvPr>
+            <p:ph type="title"/>
+          </p:nvPr>
+        </p:nvSpPr>
+        <p:spPr/>
+        <p:txBody>
+          <a:bodyPr/>
+          <a:lstStyle/>
+          <a:p>
+            <a:r>
+              <a:rPr lang="en-US" dirty="0" smtClean="0"/>
+              <a:t>Demo</a:t>
+            </a:r>
+            <a:endParaRPr lang="en-US" dirty="0"/>
+          </a:p>
+        </p:txBody>
+      </p:sp>
+      <p:pic>
+        <p:nvPicPr>
+          <p:cNvPr id="4" name="Picture 3"/>
+          <p:cNvPicPr>
+            <a:picLocks noChangeAspect="1"/>
+          </p:cNvPicPr>
+          <p:nvPr/>
+        </p:nvPicPr>
+        <p:blipFill>
+          <a:blip r:embed="rId2">
+            <a:extLst>
+              <a:ext uri="{28A0092B-C50C-407E-A947-70E740481C1C}">
+                <a14:useLocalDpi xmlns:a14="http://schemas.microsoft.com/office/drawing/2010/main" val="0"/>
+              </a:ext>
+            </a:extLst>
+          </a:blip>
+          <a:stretch>
+            <a:fillRect/>
+          </a:stretch>
+        </p:blipFill>
+        <p:spPr>
+          <a:xfrm>
+            <a:off x="2491792" y="990917"/>
+            <a:ext cx="7204183" cy="5580705"/>
+          </a:xfrm>
+          <a:prstGeom prst="rect">
+            <a:avLst/>
+          </a:prstGeom>
+        </p:spPr>
+      </p:pic>
+    </p:spTree>
+    <p:extLst>
+      <p:ext uri="{BB962C8B-B14F-4D97-AF65-F5344CB8AC3E}">
+        <p14:creationId xmlns:p14="http://schemas.microsoft.com/office/powerpoint/2010/main" val="2150740465"/>
+      </p:ext>
+    </p:extLst>
+  </p:cSld>
+  <p:clrMapOvr>
+    <a:masterClrMapping/>
+  </p:clrMapOvr>
+</p:sld>
+</file>
+
+<file path=ppt/slides/slide8.xml><?xml version="1.0" encoding="utf-8"?>
+<p:sld xmlns:a="http://schemas.openxmlformats.org/drawingml/2006/main" xmlns:r="http://schemas.openxmlformats.org/officeDocument/2006/relationships" xmlns:p="http://schemas.openxmlformats.org/presentationml/2006/main">
+  <p:cSld>
+    <p:spTree>
+      <p:nvGrpSpPr>
+        <p:cNvPr id="1" name=""/>
+        <p:cNvGrpSpPr/>
+        <p:nvPr/>
+      </p:nvGrpSpPr>
+      <p:grpSpPr>
+        <a:xfrm>
+          <a:off x="0" y="0"/>
+          <a:ext cx="0" cy="0"/>
+          <a:chOff x="0" y="0"/>
+          <a:chExt cx="0" cy="0"/>
+        </a:xfrm>
+      </p:grpSpPr>
+      <p:sp>
+        <p:nvSpPr>
+          <p:cNvPr id="2" name="Title 1"/>
+          <p:cNvSpPr>
+            <a:spLocks noGrp="1"/>
+          </p:cNvSpPr>
+          <p:nvPr>
+            <p:ph type="title"/>
+          </p:nvPr>
+        </p:nvSpPr>
+        <p:spPr/>
+        <p:txBody>
+          <a:bodyPr/>
+          <a:lstStyle/>
+          <a:p>
+            <a:r>
+              <a:rPr lang="en-US" dirty="0" smtClean="0"/>
+              <a:t>SIMD.JS/Emscripten – Background/History</a:t>
+            </a:r>
+            <a:endParaRPr lang="en-US" dirty="0"/>
+          </a:p>
+        </p:txBody>
+      </p:sp>
+      <p:sp>
+        <p:nvSpPr>
+          <p:cNvPr id="3" name="Content Placeholder 2"/>
+          <p:cNvSpPr>
+            <a:spLocks noGrp="1"/>
+          </p:cNvSpPr>
+          <p:nvPr>
+            <p:ph sz="quarter" idx="13"/>
+          </p:nvPr>
+        </p:nvSpPr>
+        <p:spPr/>
+        <p:txBody>
+          <a:bodyPr/>
+          <a:lstStyle/>
+          <a:p>
+            <a:pPr marL="342900" indent="-342900">
+              <a:buFont typeface="Arial" panose="020B0604020202020204" pitchFamily="34" charset="0"/>
+              <a:buChar char="•"/>
+            </a:pPr>
+            <a:r>
+              <a:rPr lang="en-US" b="1" dirty="0" smtClean="0"/>
+              <a:t>Intel/Mozilla/Google/Microsoft/ARM collaboration!</a:t>
+            </a:r>
+          </a:p>
+          <a:p>
+            <a:pPr marL="342900" indent="-342900">
+              <a:buFont typeface="Arial" panose="020B0604020202020204" pitchFamily="34" charset="0"/>
+              <a:buChar char="•"/>
+            </a:pPr>
+            <a:r>
+              <a:rPr lang="en-US" dirty="0" smtClean="0"/>
+              <a:t>Started mid-2013</a:t>
+            </a:r>
+          </a:p>
+          <a:p>
+            <a:pPr marL="342900" indent="-342900">
+              <a:buFont typeface="Arial" panose="020B0604020202020204" pitchFamily="34" charset="0"/>
+              <a:buChar char="•"/>
+            </a:pPr>
+            <a:r>
+              <a:rPr lang="en-US" dirty="0" smtClean="0"/>
+              <a:t>Initial </a:t>
+            </a:r>
+            <a:r>
+              <a:rPr lang="en-US" dirty="0" err="1" smtClean="0"/>
+              <a:t>polyfill</a:t>
+            </a:r>
+            <a:r>
+              <a:rPr lang="en-US" dirty="0" smtClean="0"/>
+              <a:t> spec by John </a:t>
+            </a:r>
+            <a:r>
+              <a:rPr lang="en-US" dirty="0" err="1" smtClean="0"/>
+              <a:t>McCutchan</a:t>
+            </a:r>
+            <a:r>
+              <a:rPr lang="en-US" dirty="0" smtClean="0"/>
+              <a:t> (Google’s Dart VM team)</a:t>
+            </a:r>
+          </a:p>
+          <a:p>
+            <a:pPr marL="342900" indent="-342900">
+              <a:buFont typeface="Arial" panose="020B0604020202020204" pitchFamily="34" charset="0"/>
+              <a:buChar char="•"/>
+            </a:pPr>
+            <a:r>
+              <a:rPr lang="en-US" dirty="0" smtClean="0"/>
+              <a:t>Prototypes for Chromium, Firefox</a:t>
+            </a:r>
+          </a:p>
+          <a:p>
+            <a:pPr marL="342900" indent="-342900">
+              <a:buFont typeface="Arial" panose="020B0604020202020204" pitchFamily="34" charset="0"/>
+              <a:buChar char="•"/>
+            </a:pPr>
+            <a:r>
+              <a:rPr lang="en-US" b="1" dirty="0" smtClean="0"/>
+              <a:t>Available in Intel’s </a:t>
+            </a:r>
+            <a:r>
+              <a:rPr lang="en-US" b="1" dirty="0" err="1" smtClean="0"/>
+              <a:t>Crossswalk</a:t>
+            </a:r>
+            <a:r>
+              <a:rPr lang="en-US" b="1" dirty="0" smtClean="0"/>
+              <a:t> web-runtime (for hybrid HTML5 apps) TODAY!</a:t>
+            </a:r>
+          </a:p>
+          <a:p>
+            <a:pPr marL="342900" indent="-342900">
+              <a:buFont typeface="Arial" panose="020B0604020202020204" pitchFamily="34" charset="0"/>
+              <a:buChar char="•"/>
+            </a:pPr>
+            <a:r>
+              <a:rPr lang="en-US" dirty="0" smtClean="0"/>
+              <a:t>Emscripten (C++ -&gt; JavaScript compiler) now generates SIMD.JS code from LLVM vector operations and from a subset of x86 SIMD </a:t>
+            </a:r>
+            <a:r>
+              <a:rPr lang="en-US" dirty="0" err="1" smtClean="0"/>
+              <a:t>intrinsics</a:t>
+            </a:r>
+            <a:endParaRPr lang="en-US" dirty="0"/>
+          </a:p>
+        </p:txBody>
+      </p:sp>
+    </p:spTree>
+    <p:extLst>
+      <p:ext uri="{BB962C8B-B14F-4D97-AF65-F5344CB8AC3E}">
+        <p14:creationId xmlns:p14="http://schemas.microsoft.com/office/powerpoint/2010/main" val="1056251742"/>
       </p:ext>
     </p:extLst>
   </p:cSld>

</xml_diff>

<commit_message>
Made silicon image smaller
</commit_message>
<xml_diff>
--- a/simdjs-presentation.pptx
+++ b/simdjs-presentation.pptx
@@ -352,7 +352,7 @@
           <a:noFill/>
           <a:extLst>
             <a:ext uri="{909E8E84-426E-40dd-AFC4-6F175D3DCCD1}">
-              <a14:hiddenFill xmlns="" xmlns:a14="http://schemas.microsoft.com/office/drawing/2010/main">
+              <a14:hiddenFill xmlns:a14="http://schemas.microsoft.com/office/drawing/2010/main" xmlns="">
                 <a:solidFill>
                   <a:srgbClr val="FFFFFF"/>
                 </a:solidFill>
@@ -393,7 +393,7 @@
           <a:noFill/>
           <a:extLst>
             <a:ext uri="{909E8E84-426E-40dd-AFC4-6F175D3DCCD1}">
-              <a14:hiddenFill xmlns="" xmlns:a14="http://schemas.microsoft.com/office/drawing/2010/main">
+              <a14:hiddenFill xmlns:a14="http://schemas.microsoft.com/office/drawing/2010/main" xmlns="">
                 <a:solidFill>
                   <a:srgbClr val="FFFFFF"/>
                 </a:solidFill>
@@ -716,7 +716,7 @@
           <a:noFill/>
           <a:extLst>
             <a:ext uri="{909E8E84-426E-40dd-AFC4-6F175D3DCCD1}">
-              <a14:hiddenFill xmlns="" xmlns:a14="http://schemas.microsoft.com/office/drawing/2010/main">
+              <a14:hiddenFill xmlns:a14="http://schemas.microsoft.com/office/drawing/2010/main" xmlns="">
                 <a:solidFill>
                   <a:srgbClr val="FFFFFF"/>
                 </a:solidFill>
@@ -1002,7 +1002,7 @@
           <a:noFill/>
           <a:extLst>
             <a:ext uri="{909E8E84-426E-40dd-AFC4-6F175D3DCCD1}">
-              <a14:hiddenFill xmlns="" xmlns:a14="http://schemas.microsoft.com/office/drawing/2010/main">
+              <a14:hiddenFill xmlns:a14="http://schemas.microsoft.com/office/drawing/2010/main" xmlns="">
                 <a:solidFill>
                   <a:srgbClr val="FFFFFF"/>
                 </a:solidFill>
@@ -1611,7 +1611,7 @@
           <a:noFill/>
           <a:extLst>
             <a:ext uri="{909E8E84-426E-40dd-AFC4-6F175D3DCCD1}">
-              <a14:hiddenFill xmlns="" xmlns:a14="http://schemas.microsoft.com/office/drawing/2010/main">
+              <a14:hiddenFill xmlns:a14="http://schemas.microsoft.com/office/drawing/2010/main" xmlns="">
                 <a:solidFill>
                   <a:srgbClr val="FFFFFF"/>
                 </a:solidFill>
@@ -2549,7 +2549,7 @@
           <a:noFill/>
           <a:extLst>
             <a:ext uri="{909E8E84-426E-40dd-AFC4-6F175D3DCCD1}">
-              <a14:hiddenFill xmlns="" xmlns:a14="http://schemas.microsoft.com/office/drawing/2010/main">
+              <a14:hiddenFill xmlns:a14="http://schemas.microsoft.com/office/drawing/2010/main" xmlns="">
                 <a:solidFill>
                   <a:srgbClr val="FFFFFF"/>
                 </a:solidFill>
@@ -4643,7 +4643,7 @@
           <a:noFill/>
           <a:extLst>
             <a:ext uri="{909E8E84-426E-40dd-AFC4-6F175D3DCCD1}">
-              <a14:hiddenFill xmlns="" xmlns:a14="http://schemas.microsoft.com/office/drawing/2010/main">
+              <a14:hiddenFill xmlns:a14="http://schemas.microsoft.com/office/drawing/2010/main" xmlns="">
                 <a:solidFill>
                   <a:srgbClr val="FFFFFF"/>
                 </a:solidFill>
@@ -5802,96 +5802,81 @@
           </a:p>
         </p:txBody>
       </p:sp>
-      <p:grpSp>
-        <p:nvGrpSpPr>
-          <p:cNvPr id="6" name="Group 5"/>
-          <p:cNvGrpSpPr/>
+      <p:pic>
+        <p:nvPicPr>
+          <p:cNvPr id="3" name="Picture 2"/>
+          <p:cNvPicPr>
+            <a:picLocks noChangeAspect="1"/>
+          </p:cNvPicPr>
           <p:nvPr/>
-        </p:nvGrpSpPr>
-        <p:grpSpPr>
+        </p:nvPicPr>
+        <p:blipFill>
+          <a:blip r:embed="rId2">
+            <a:extLst>
+              <a:ext uri="{28A0092B-C50C-407E-A947-70E740481C1C}">
+                <a14:useLocalDpi xmlns:a14="http://schemas.microsoft.com/office/drawing/2010/main" val="0"/>
+              </a:ext>
+            </a:extLst>
+          </a:blip>
+          <a:stretch>
+            <a:fillRect/>
+          </a:stretch>
+        </p:blipFill>
+        <p:spPr>
           <a:xfrm>
-            <a:off x="2327656" y="1210590"/>
-            <a:ext cx="8019772" cy="5564777"/>
-            <a:chOff x="2327656" y="1210590"/>
-            <a:chExt cx="8019772" cy="5564777"/>
+            <a:off x="1235034" y="1195666"/>
+            <a:ext cx="8277101" cy="5470035"/>
           </a:xfrm>
-        </p:grpSpPr>
-        <p:pic>
-          <p:nvPicPr>
-            <p:cNvPr id="4" name="Picture 3"/>
-            <p:cNvPicPr>
-              <a:picLocks noChangeAspect="1"/>
-            </p:cNvPicPr>
-            <p:nvPr/>
-          </p:nvPicPr>
-          <p:blipFill>
-            <a:blip r:embed="rId2">
-              <a:extLst>
-                <a:ext uri="{28A0092B-C50C-407E-A947-70E740481C1C}">
-                  <a14:useLocalDpi xmlns:a14="http://schemas.microsoft.com/office/drawing/2010/main" val="0"/>
-                </a:ext>
-              </a:extLst>
-            </a:blip>
-            <a:stretch>
-              <a:fillRect/>
-            </a:stretch>
-          </p:blipFill>
-          <p:spPr>
-            <a:xfrm>
-              <a:off x="2327656" y="1447800"/>
-              <a:ext cx="7532455" cy="5090358"/>
-            </a:xfrm>
-            <a:prstGeom prst="rect">
-              <a:avLst/>
-            </a:prstGeom>
-          </p:spPr>
-        </p:pic>
-        <p:sp>
-          <p:nvSpPr>
-            <p:cNvPr id="5" name="Oval 4"/>
-            <p:cNvSpPr/>
-            <p:nvPr/>
-          </p:nvSpPr>
-          <p:spPr>
-            <a:xfrm>
-              <a:off x="7400505" y="1210590"/>
-              <a:ext cx="2946923" cy="5564777"/>
-            </a:xfrm>
-            <a:prstGeom prst="ellipse">
-              <a:avLst/>
-            </a:prstGeom>
-            <a:noFill/>
-            <a:ln w="82550">
-              <a:solidFill>
-                <a:srgbClr val="FF0000"/>
-              </a:solidFill>
-            </a:ln>
-            <a:effectLst/>
-          </p:spPr>
-          <p:style>
-            <a:lnRef idx="1">
-              <a:schemeClr val="accent1"/>
-            </a:lnRef>
-            <a:fillRef idx="3">
-              <a:schemeClr val="accent1"/>
-            </a:fillRef>
-            <a:effectRef idx="2">
-              <a:schemeClr val="accent1"/>
-            </a:effectRef>
-            <a:fontRef idx="minor">
-              <a:schemeClr val="lt1"/>
-            </a:fontRef>
-          </p:style>
-          <p:txBody>
-            <a:bodyPr rtlCol="0" anchor="ctr"/>
-            <a:lstStyle/>
-            <a:p>
-              <a:pPr algn="ctr"/>
-              <a:endParaRPr lang="en-US"/>
-            </a:p>
-          </p:txBody>
-        </p:sp>
-      </p:grpSp>
+          <a:prstGeom prst="rect">
+            <a:avLst/>
+          </a:prstGeom>
+        </p:spPr>
+      </p:pic>
+      <p:sp>
+        <p:nvSpPr>
+          <p:cNvPr id="5" name="Oval 4"/>
+          <p:cNvSpPr/>
+          <p:nvPr/>
+        </p:nvSpPr>
+        <p:spPr>
+          <a:xfrm>
+            <a:off x="7008620" y="1100924"/>
+            <a:ext cx="2946923" cy="5564777"/>
+          </a:xfrm>
+          <a:prstGeom prst="ellipse">
+            <a:avLst/>
+          </a:prstGeom>
+          <a:noFill/>
+          <a:ln w="82550">
+            <a:solidFill>
+              <a:srgbClr val="FF0000"/>
+            </a:solidFill>
+          </a:ln>
+          <a:effectLst/>
+        </p:spPr>
+        <p:style>
+          <a:lnRef idx="1">
+            <a:schemeClr val="accent1"/>
+          </a:lnRef>
+          <a:fillRef idx="3">
+            <a:schemeClr val="accent1"/>
+          </a:fillRef>
+          <a:effectRef idx="2">
+            <a:schemeClr val="accent1"/>
+          </a:effectRef>
+          <a:fontRef idx="minor">
+            <a:schemeClr val="lt1"/>
+          </a:fontRef>
+        </p:style>
+        <p:txBody>
+          <a:bodyPr rtlCol="0" anchor="ctr"/>
+          <a:lstStyle/>
+          <a:p>
+            <a:pPr algn="ctr"/>
+            <a:endParaRPr lang="en-US"/>
+          </a:p>
+        </p:txBody>
+      </p:sp>
     </p:spTree>
     <p:extLst>
       <p:ext uri="{BB962C8B-B14F-4D97-AF65-F5344CB8AC3E}">
@@ -6031,12 +6016,6 @@
               </a:rPr>
               <a:t>SIMD.JS/Emscripten will bridge this gap </a:t>
             </a:r>
-            <a:endParaRPr lang="en-US" sz="3600" b="1" dirty="0" smtClean="0">
-              <a:solidFill>
-                <a:schemeClr val="bg1"/>
-              </a:solidFill>
-              <a:cs typeface="Neo Sans Intel"/>
-            </a:endParaRPr>
           </a:p>
         </p:txBody>
       </p:sp>

</xml_diff>

<commit_message>
Added a few SIMD.JS slides
</commit_message>
<xml_diff>
--- a/simdjs-presentation.pptx
+++ b/simdjs-presentation.pptx
@@ -13,6 +13,10 @@
     <p:sldId id="261" r:id="rId7"/>
     <p:sldId id="262" r:id="rId8"/>
     <p:sldId id="263" r:id="rId9"/>
+    <p:sldId id="264" r:id="rId10"/>
+    <p:sldId id="266" r:id="rId11"/>
+    <p:sldId id="267" r:id="rId12"/>
+    <p:sldId id="265" r:id="rId13"/>
   </p:sldIdLst>
   <p:sldSz cx="12192000" cy="6858000"/>
   <p:notesSz cx="6858000" cy="9144000"/>
@@ -352,7 +356,7 @@
           <a:noFill/>
           <a:extLst>
             <a:ext uri="{909E8E84-426E-40dd-AFC4-6F175D3DCCD1}">
-              <a14:hiddenFill xmlns:a14="http://schemas.microsoft.com/office/drawing/2010/main" xmlns="">
+              <a14:hiddenFill xmlns="" xmlns:a14="http://schemas.microsoft.com/office/drawing/2010/main">
                 <a:solidFill>
                   <a:srgbClr val="FFFFFF"/>
                 </a:solidFill>
@@ -393,7 +397,7 @@
           <a:noFill/>
           <a:extLst>
             <a:ext uri="{909E8E84-426E-40dd-AFC4-6F175D3DCCD1}">
-              <a14:hiddenFill xmlns:a14="http://schemas.microsoft.com/office/drawing/2010/main" xmlns="">
+              <a14:hiddenFill xmlns="" xmlns:a14="http://schemas.microsoft.com/office/drawing/2010/main">
                 <a:solidFill>
                   <a:srgbClr val="FFFFFF"/>
                 </a:solidFill>
@@ -716,7 +720,7 @@
           <a:noFill/>
           <a:extLst>
             <a:ext uri="{909E8E84-426E-40dd-AFC4-6F175D3DCCD1}">
-              <a14:hiddenFill xmlns:a14="http://schemas.microsoft.com/office/drawing/2010/main" xmlns="">
+              <a14:hiddenFill xmlns="" xmlns:a14="http://schemas.microsoft.com/office/drawing/2010/main">
                 <a:solidFill>
                   <a:srgbClr val="FFFFFF"/>
                 </a:solidFill>
@@ -1002,7 +1006,7 @@
           <a:noFill/>
           <a:extLst>
             <a:ext uri="{909E8E84-426E-40dd-AFC4-6F175D3DCCD1}">
-              <a14:hiddenFill xmlns:a14="http://schemas.microsoft.com/office/drawing/2010/main" xmlns="">
+              <a14:hiddenFill xmlns="" xmlns:a14="http://schemas.microsoft.com/office/drawing/2010/main">
                 <a:solidFill>
                   <a:srgbClr val="FFFFFF"/>
                 </a:solidFill>
@@ -1348,7 +1352,7 @@
           <a:p>
             <a:fld id="{D7BAD4AB-A0C0-4804-835B-7CAD5144033B}" type="datetimeFigureOut">
               <a:rPr lang="en-US" smtClean="0"/>
-              <a:t>2/5/2015</a:t>
+              <a:t>2/6/2015</a:t>
             </a:fld>
             <a:endParaRPr lang="en-US"/>
           </a:p>
@@ -1450,7 +1454,7 @@
           <a:p>
             <a:fld id="{D7BAD4AB-A0C0-4804-835B-7CAD5144033B}" type="datetimeFigureOut">
               <a:rPr lang="en-US" smtClean="0"/>
-              <a:t>2/5/2015</a:t>
+              <a:t>2/6/2015</a:t>
             </a:fld>
             <a:endParaRPr lang="en-US"/>
           </a:p>
@@ -1611,7 +1615,7 @@
           <a:noFill/>
           <a:extLst>
             <a:ext uri="{909E8E84-426E-40dd-AFC4-6F175D3DCCD1}">
-              <a14:hiddenFill xmlns:a14="http://schemas.microsoft.com/office/drawing/2010/main" xmlns="">
+              <a14:hiddenFill xmlns="" xmlns:a14="http://schemas.microsoft.com/office/drawing/2010/main">
                 <a:solidFill>
                   <a:srgbClr val="FFFFFF"/>
                 </a:solidFill>
@@ -2549,7 +2553,7 @@
           <a:noFill/>
           <a:extLst>
             <a:ext uri="{909E8E84-426E-40dd-AFC4-6F175D3DCCD1}">
-              <a14:hiddenFill xmlns:a14="http://schemas.microsoft.com/office/drawing/2010/main" xmlns="">
+              <a14:hiddenFill xmlns="" xmlns:a14="http://schemas.microsoft.com/office/drawing/2010/main">
                 <a:solidFill>
                   <a:srgbClr val="FFFFFF"/>
                 </a:solidFill>
@@ -2612,7 +2616,7 @@
           <a:p>
             <a:fld id="{D7BAD4AB-A0C0-4804-835B-7CAD5144033B}" type="datetimeFigureOut">
               <a:rPr lang="en-US" smtClean="0"/>
-              <a:t>2/5/2015</a:t>
+              <a:t>2/6/2015</a:t>
             </a:fld>
             <a:endParaRPr lang="en-US"/>
           </a:p>
@@ -2821,7 +2825,7 @@
           <a:p>
             <a:fld id="{D7BAD4AB-A0C0-4804-835B-7CAD5144033B}" type="datetimeFigureOut">
               <a:rPr lang="en-US" smtClean="0"/>
-              <a:t>2/5/2015</a:t>
+              <a:t>2/6/2015</a:t>
             </a:fld>
             <a:endParaRPr lang="en-US"/>
           </a:p>
@@ -3055,7 +3059,7 @@
           <a:p>
             <a:fld id="{D7BAD4AB-A0C0-4804-835B-7CAD5144033B}" type="datetimeFigureOut">
               <a:rPr lang="en-US" smtClean="0"/>
-              <a:t>2/5/2015</a:t>
+              <a:t>2/6/2015</a:t>
             </a:fld>
             <a:endParaRPr lang="en-US"/>
           </a:p>
@@ -3510,7 +3514,7 @@
           <a:p>
             <a:fld id="{D7BAD4AB-A0C0-4804-835B-7CAD5144033B}" type="datetimeFigureOut">
               <a:rPr lang="en-US" smtClean="0"/>
-              <a:t>2/5/2015</a:t>
+              <a:t>2/6/2015</a:t>
             </a:fld>
             <a:endParaRPr lang="en-US"/>
           </a:p>
@@ -3761,7 +3765,7 @@
           <a:p>
             <a:fld id="{D7BAD4AB-A0C0-4804-835B-7CAD5144033B}" type="datetimeFigureOut">
               <a:rPr lang="en-US" smtClean="0"/>
-              <a:t>2/5/2015</a:t>
+              <a:t>2/6/2015</a:t>
             </a:fld>
             <a:endParaRPr lang="en-US"/>
           </a:p>
@@ -3971,7 +3975,7 @@
           <a:p>
             <a:fld id="{D7BAD4AB-A0C0-4804-835B-7CAD5144033B}" type="datetimeFigureOut">
               <a:rPr lang="en-US" smtClean="0"/>
-              <a:t>2/5/2015</a:t>
+              <a:t>2/6/2015</a:t>
             </a:fld>
             <a:endParaRPr lang="en-US"/>
           </a:p>
@@ -4412,7 +4416,7 @@
           <a:p>
             <a:fld id="{D7BAD4AB-A0C0-4804-835B-7CAD5144033B}" type="datetimeFigureOut">
               <a:rPr lang="en-US" smtClean="0"/>
-              <a:t>2/5/2015</a:t>
+              <a:t>2/6/2015</a:t>
             </a:fld>
             <a:endParaRPr lang="en-US"/>
           </a:p>
@@ -4643,7 +4647,7 @@
           <a:noFill/>
           <a:extLst>
             <a:ext uri="{909E8E84-426E-40dd-AFC4-6F175D3DCCD1}">
-              <a14:hiddenFill xmlns:a14="http://schemas.microsoft.com/office/drawing/2010/main" xmlns="">
+              <a14:hiddenFill xmlns="" xmlns:a14="http://schemas.microsoft.com/office/drawing/2010/main">
                 <a:solidFill>
                   <a:srgbClr val="FFFFFF"/>
                 </a:solidFill>
@@ -4791,7 +4795,7 @@
           <a:p>
             <a:fld id="{D7BAD4AB-A0C0-4804-835B-7CAD5144033B}" type="datetimeFigureOut">
               <a:rPr lang="en-US" smtClean="0"/>
-              <a:t>2/5/2015</a:t>
+              <a:t>2/6/2015</a:t>
             </a:fld>
             <a:endParaRPr lang="en-US"/>
           </a:p>
@@ -5345,6 +5349,2114 @@
 </p:sld>
 </file>
 
+<file path=ppt/slides/slide10.xml><?xml version="1.0" encoding="utf-8"?>
+<p:sld xmlns:a="http://schemas.openxmlformats.org/drawingml/2006/main" xmlns:r="http://schemas.openxmlformats.org/officeDocument/2006/relationships" xmlns:p="http://schemas.openxmlformats.org/presentationml/2006/main">
+  <p:cSld>
+    <p:spTree>
+      <p:nvGrpSpPr>
+        <p:cNvPr id="1" name=""/>
+        <p:cNvGrpSpPr/>
+        <p:nvPr/>
+      </p:nvGrpSpPr>
+      <p:grpSpPr>
+        <a:xfrm>
+          <a:off x="0" y="0"/>
+          <a:ext cx="0" cy="0"/>
+          <a:chOff x="0" y="0"/>
+          <a:chExt cx="0" cy="0"/>
+        </a:xfrm>
+      </p:grpSpPr>
+      <p:sp>
+        <p:nvSpPr>
+          <p:cNvPr id="2" name="Title 1"/>
+          <p:cNvSpPr>
+            <a:spLocks noGrp="1"/>
+          </p:cNvSpPr>
+          <p:nvPr>
+            <p:ph type="title"/>
+          </p:nvPr>
+        </p:nvSpPr>
+        <p:spPr/>
+        <p:txBody>
+          <a:bodyPr/>
+          <a:lstStyle/>
+          <a:p>
+            <a:r>
+              <a:rPr lang="en-US" dirty="0" smtClean="0"/>
+              <a:t>SIMD.JS – API Details</a:t>
+            </a:r>
+            <a:endParaRPr lang="en-US" dirty="0"/>
+          </a:p>
+        </p:txBody>
+      </p:sp>
+      <p:sp>
+        <p:nvSpPr>
+          <p:cNvPr id="3" name="Content Placeholder 2"/>
+          <p:cNvSpPr>
+            <a:spLocks noGrp="1"/>
+          </p:cNvSpPr>
+          <p:nvPr>
+            <p:ph sz="quarter" idx="13"/>
+          </p:nvPr>
+        </p:nvSpPr>
+        <p:spPr>
+          <a:xfrm>
+            <a:off x="607484" y="1163782"/>
+            <a:ext cx="10970683" cy="5008419"/>
+          </a:xfrm>
+        </p:spPr>
+        <p:txBody>
+          <a:bodyPr>
+            <a:normAutofit fontScale="85000" lnSpcReduction="20000"/>
+          </a:bodyPr>
+          <a:lstStyle/>
+          <a:p>
+            <a:r>
+              <a:rPr lang="en-US" dirty="0" smtClean="0"/>
+              <a:t>Lane </a:t>
+            </a:r>
+            <a:r>
+              <a:rPr lang="en-US" dirty="0" err="1" smtClean="0"/>
+              <a:t>accessors</a:t>
+            </a:r>
+            <a:r>
+              <a:rPr lang="en-US" dirty="0" smtClean="0"/>
+              <a:t>, </a:t>
+            </a:r>
+            <a:r>
+              <a:rPr lang="en-US" dirty="0" err="1" smtClean="0"/>
+              <a:t>mutators</a:t>
+            </a:r>
+            <a:r>
+              <a:rPr lang="en-US" dirty="0" smtClean="0"/>
+              <a:t>:</a:t>
+            </a:r>
+          </a:p>
+          <a:p>
+            <a:pPr lvl="1"/>
+            <a:r>
+              <a:rPr lang="en-US" b="1" dirty="0" err="1" smtClean="0"/>
+              <a:t>Accessors</a:t>
+            </a:r>
+            <a:r>
+              <a:rPr lang="en-US" b="1" dirty="0" smtClean="0"/>
+              <a:t>:</a:t>
+            </a:r>
+            <a:r>
+              <a:rPr lang="en-US" dirty="0" smtClean="0"/>
+              <a:t> x, y, z, w</a:t>
+            </a:r>
+          </a:p>
+          <a:p>
+            <a:pPr lvl="1"/>
+            <a:r>
+              <a:rPr lang="en-US" b="1" dirty="0" err="1" smtClean="0"/>
+              <a:t>Mutators</a:t>
+            </a:r>
+            <a:r>
+              <a:rPr lang="en-US" b="1" dirty="0" smtClean="0"/>
+              <a:t>:</a:t>
+            </a:r>
+            <a:r>
+              <a:rPr lang="en-US" dirty="0" smtClean="0"/>
+              <a:t> </a:t>
+            </a:r>
+            <a:r>
+              <a:rPr lang="en-US" dirty="0" err="1" smtClean="0"/>
+              <a:t>withX</a:t>
+            </a:r>
+            <a:r>
+              <a:rPr lang="en-US" dirty="0" smtClean="0"/>
+              <a:t>, </a:t>
+            </a:r>
+            <a:r>
+              <a:rPr lang="en-US" dirty="0" err="1" smtClean="0"/>
+              <a:t>withY</a:t>
+            </a:r>
+            <a:r>
+              <a:rPr lang="en-US" dirty="0" smtClean="0"/>
+              <a:t>, </a:t>
+            </a:r>
+            <a:r>
+              <a:rPr lang="en-US" dirty="0" err="1" smtClean="0"/>
+              <a:t>withZ</a:t>
+            </a:r>
+            <a:r>
+              <a:rPr lang="en-US" dirty="0" smtClean="0"/>
+              <a:t>, </a:t>
+            </a:r>
+            <a:r>
+              <a:rPr lang="en-US" dirty="0" err="1" smtClean="0"/>
+              <a:t>withW</a:t>
+            </a:r>
+            <a:endParaRPr lang="en-US" dirty="0" smtClean="0"/>
+          </a:p>
+          <a:p>
+            <a:r>
+              <a:rPr lang="en-US" dirty="0" smtClean="0"/>
+              <a:t>Operators:</a:t>
+            </a:r>
+          </a:p>
+          <a:p>
+            <a:pPr lvl="1"/>
+            <a:r>
+              <a:rPr lang="en-US" b="1" dirty="0" smtClean="0"/>
+              <a:t>Arithmetic:</a:t>
+            </a:r>
+            <a:r>
+              <a:rPr lang="en-US" dirty="0" smtClean="0"/>
+              <a:t> abs, </a:t>
+            </a:r>
+            <a:r>
+              <a:rPr lang="en-US" dirty="0" err="1" smtClean="0"/>
+              <a:t>neg</a:t>
+            </a:r>
+            <a:r>
+              <a:rPr lang="en-US" dirty="0" smtClean="0"/>
+              <a:t>, add, sub, </a:t>
+            </a:r>
+            <a:r>
+              <a:rPr lang="en-US" dirty="0" err="1" smtClean="0"/>
+              <a:t>mul</a:t>
+            </a:r>
+            <a:r>
+              <a:rPr lang="en-US" dirty="0" smtClean="0"/>
+              <a:t>, div, reciprocal, </a:t>
+            </a:r>
+            <a:r>
+              <a:rPr lang="en-US" dirty="0" err="1" smtClean="0"/>
+              <a:t>reciprocalSqrt</a:t>
+            </a:r>
+            <a:r>
+              <a:rPr lang="en-US" dirty="0" smtClean="0"/>
+              <a:t>, </a:t>
+            </a:r>
+            <a:r>
+              <a:rPr lang="en-US" dirty="0" err="1" smtClean="0"/>
+              <a:t>sqrt</a:t>
+            </a:r>
+            <a:endParaRPr lang="en-US" dirty="0" smtClean="0"/>
+          </a:p>
+          <a:p>
+            <a:pPr lvl="1"/>
+            <a:r>
+              <a:rPr lang="en-US" b="1" dirty="0" smtClean="0"/>
+              <a:t>Shuffle:</a:t>
+            </a:r>
+            <a:r>
+              <a:rPr lang="en-US" dirty="0" smtClean="0"/>
+              <a:t> swizzle (</a:t>
+            </a:r>
+            <a:r>
+              <a:rPr lang="en-US" dirty="0"/>
+              <a:t>1</a:t>
+            </a:r>
+            <a:r>
+              <a:rPr lang="en-US" dirty="0" smtClean="0"/>
+              <a:t> operand), shuffle (2 operands)</a:t>
+            </a:r>
+          </a:p>
+          <a:p>
+            <a:pPr lvl="1"/>
+            <a:r>
+              <a:rPr lang="en-US" b="1" dirty="0" smtClean="0"/>
+              <a:t>Logical:</a:t>
+            </a:r>
+            <a:r>
+              <a:rPr lang="en-US" dirty="0" smtClean="0"/>
+              <a:t> and, or, </a:t>
+            </a:r>
+            <a:r>
+              <a:rPr lang="en-US" dirty="0" err="1" smtClean="0"/>
+              <a:t>xor</a:t>
+            </a:r>
+            <a:r>
+              <a:rPr lang="en-US" dirty="0" smtClean="0"/>
+              <a:t>, not</a:t>
+            </a:r>
+          </a:p>
+          <a:p>
+            <a:pPr lvl="1"/>
+            <a:r>
+              <a:rPr lang="en-US" b="1" dirty="0" smtClean="0"/>
+              <a:t>Comparison:</a:t>
+            </a:r>
+            <a:r>
+              <a:rPr lang="en-US" dirty="0" smtClean="0"/>
+              <a:t> equal, </a:t>
+            </a:r>
+            <a:r>
+              <a:rPr lang="en-US" dirty="0" err="1" smtClean="0"/>
+              <a:t>greaterThan</a:t>
+            </a:r>
+            <a:r>
+              <a:rPr lang="en-US" dirty="0" smtClean="0"/>
+              <a:t>, </a:t>
+            </a:r>
+            <a:r>
+              <a:rPr lang="en-US" dirty="0" err="1" smtClean="0"/>
+              <a:t>LessThan</a:t>
+            </a:r>
+            <a:endParaRPr lang="en-US" dirty="0" smtClean="0"/>
+          </a:p>
+          <a:p>
+            <a:pPr lvl="1"/>
+            <a:r>
+              <a:rPr lang="en-US" b="1" dirty="0" smtClean="0"/>
+              <a:t>Shifts:</a:t>
+            </a:r>
+            <a:r>
+              <a:rPr lang="en-US" dirty="0" smtClean="0"/>
+              <a:t> </a:t>
+            </a:r>
+            <a:r>
+              <a:rPr lang="en-US" dirty="0" err="1" smtClean="0"/>
+              <a:t>shiftRightLogicalByScalar</a:t>
+            </a:r>
+            <a:r>
+              <a:rPr lang="en-US" dirty="0" smtClean="0"/>
+              <a:t>, </a:t>
+            </a:r>
+            <a:r>
+              <a:rPr lang="en-US" dirty="0" err="1" smtClean="0"/>
+              <a:t>shiftRightArithmeticByScalar</a:t>
+            </a:r>
+            <a:r>
+              <a:rPr lang="en-US" dirty="0" smtClean="0"/>
+              <a:t>, </a:t>
+            </a:r>
+            <a:r>
+              <a:rPr lang="en-US" dirty="0" err="1" smtClean="0"/>
+              <a:t>shiftLeftByScalar</a:t>
+            </a:r>
+            <a:endParaRPr lang="en-US" dirty="0" smtClean="0"/>
+          </a:p>
+          <a:p>
+            <a:pPr lvl="1"/>
+            <a:r>
+              <a:rPr lang="en-US" b="1" dirty="0" smtClean="0"/>
+              <a:t>Conversion:</a:t>
+            </a:r>
+            <a:r>
+              <a:rPr lang="en-US" dirty="0" smtClean="0"/>
+              <a:t> fromInt32x4, fromInt32x4Bits, etc.</a:t>
+            </a:r>
+          </a:p>
+          <a:p>
+            <a:pPr lvl="1"/>
+            <a:r>
+              <a:rPr lang="en-US" b="1" dirty="0" smtClean="0"/>
+              <a:t>Min/Max:</a:t>
+            </a:r>
+            <a:r>
+              <a:rPr lang="en-US" dirty="0" smtClean="0"/>
+              <a:t> min, </a:t>
+            </a:r>
+            <a:r>
+              <a:rPr lang="en-US" dirty="0" err="1" smtClean="0"/>
+              <a:t>minNum</a:t>
+            </a:r>
+            <a:r>
+              <a:rPr lang="en-US" dirty="0" smtClean="0"/>
+              <a:t>, max, </a:t>
+            </a:r>
+            <a:r>
+              <a:rPr lang="en-US" dirty="0" err="1" smtClean="0"/>
+              <a:t>maxNum</a:t>
+            </a:r>
+            <a:endParaRPr lang="en-US" dirty="0" smtClean="0"/>
+          </a:p>
+          <a:p>
+            <a:pPr lvl="1"/>
+            <a:endParaRPr lang="en-US" dirty="0"/>
+          </a:p>
+        </p:txBody>
+      </p:sp>
+    </p:spTree>
+    <p:extLst>
+      <p:ext uri="{BB962C8B-B14F-4D97-AF65-F5344CB8AC3E}">
+        <p14:creationId xmlns:p14="http://schemas.microsoft.com/office/powerpoint/2010/main" val="891530144"/>
+      </p:ext>
+    </p:extLst>
+  </p:cSld>
+  <p:clrMapOvr>
+    <a:masterClrMapping/>
+  </p:clrMapOvr>
+</p:sld>
+</file>
+
+<file path=ppt/slides/slide11.xml><?xml version="1.0" encoding="utf-8"?>
+<p:sld xmlns:a="http://schemas.openxmlformats.org/drawingml/2006/main" xmlns:r="http://schemas.openxmlformats.org/officeDocument/2006/relationships" xmlns:p="http://schemas.openxmlformats.org/presentationml/2006/main">
+  <p:cSld>
+    <p:spTree>
+      <p:nvGrpSpPr>
+        <p:cNvPr id="1" name=""/>
+        <p:cNvGrpSpPr/>
+        <p:nvPr/>
+      </p:nvGrpSpPr>
+      <p:grpSpPr>
+        <a:xfrm>
+          <a:off x="0" y="0"/>
+          <a:ext cx="0" cy="0"/>
+          <a:chOff x="0" y="0"/>
+          <a:chExt cx="0" cy="0"/>
+        </a:xfrm>
+      </p:grpSpPr>
+      <p:sp>
+        <p:nvSpPr>
+          <p:cNvPr id="2" name="Title 1"/>
+          <p:cNvSpPr>
+            <a:spLocks noGrp="1"/>
+          </p:cNvSpPr>
+          <p:nvPr>
+            <p:ph type="title"/>
+          </p:nvPr>
+        </p:nvSpPr>
+        <p:spPr/>
+        <p:txBody>
+          <a:bodyPr/>
+          <a:lstStyle/>
+          <a:p>
+            <a:r>
+              <a:rPr lang="en-US" dirty="0" smtClean="0"/>
+              <a:t>SIMD.JS – Example Usage - Mandelbrot</a:t>
+            </a:r>
+            <a:endParaRPr lang="en-US" dirty="0"/>
+          </a:p>
+        </p:txBody>
+      </p:sp>
+      <p:sp>
+        <p:nvSpPr>
+          <p:cNvPr id="4" name="TextBox 3"/>
+          <p:cNvSpPr txBox="1"/>
+          <p:nvPr/>
+        </p:nvSpPr>
+        <p:spPr>
+          <a:xfrm>
+            <a:off x="178129" y="1570036"/>
+            <a:ext cx="3966359" cy="4708981"/>
+          </a:xfrm>
+          <a:prstGeom prst="rect">
+            <a:avLst/>
+          </a:prstGeom>
+          <a:noFill/>
+        </p:spPr>
+        <p:txBody>
+          <a:bodyPr wrap="square" rtlCol="0">
+            <a:spAutoFit/>
+          </a:bodyPr>
+          <a:lstStyle/>
+          <a:p>
+            <a:r>
+              <a:rPr lang="en-US" sz="1200" dirty="0">
+                <a:solidFill>
+                  <a:schemeClr val="tx2"/>
+                </a:solidFill>
+                <a:latin typeface="Lucida Console" panose="020B0609040504020204" pitchFamily="49" charset="0"/>
+                <a:cs typeface="Neo Sans Intel"/>
+              </a:rPr>
+              <a:t>//</a:t>
+            </a:r>
+          </a:p>
+          <a:p>
+            <a:r>
+              <a:rPr lang="en-US" sz="1200" dirty="0">
+                <a:solidFill>
+                  <a:schemeClr val="tx2"/>
+                </a:solidFill>
+                <a:latin typeface="Lucida Console" panose="020B0609040504020204" pitchFamily="49" charset="0"/>
+                <a:cs typeface="Neo Sans Intel"/>
+              </a:rPr>
+              <a:t>// z(i+1) = z(i)^2 + c</a:t>
+            </a:r>
+          </a:p>
+          <a:p>
+            <a:r>
+              <a:rPr lang="en-US" sz="1200" dirty="0">
+                <a:solidFill>
+                  <a:schemeClr val="tx2"/>
+                </a:solidFill>
+                <a:latin typeface="Lucida Console" panose="020B0609040504020204" pitchFamily="49" charset="0"/>
+                <a:cs typeface="Neo Sans Intel"/>
+              </a:rPr>
+              <a:t>// terminate when |</a:t>
+            </a:r>
+            <a:r>
+              <a:rPr lang="en-US" sz="1200" dirty="0" smtClean="0">
+                <a:solidFill>
+                  <a:schemeClr val="tx2"/>
+                </a:solidFill>
+                <a:latin typeface="Lucida Console" panose="020B0609040504020204" pitchFamily="49" charset="0"/>
+                <a:cs typeface="Neo Sans Intel"/>
+              </a:rPr>
+              <a:t>z|^2 </a:t>
+            </a:r>
+            <a:r>
+              <a:rPr lang="en-US" sz="1200" dirty="0">
+                <a:solidFill>
+                  <a:schemeClr val="tx2"/>
+                </a:solidFill>
+                <a:latin typeface="Lucida Console" panose="020B0609040504020204" pitchFamily="49" charset="0"/>
+                <a:cs typeface="Neo Sans Intel"/>
+              </a:rPr>
+              <a:t>&gt; </a:t>
+            </a:r>
+            <a:r>
+              <a:rPr lang="en-US" sz="1200" dirty="0" smtClean="0">
+                <a:solidFill>
+                  <a:schemeClr val="tx2"/>
+                </a:solidFill>
+                <a:latin typeface="Lucida Console" panose="020B0609040504020204" pitchFamily="49" charset="0"/>
+                <a:cs typeface="Neo Sans Intel"/>
+              </a:rPr>
+              <a:t>4.0</a:t>
+            </a:r>
+            <a:endParaRPr lang="en-US" sz="1200" dirty="0">
+              <a:solidFill>
+                <a:schemeClr val="tx2"/>
+              </a:solidFill>
+              <a:latin typeface="Lucida Console" panose="020B0609040504020204" pitchFamily="49" charset="0"/>
+              <a:cs typeface="Neo Sans Intel"/>
+            </a:endParaRPr>
+          </a:p>
+          <a:p>
+            <a:r>
+              <a:rPr lang="en-US" sz="1200" dirty="0">
+                <a:solidFill>
+                  <a:schemeClr val="tx2"/>
+                </a:solidFill>
+                <a:latin typeface="Lucida Console" panose="020B0609040504020204" pitchFamily="49" charset="0"/>
+                <a:cs typeface="Neo Sans Intel"/>
+              </a:rPr>
+              <a:t>// returns 1 iteration count</a:t>
+            </a:r>
+          </a:p>
+          <a:p>
+            <a:r>
+              <a:rPr lang="en-US" sz="1200" dirty="0">
+                <a:solidFill>
+                  <a:schemeClr val="tx2"/>
+                </a:solidFill>
+                <a:latin typeface="Lucida Console" panose="020B0609040504020204" pitchFamily="49" charset="0"/>
+                <a:cs typeface="Neo Sans Intel"/>
+              </a:rPr>
+              <a:t>//</a:t>
+            </a:r>
+          </a:p>
+          <a:p>
+            <a:r>
+              <a:rPr lang="en-US" sz="1200" dirty="0">
+                <a:solidFill>
+                  <a:schemeClr val="tx2"/>
+                </a:solidFill>
+                <a:latin typeface="Lucida Console" panose="020B0609040504020204" pitchFamily="49" charset="0"/>
+                <a:cs typeface="Neo Sans Intel"/>
+              </a:rPr>
+              <a:t>function mandelx1 (</a:t>
+            </a:r>
+            <a:r>
+              <a:rPr lang="en-US" sz="1200" dirty="0" err="1">
+                <a:solidFill>
+                  <a:schemeClr val="tx2"/>
+                </a:solidFill>
+                <a:latin typeface="Lucida Console" panose="020B0609040504020204" pitchFamily="49" charset="0"/>
+                <a:cs typeface="Neo Sans Intel"/>
+              </a:rPr>
+              <a:t>c_re</a:t>
+            </a:r>
+            <a:r>
+              <a:rPr lang="en-US" sz="1200" dirty="0">
+                <a:solidFill>
+                  <a:schemeClr val="tx2"/>
+                </a:solidFill>
+                <a:latin typeface="Lucida Console" panose="020B0609040504020204" pitchFamily="49" charset="0"/>
+                <a:cs typeface="Neo Sans Intel"/>
+              </a:rPr>
+              <a:t>, </a:t>
+            </a:r>
+            <a:r>
+              <a:rPr lang="en-US" sz="1200" dirty="0" err="1">
+                <a:solidFill>
+                  <a:schemeClr val="tx2"/>
+                </a:solidFill>
+                <a:latin typeface="Lucida Console" panose="020B0609040504020204" pitchFamily="49" charset="0"/>
+                <a:cs typeface="Neo Sans Intel"/>
+              </a:rPr>
+              <a:t>c_im</a:t>
+            </a:r>
+            <a:r>
+              <a:rPr lang="en-US" sz="1200" dirty="0">
+                <a:solidFill>
+                  <a:schemeClr val="tx2"/>
+                </a:solidFill>
+                <a:latin typeface="Lucida Console" panose="020B0609040504020204" pitchFamily="49" charset="0"/>
+                <a:cs typeface="Neo Sans Intel"/>
+              </a:rPr>
+              <a:t>) {</a:t>
+            </a:r>
+          </a:p>
+          <a:p>
+            <a:r>
+              <a:rPr lang="en-US" sz="1200" dirty="0">
+                <a:solidFill>
+                  <a:schemeClr val="tx2"/>
+                </a:solidFill>
+                <a:latin typeface="Lucida Console" panose="020B0609040504020204" pitchFamily="49" charset="0"/>
+                <a:cs typeface="Neo Sans Intel"/>
+              </a:rPr>
+              <a:t>  </a:t>
+            </a:r>
+            <a:r>
+              <a:rPr lang="en-US" sz="1200" dirty="0" err="1">
+                <a:solidFill>
+                  <a:schemeClr val="tx2"/>
+                </a:solidFill>
+                <a:latin typeface="Lucida Console" panose="020B0609040504020204" pitchFamily="49" charset="0"/>
+                <a:cs typeface="Neo Sans Intel"/>
+              </a:rPr>
+              <a:t>var</a:t>
+            </a:r>
+            <a:r>
+              <a:rPr lang="en-US" sz="1200" dirty="0">
+                <a:solidFill>
+                  <a:schemeClr val="tx2"/>
+                </a:solidFill>
+                <a:latin typeface="Lucida Console" panose="020B0609040504020204" pitchFamily="49" charset="0"/>
+                <a:cs typeface="Neo Sans Intel"/>
+              </a:rPr>
+              <a:t> </a:t>
+            </a:r>
+            <a:r>
+              <a:rPr lang="en-US" sz="1200" dirty="0" err="1">
+                <a:solidFill>
+                  <a:schemeClr val="tx2"/>
+                </a:solidFill>
+                <a:latin typeface="Lucida Console" panose="020B0609040504020204" pitchFamily="49" charset="0"/>
+                <a:cs typeface="Neo Sans Intel"/>
+              </a:rPr>
+              <a:t>z_re</a:t>
+            </a:r>
+            <a:r>
+              <a:rPr lang="en-US" sz="1200" dirty="0">
+                <a:solidFill>
+                  <a:schemeClr val="tx2"/>
+                </a:solidFill>
+                <a:latin typeface="Lucida Console" panose="020B0609040504020204" pitchFamily="49" charset="0"/>
+                <a:cs typeface="Neo Sans Intel"/>
+              </a:rPr>
+              <a:t> = </a:t>
+            </a:r>
+            <a:r>
+              <a:rPr lang="en-US" sz="1200" dirty="0" err="1">
+                <a:solidFill>
+                  <a:schemeClr val="tx2"/>
+                </a:solidFill>
+                <a:latin typeface="Lucida Console" panose="020B0609040504020204" pitchFamily="49" charset="0"/>
+                <a:cs typeface="Neo Sans Intel"/>
+              </a:rPr>
+              <a:t>c_re</a:t>
+            </a:r>
+            <a:r>
+              <a:rPr lang="en-US" sz="1200" dirty="0">
+                <a:solidFill>
+                  <a:schemeClr val="tx2"/>
+                </a:solidFill>
+                <a:latin typeface="Lucida Console" panose="020B0609040504020204" pitchFamily="49" charset="0"/>
+                <a:cs typeface="Neo Sans Intel"/>
+              </a:rPr>
+              <a:t>, </a:t>
+            </a:r>
+            <a:r>
+              <a:rPr lang="en-US" sz="1200" dirty="0" err="1">
+                <a:solidFill>
+                  <a:schemeClr val="tx2"/>
+                </a:solidFill>
+                <a:latin typeface="Lucida Console" panose="020B0609040504020204" pitchFamily="49" charset="0"/>
+                <a:cs typeface="Neo Sans Intel"/>
+              </a:rPr>
+              <a:t>z_im</a:t>
+            </a:r>
+            <a:r>
+              <a:rPr lang="en-US" sz="1200" dirty="0">
+                <a:solidFill>
+                  <a:schemeClr val="tx2"/>
+                </a:solidFill>
+                <a:latin typeface="Lucida Console" panose="020B0609040504020204" pitchFamily="49" charset="0"/>
+                <a:cs typeface="Neo Sans Intel"/>
+              </a:rPr>
+              <a:t> = </a:t>
+            </a:r>
+            <a:r>
+              <a:rPr lang="en-US" sz="1200" dirty="0" err="1">
+                <a:solidFill>
+                  <a:schemeClr val="tx2"/>
+                </a:solidFill>
+                <a:latin typeface="Lucida Console" panose="020B0609040504020204" pitchFamily="49" charset="0"/>
+                <a:cs typeface="Neo Sans Intel"/>
+              </a:rPr>
+              <a:t>c_im</a:t>
+            </a:r>
+            <a:r>
+              <a:rPr lang="en-US" sz="1200" dirty="0">
+                <a:solidFill>
+                  <a:schemeClr val="tx2"/>
+                </a:solidFill>
+                <a:latin typeface="Lucida Console" panose="020B0609040504020204" pitchFamily="49" charset="0"/>
+                <a:cs typeface="Neo Sans Intel"/>
+              </a:rPr>
+              <a:t>, i;</a:t>
+            </a:r>
+          </a:p>
+          <a:p>
+            <a:endParaRPr lang="en-US" sz="1200" dirty="0" smtClean="0">
+              <a:solidFill>
+                <a:schemeClr val="tx2"/>
+              </a:solidFill>
+              <a:latin typeface="Lucida Console" panose="020B0609040504020204" pitchFamily="49" charset="0"/>
+              <a:cs typeface="Neo Sans Intel"/>
+            </a:endParaRPr>
+          </a:p>
+          <a:p>
+            <a:r>
+              <a:rPr lang="en-US" sz="1200" dirty="0" smtClean="0">
+                <a:solidFill>
+                  <a:schemeClr val="tx2"/>
+                </a:solidFill>
+                <a:latin typeface="Lucida Console" panose="020B0609040504020204" pitchFamily="49" charset="0"/>
+                <a:cs typeface="Neo Sans Intel"/>
+              </a:rPr>
+              <a:t>  </a:t>
+            </a:r>
+            <a:endParaRPr lang="en-US" sz="1200" dirty="0">
+              <a:solidFill>
+                <a:schemeClr val="tx2"/>
+              </a:solidFill>
+              <a:latin typeface="Lucida Console" panose="020B0609040504020204" pitchFamily="49" charset="0"/>
+              <a:cs typeface="Neo Sans Intel"/>
+            </a:endParaRPr>
+          </a:p>
+          <a:p>
+            <a:r>
+              <a:rPr lang="en-US" sz="1200" dirty="0">
+                <a:solidFill>
+                  <a:schemeClr val="tx2"/>
+                </a:solidFill>
+                <a:latin typeface="Lucida Console" panose="020B0609040504020204" pitchFamily="49" charset="0"/>
+                <a:cs typeface="Neo Sans Intel"/>
+              </a:rPr>
+              <a:t>  for (i = 0; i &lt; </a:t>
+            </a:r>
+            <a:r>
+              <a:rPr lang="en-US" sz="1200" dirty="0" err="1">
+                <a:solidFill>
+                  <a:schemeClr val="tx2"/>
+                </a:solidFill>
+                <a:latin typeface="Lucida Console" panose="020B0609040504020204" pitchFamily="49" charset="0"/>
+                <a:cs typeface="Neo Sans Intel"/>
+              </a:rPr>
+              <a:t>max_iterations</a:t>
+            </a:r>
+            <a:r>
+              <a:rPr lang="en-US" sz="1200" dirty="0">
+                <a:solidFill>
+                  <a:schemeClr val="tx2"/>
+                </a:solidFill>
+                <a:latin typeface="Lucida Console" panose="020B0609040504020204" pitchFamily="49" charset="0"/>
+                <a:cs typeface="Neo Sans Intel"/>
+              </a:rPr>
+              <a:t>; ++i) {</a:t>
+            </a:r>
+          </a:p>
+          <a:p>
+            <a:r>
+              <a:rPr lang="en-US" sz="1200" dirty="0">
+                <a:solidFill>
+                  <a:schemeClr val="tx2"/>
+                </a:solidFill>
+                <a:latin typeface="Lucida Console" panose="020B0609040504020204" pitchFamily="49" charset="0"/>
+                <a:cs typeface="Neo Sans Intel"/>
+              </a:rPr>
+              <a:t>    </a:t>
+            </a:r>
+            <a:r>
+              <a:rPr lang="en-US" sz="1200" dirty="0" err="1">
+                <a:solidFill>
+                  <a:schemeClr val="tx2"/>
+                </a:solidFill>
+                <a:latin typeface="Lucida Console" panose="020B0609040504020204" pitchFamily="49" charset="0"/>
+                <a:cs typeface="Neo Sans Intel"/>
+              </a:rPr>
+              <a:t>var</a:t>
+            </a:r>
+            <a:r>
+              <a:rPr lang="en-US" sz="1200" dirty="0">
+                <a:solidFill>
+                  <a:schemeClr val="tx2"/>
+                </a:solidFill>
+                <a:latin typeface="Lucida Console" panose="020B0609040504020204" pitchFamily="49" charset="0"/>
+                <a:cs typeface="Neo Sans Intel"/>
+              </a:rPr>
+              <a:t> z_re2 = </a:t>
+            </a:r>
+            <a:r>
+              <a:rPr lang="en-US" sz="1200" dirty="0" err="1">
+                <a:solidFill>
+                  <a:schemeClr val="tx2"/>
+                </a:solidFill>
+                <a:latin typeface="Lucida Console" panose="020B0609040504020204" pitchFamily="49" charset="0"/>
+                <a:cs typeface="Neo Sans Intel"/>
+              </a:rPr>
+              <a:t>z_re</a:t>
+            </a:r>
+            <a:r>
+              <a:rPr lang="en-US" sz="1200" dirty="0">
+                <a:solidFill>
+                  <a:schemeClr val="tx2"/>
+                </a:solidFill>
+                <a:latin typeface="Lucida Console" panose="020B0609040504020204" pitchFamily="49" charset="0"/>
+                <a:cs typeface="Neo Sans Intel"/>
+              </a:rPr>
+              <a:t>*</a:t>
+            </a:r>
+            <a:r>
+              <a:rPr lang="en-US" sz="1200" dirty="0" err="1">
+                <a:solidFill>
+                  <a:schemeClr val="tx2"/>
+                </a:solidFill>
+                <a:latin typeface="Lucida Console" panose="020B0609040504020204" pitchFamily="49" charset="0"/>
+                <a:cs typeface="Neo Sans Intel"/>
+              </a:rPr>
+              <a:t>z_re</a:t>
+            </a:r>
+            <a:r>
+              <a:rPr lang="en-US" sz="1200" dirty="0">
+                <a:solidFill>
+                  <a:schemeClr val="tx2"/>
+                </a:solidFill>
+                <a:latin typeface="Lucida Console" panose="020B0609040504020204" pitchFamily="49" charset="0"/>
+                <a:cs typeface="Neo Sans Intel"/>
+              </a:rPr>
+              <a:t>;</a:t>
+            </a:r>
+          </a:p>
+          <a:p>
+            <a:r>
+              <a:rPr lang="en-US" sz="1200" dirty="0">
+                <a:solidFill>
+                  <a:schemeClr val="tx2"/>
+                </a:solidFill>
+                <a:latin typeface="Lucida Console" panose="020B0609040504020204" pitchFamily="49" charset="0"/>
+                <a:cs typeface="Neo Sans Intel"/>
+              </a:rPr>
+              <a:t>    </a:t>
+            </a:r>
+            <a:r>
+              <a:rPr lang="en-US" sz="1200" dirty="0" err="1">
+                <a:solidFill>
+                  <a:schemeClr val="tx2"/>
+                </a:solidFill>
+                <a:latin typeface="Lucida Console" panose="020B0609040504020204" pitchFamily="49" charset="0"/>
+                <a:cs typeface="Neo Sans Intel"/>
+              </a:rPr>
+              <a:t>var</a:t>
+            </a:r>
+            <a:r>
+              <a:rPr lang="en-US" sz="1200" dirty="0">
+                <a:solidFill>
+                  <a:schemeClr val="tx2"/>
+                </a:solidFill>
+                <a:latin typeface="Lucida Console" panose="020B0609040504020204" pitchFamily="49" charset="0"/>
+                <a:cs typeface="Neo Sans Intel"/>
+              </a:rPr>
+              <a:t> z_im2 = </a:t>
+            </a:r>
+            <a:r>
+              <a:rPr lang="en-US" sz="1200" dirty="0" err="1">
+                <a:solidFill>
+                  <a:schemeClr val="tx2"/>
+                </a:solidFill>
+                <a:latin typeface="Lucida Console" panose="020B0609040504020204" pitchFamily="49" charset="0"/>
+                <a:cs typeface="Neo Sans Intel"/>
+              </a:rPr>
+              <a:t>z_im</a:t>
+            </a:r>
+            <a:r>
+              <a:rPr lang="en-US" sz="1200" dirty="0">
+                <a:solidFill>
+                  <a:schemeClr val="tx2"/>
+                </a:solidFill>
+                <a:latin typeface="Lucida Console" panose="020B0609040504020204" pitchFamily="49" charset="0"/>
+                <a:cs typeface="Neo Sans Intel"/>
+              </a:rPr>
+              <a:t>*</a:t>
+            </a:r>
+            <a:r>
+              <a:rPr lang="en-US" sz="1200" dirty="0" err="1">
+                <a:solidFill>
+                  <a:schemeClr val="tx2"/>
+                </a:solidFill>
+                <a:latin typeface="Lucida Console" panose="020B0609040504020204" pitchFamily="49" charset="0"/>
+                <a:cs typeface="Neo Sans Intel"/>
+              </a:rPr>
+              <a:t>z_im</a:t>
+            </a:r>
+            <a:r>
+              <a:rPr lang="en-US" sz="1200" dirty="0" smtClean="0">
+                <a:solidFill>
+                  <a:schemeClr val="tx2"/>
+                </a:solidFill>
+                <a:latin typeface="Lucida Console" panose="020B0609040504020204" pitchFamily="49" charset="0"/>
+                <a:cs typeface="Neo Sans Intel"/>
+              </a:rPr>
+              <a:t>;</a:t>
+            </a:r>
+          </a:p>
+          <a:p>
+            <a:endParaRPr lang="en-US" sz="1200" dirty="0" smtClean="0">
+              <a:solidFill>
+                <a:schemeClr val="tx2"/>
+              </a:solidFill>
+              <a:latin typeface="Lucida Console" panose="020B0609040504020204" pitchFamily="49" charset="0"/>
+              <a:cs typeface="Neo Sans Intel"/>
+            </a:endParaRPr>
+          </a:p>
+          <a:p>
+            <a:r>
+              <a:rPr lang="en-US" sz="1200" dirty="0" smtClean="0">
+                <a:solidFill>
+                  <a:schemeClr val="tx2"/>
+                </a:solidFill>
+                <a:latin typeface="Lucida Console" panose="020B0609040504020204" pitchFamily="49" charset="0"/>
+                <a:cs typeface="Neo Sans Intel"/>
+              </a:rPr>
+              <a:t>    if </a:t>
+            </a:r>
+            <a:r>
+              <a:rPr lang="en-US" sz="1200" dirty="0">
+                <a:solidFill>
+                  <a:schemeClr val="tx2"/>
+                </a:solidFill>
+                <a:latin typeface="Lucida Console" panose="020B0609040504020204" pitchFamily="49" charset="0"/>
+                <a:cs typeface="Neo Sans Intel"/>
+              </a:rPr>
+              <a:t>(z_re2 + z_im2 &gt; 4.0) {</a:t>
+            </a:r>
+          </a:p>
+          <a:p>
+            <a:r>
+              <a:rPr lang="en-US" sz="1200" dirty="0" smtClean="0">
+                <a:solidFill>
+                  <a:schemeClr val="tx2"/>
+                </a:solidFill>
+                <a:latin typeface="Lucida Console" panose="020B0609040504020204" pitchFamily="49" charset="0"/>
+                <a:cs typeface="Neo Sans Intel"/>
+              </a:rPr>
+              <a:t>      </a:t>
+            </a:r>
+            <a:r>
+              <a:rPr lang="en-US" sz="1200" dirty="0">
+                <a:solidFill>
+                  <a:schemeClr val="tx2"/>
+                </a:solidFill>
+                <a:latin typeface="Lucida Console" panose="020B0609040504020204" pitchFamily="49" charset="0"/>
+                <a:cs typeface="Neo Sans Intel"/>
+              </a:rPr>
+              <a:t>// iteration has </a:t>
+            </a:r>
+            <a:r>
+              <a:rPr lang="en-US" sz="1200" dirty="0" smtClean="0">
+                <a:solidFill>
+                  <a:schemeClr val="tx2"/>
+                </a:solidFill>
+                <a:latin typeface="Lucida Console" panose="020B0609040504020204" pitchFamily="49" charset="0"/>
+                <a:cs typeface="Neo Sans Intel"/>
+              </a:rPr>
+              <a:t>diverged</a:t>
+            </a:r>
+          </a:p>
+          <a:p>
+            <a:r>
+              <a:rPr lang="en-US" sz="1200" dirty="0" smtClean="0">
+                <a:solidFill>
+                  <a:schemeClr val="tx2"/>
+                </a:solidFill>
+                <a:latin typeface="Lucida Console" panose="020B0609040504020204" pitchFamily="49" charset="0"/>
+                <a:cs typeface="Neo Sans Intel"/>
+              </a:rPr>
+              <a:t>      </a:t>
+            </a:r>
+            <a:r>
+              <a:rPr lang="en-US" sz="1200" dirty="0">
+                <a:solidFill>
+                  <a:schemeClr val="tx2"/>
+                </a:solidFill>
+                <a:latin typeface="Lucida Console" panose="020B0609040504020204" pitchFamily="49" charset="0"/>
+                <a:cs typeface="Neo Sans Intel"/>
+              </a:rPr>
+              <a:t>break;</a:t>
+            </a:r>
+          </a:p>
+          <a:p>
+            <a:r>
+              <a:rPr lang="en-US" sz="1200" dirty="0">
+                <a:solidFill>
+                  <a:schemeClr val="tx2"/>
+                </a:solidFill>
+                <a:latin typeface="Lucida Console" panose="020B0609040504020204" pitchFamily="49" charset="0"/>
+                <a:cs typeface="Neo Sans Intel"/>
+              </a:rPr>
+              <a:t>    }</a:t>
+            </a:r>
+          </a:p>
+          <a:p>
+            <a:r>
+              <a:rPr lang="en-US" sz="1200" dirty="0" smtClean="0">
+                <a:solidFill>
+                  <a:schemeClr val="tx2"/>
+                </a:solidFill>
+                <a:latin typeface="Lucida Console" panose="020B0609040504020204" pitchFamily="49" charset="0"/>
+                <a:cs typeface="Neo Sans Intel"/>
+              </a:rPr>
+              <a:t>    </a:t>
+            </a:r>
+            <a:r>
+              <a:rPr lang="en-US" sz="1200" dirty="0" err="1">
+                <a:solidFill>
+                  <a:schemeClr val="tx2"/>
+                </a:solidFill>
+                <a:latin typeface="Lucida Console" panose="020B0609040504020204" pitchFamily="49" charset="0"/>
+                <a:cs typeface="Neo Sans Intel"/>
+              </a:rPr>
+              <a:t>var</a:t>
+            </a:r>
+            <a:r>
+              <a:rPr lang="en-US" sz="1200" dirty="0">
+                <a:solidFill>
+                  <a:schemeClr val="tx2"/>
+                </a:solidFill>
+                <a:latin typeface="Lucida Console" panose="020B0609040504020204" pitchFamily="49" charset="0"/>
+                <a:cs typeface="Neo Sans Intel"/>
+              </a:rPr>
+              <a:t> </a:t>
+            </a:r>
+            <a:r>
+              <a:rPr lang="en-US" sz="1200" dirty="0" err="1">
+                <a:solidFill>
+                  <a:schemeClr val="tx2"/>
+                </a:solidFill>
+                <a:latin typeface="Lucida Console" panose="020B0609040504020204" pitchFamily="49" charset="0"/>
+                <a:cs typeface="Neo Sans Intel"/>
+              </a:rPr>
+              <a:t>new_re</a:t>
+            </a:r>
+            <a:r>
+              <a:rPr lang="en-US" sz="1200" dirty="0">
+                <a:solidFill>
+                  <a:schemeClr val="tx2"/>
+                </a:solidFill>
+                <a:latin typeface="Lucida Console" panose="020B0609040504020204" pitchFamily="49" charset="0"/>
+                <a:cs typeface="Neo Sans Intel"/>
+              </a:rPr>
+              <a:t> = z_re2 - z_im2;</a:t>
+            </a:r>
+          </a:p>
+          <a:p>
+            <a:r>
+              <a:rPr lang="en-US" sz="1200" dirty="0">
+                <a:solidFill>
+                  <a:schemeClr val="tx2"/>
+                </a:solidFill>
+                <a:latin typeface="Lucida Console" panose="020B0609040504020204" pitchFamily="49" charset="0"/>
+                <a:cs typeface="Neo Sans Intel"/>
+              </a:rPr>
+              <a:t>    </a:t>
+            </a:r>
+            <a:r>
+              <a:rPr lang="en-US" sz="1200" dirty="0" err="1">
+                <a:solidFill>
+                  <a:schemeClr val="tx2"/>
+                </a:solidFill>
+                <a:latin typeface="Lucida Console" panose="020B0609040504020204" pitchFamily="49" charset="0"/>
+                <a:cs typeface="Neo Sans Intel"/>
+              </a:rPr>
+              <a:t>var</a:t>
+            </a:r>
+            <a:r>
+              <a:rPr lang="en-US" sz="1200" dirty="0">
+                <a:solidFill>
+                  <a:schemeClr val="tx2"/>
+                </a:solidFill>
+                <a:latin typeface="Lucida Console" panose="020B0609040504020204" pitchFamily="49" charset="0"/>
+                <a:cs typeface="Neo Sans Intel"/>
+              </a:rPr>
+              <a:t> </a:t>
+            </a:r>
+            <a:r>
+              <a:rPr lang="en-US" sz="1200" dirty="0" err="1">
+                <a:solidFill>
+                  <a:schemeClr val="tx2"/>
+                </a:solidFill>
+                <a:latin typeface="Lucida Console" panose="020B0609040504020204" pitchFamily="49" charset="0"/>
+                <a:cs typeface="Neo Sans Intel"/>
+              </a:rPr>
+              <a:t>new_im</a:t>
+            </a:r>
+            <a:r>
+              <a:rPr lang="en-US" sz="1200" dirty="0">
+                <a:solidFill>
+                  <a:schemeClr val="tx2"/>
+                </a:solidFill>
+                <a:latin typeface="Lucida Console" panose="020B0609040504020204" pitchFamily="49" charset="0"/>
+                <a:cs typeface="Neo Sans Intel"/>
+              </a:rPr>
+              <a:t> = 2.0 * </a:t>
+            </a:r>
+            <a:r>
+              <a:rPr lang="en-US" sz="1200" dirty="0" err="1">
+                <a:solidFill>
+                  <a:schemeClr val="tx2"/>
+                </a:solidFill>
+                <a:latin typeface="Lucida Console" panose="020B0609040504020204" pitchFamily="49" charset="0"/>
+                <a:cs typeface="Neo Sans Intel"/>
+              </a:rPr>
+              <a:t>z_re</a:t>
+            </a:r>
+            <a:r>
+              <a:rPr lang="en-US" sz="1200" dirty="0">
+                <a:solidFill>
+                  <a:schemeClr val="tx2"/>
+                </a:solidFill>
+                <a:latin typeface="Lucida Console" panose="020B0609040504020204" pitchFamily="49" charset="0"/>
+                <a:cs typeface="Neo Sans Intel"/>
+              </a:rPr>
+              <a:t> * </a:t>
+            </a:r>
+            <a:r>
+              <a:rPr lang="en-US" sz="1200" dirty="0" err="1">
+                <a:solidFill>
+                  <a:schemeClr val="tx2"/>
+                </a:solidFill>
+                <a:latin typeface="Lucida Console" panose="020B0609040504020204" pitchFamily="49" charset="0"/>
+                <a:cs typeface="Neo Sans Intel"/>
+              </a:rPr>
+              <a:t>z_im</a:t>
+            </a:r>
+            <a:r>
+              <a:rPr lang="en-US" sz="1200" dirty="0">
+                <a:solidFill>
+                  <a:schemeClr val="tx2"/>
+                </a:solidFill>
+                <a:latin typeface="Lucida Console" panose="020B0609040504020204" pitchFamily="49" charset="0"/>
+                <a:cs typeface="Neo Sans Intel"/>
+              </a:rPr>
+              <a:t>;</a:t>
+            </a:r>
+          </a:p>
+          <a:p>
+            <a:r>
+              <a:rPr lang="en-US" sz="1200" dirty="0">
+                <a:solidFill>
+                  <a:schemeClr val="tx2"/>
+                </a:solidFill>
+                <a:latin typeface="Lucida Console" panose="020B0609040504020204" pitchFamily="49" charset="0"/>
+                <a:cs typeface="Neo Sans Intel"/>
+              </a:rPr>
+              <a:t>    </a:t>
+            </a:r>
+            <a:r>
+              <a:rPr lang="en-US" sz="1200" dirty="0" err="1">
+                <a:solidFill>
+                  <a:schemeClr val="tx2"/>
+                </a:solidFill>
+                <a:latin typeface="Lucida Console" panose="020B0609040504020204" pitchFamily="49" charset="0"/>
+                <a:cs typeface="Neo Sans Intel"/>
+              </a:rPr>
+              <a:t>z_re</a:t>
+            </a:r>
+            <a:r>
+              <a:rPr lang="en-US" sz="1200" dirty="0">
+                <a:solidFill>
+                  <a:schemeClr val="tx2"/>
+                </a:solidFill>
+                <a:latin typeface="Lucida Console" panose="020B0609040504020204" pitchFamily="49" charset="0"/>
+                <a:cs typeface="Neo Sans Intel"/>
+              </a:rPr>
+              <a:t> = </a:t>
+            </a:r>
+            <a:r>
+              <a:rPr lang="en-US" sz="1200" dirty="0" err="1">
+                <a:solidFill>
+                  <a:schemeClr val="tx2"/>
+                </a:solidFill>
+                <a:latin typeface="Lucida Console" panose="020B0609040504020204" pitchFamily="49" charset="0"/>
+                <a:cs typeface="Neo Sans Intel"/>
+              </a:rPr>
+              <a:t>c_re</a:t>
+            </a:r>
+            <a:r>
+              <a:rPr lang="en-US" sz="1200" dirty="0">
+                <a:solidFill>
+                  <a:schemeClr val="tx2"/>
+                </a:solidFill>
+                <a:latin typeface="Lucida Console" panose="020B0609040504020204" pitchFamily="49" charset="0"/>
+                <a:cs typeface="Neo Sans Intel"/>
+              </a:rPr>
+              <a:t> + </a:t>
+            </a:r>
+            <a:r>
+              <a:rPr lang="en-US" sz="1200" dirty="0" err="1">
+                <a:solidFill>
+                  <a:schemeClr val="tx2"/>
+                </a:solidFill>
+                <a:latin typeface="Lucida Console" panose="020B0609040504020204" pitchFamily="49" charset="0"/>
+                <a:cs typeface="Neo Sans Intel"/>
+              </a:rPr>
+              <a:t>new_re</a:t>
+            </a:r>
+            <a:r>
+              <a:rPr lang="en-US" sz="1200" dirty="0">
+                <a:solidFill>
+                  <a:schemeClr val="tx2"/>
+                </a:solidFill>
+                <a:latin typeface="Lucida Console" panose="020B0609040504020204" pitchFamily="49" charset="0"/>
+                <a:cs typeface="Neo Sans Intel"/>
+              </a:rPr>
+              <a:t>;</a:t>
+            </a:r>
+          </a:p>
+          <a:p>
+            <a:r>
+              <a:rPr lang="en-US" sz="1200" dirty="0">
+                <a:solidFill>
+                  <a:schemeClr val="tx2"/>
+                </a:solidFill>
+                <a:latin typeface="Lucida Console" panose="020B0609040504020204" pitchFamily="49" charset="0"/>
+                <a:cs typeface="Neo Sans Intel"/>
+              </a:rPr>
+              <a:t>    </a:t>
+            </a:r>
+            <a:r>
+              <a:rPr lang="en-US" sz="1200" dirty="0" err="1">
+                <a:solidFill>
+                  <a:schemeClr val="tx2"/>
+                </a:solidFill>
+                <a:latin typeface="Lucida Console" panose="020B0609040504020204" pitchFamily="49" charset="0"/>
+                <a:cs typeface="Neo Sans Intel"/>
+              </a:rPr>
+              <a:t>z_im</a:t>
+            </a:r>
+            <a:r>
+              <a:rPr lang="en-US" sz="1200" dirty="0">
+                <a:solidFill>
+                  <a:schemeClr val="tx2"/>
+                </a:solidFill>
+                <a:latin typeface="Lucida Console" panose="020B0609040504020204" pitchFamily="49" charset="0"/>
+                <a:cs typeface="Neo Sans Intel"/>
+              </a:rPr>
+              <a:t> = </a:t>
+            </a:r>
+            <a:r>
+              <a:rPr lang="en-US" sz="1200" dirty="0" err="1">
+                <a:solidFill>
+                  <a:schemeClr val="tx2"/>
+                </a:solidFill>
+                <a:latin typeface="Lucida Console" panose="020B0609040504020204" pitchFamily="49" charset="0"/>
+                <a:cs typeface="Neo Sans Intel"/>
+              </a:rPr>
+              <a:t>c_im</a:t>
+            </a:r>
+            <a:r>
+              <a:rPr lang="en-US" sz="1200" dirty="0">
+                <a:solidFill>
+                  <a:schemeClr val="tx2"/>
+                </a:solidFill>
+                <a:latin typeface="Lucida Console" panose="020B0609040504020204" pitchFamily="49" charset="0"/>
+                <a:cs typeface="Neo Sans Intel"/>
+              </a:rPr>
+              <a:t> + </a:t>
+            </a:r>
+            <a:r>
+              <a:rPr lang="en-US" sz="1200" dirty="0" err="1">
+                <a:solidFill>
+                  <a:schemeClr val="tx2"/>
+                </a:solidFill>
+                <a:latin typeface="Lucida Console" panose="020B0609040504020204" pitchFamily="49" charset="0"/>
+                <a:cs typeface="Neo Sans Intel"/>
+              </a:rPr>
+              <a:t>new_im</a:t>
+            </a:r>
+            <a:r>
+              <a:rPr lang="en-US" sz="1200" dirty="0" smtClean="0">
+                <a:solidFill>
+                  <a:schemeClr val="tx2"/>
+                </a:solidFill>
+                <a:latin typeface="Lucida Console" panose="020B0609040504020204" pitchFamily="49" charset="0"/>
+                <a:cs typeface="Neo Sans Intel"/>
+              </a:rPr>
+              <a:t>;</a:t>
+            </a:r>
+          </a:p>
+          <a:p>
+            <a:endParaRPr lang="en-US" sz="1200" dirty="0">
+              <a:solidFill>
+                <a:schemeClr val="tx2"/>
+              </a:solidFill>
+              <a:latin typeface="Lucida Console" panose="020B0609040504020204" pitchFamily="49" charset="0"/>
+              <a:cs typeface="Neo Sans Intel"/>
+            </a:endParaRPr>
+          </a:p>
+          <a:p>
+            <a:r>
+              <a:rPr lang="en-US" sz="1200" dirty="0">
+                <a:solidFill>
+                  <a:schemeClr val="tx2"/>
+                </a:solidFill>
+                <a:latin typeface="Lucida Console" panose="020B0609040504020204" pitchFamily="49" charset="0"/>
+                <a:cs typeface="Neo Sans Intel"/>
+              </a:rPr>
+              <a:t>  }</a:t>
+            </a:r>
+          </a:p>
+          <a:p>
+            <a:r>
+              <a:rPr lang="en-US" sz="1200" dirty="0">
+                <a:solidFill>
+                  <a:schemeClr val="tx2"/>
+                </a:solidFill>
+                <a:latin typeface="Lucida Console" panose="020B0609040504020204" pitchFamily="49" charset="0"/>
+                <a:cs typeface="Neo Sans Intel"/>
+              </a:rPr>
+              <a:t>  return i;</a:t>
+            </a:r>
+          </a:p>
+          <a:p>
+            <a:r>
+              <a:rPr lang="en-US" sz="1200" dirty="0">
+                <a:solidFill>
+                  <a:schemeClr val="tx2"/>
+                </a:solidFill>
+                <a:latin typeface="Lucida Console" panose="020B0609040504020204" pitchFamily="49" charset="0"/>
+                <a:cs typeface="Neo Sans Intel"/>
+              </a:rPr>
+              <a:t>}</a:t>
+            </a:r>
+            <a:endParaRPr lang="en-US" sz="1200" dirty="0" smtClean="0">
+              <a:solidFill>
+                <a:schemeClr val="tx2"/>
+              </a:solidFill>
+              <a:latin typeface="Lucida Console" panose="020B0609040504020204" pitchFamily="49" charset="0"/>
+              <a:cs typeface="Neo Sans Intel"/>
+            </a:endParaRPr>
+          </a:p>
+        </p:txBody>
+      </p:sp>
+      <p:sp>
+        <p:nvSpPr>
+          <p:cNvPr id="5" name="TextBox 4"/>
+          <p:cNvSpPr txBox="1"/>
+          <p:nvPr/>
+        </p:nvSpPr>
+        <p:spPr>
+          <a:xfrm>
+            <a:off x="4476426" y="1570035"/>
+            <a:ext cx="7715574" cy="4708981"/>
+          </a:xfrm>
+          <a:prstGeom prst="rect">
+            <a:avLst/>
+          </a:prstGeom>
+          <a:noFill/>
+        </p:spPr>
+        <p:txBody>
+          <a:bodyPr wrap="none" rtlCol="0">
+            <a:spAutoFit/>
+          </a:bodyPr>
+          <a:lstStyle/>
+          <a:p>
+            <a:r>
+              <a:rPr lang="en-US" sz="1200" dirty="0">
+                <a:solidFill>
+                  <a:schemeClr val="tx2"/>
+                </a:solidFill>
+                <a:latin typeface="Lucida Console" panose="020B0609040504020204" pitchFamily="49" charset="0"/>
+                <a:cs typeface="Neo Sans Intel"/>
+              </a:rPr>
+              <a:t>function mandelx4(c_re4, c_im4) {</a:t>
+            </a:r>
+          </a:p>
+          <a:p>
+            <a:r>
+              <a:rPr lang="en-US" sz="1200" dirty="0">
+                <a:solidFill>
+                  <a:schemeClr val="tx2"/>
+                </a:solidFill>
+                <a:latin typeface="Lucida Console" panose="020B0609040504020204" pitchFamily="49" charset="0"/>
+                <a:cs typeface="Neo Sans Intel"/>
+              </a:rPr>
+              <a:t>  </a:t>
+            </a:r>
+            <a:r>
+              <a:rPr lang="en-US" sz="1200" dirty="0" err="1">
+                <a:solidFill>
+                  <a:schemeClr val="tx2"/>
+                </a:solidFill>
+                <a:latin typeface="Lucida Console" panose="020B0609040504020204" pitchFamily="49" charset="0"/>
+                <a:cs typeface="Neo Sans Intel"/>
+              </a:rPr>
+              <a:t>var</a:t>
+            </a:r>
+            <a:r>
+              <a:rPr lang="en-US" sz="1200" dirty="0">
+                <a:solidFill>
+                  <a:schemeClr val="tx2"/>
+                </a:solidFill>
+                <a:latin typeface="Lucida Console" panose="020B0609040504020204" pitchFamily="49" charset="0"/>
+                <a:cs typeface="Neo Sans Intel"/>
+              </a:rPr>
+              <a:t> z_re4  = c_re4,</a:t>
+            </a:r>
+          </a:p>
+          <a:p>
+            <a:r>
+              <a:rPr lang="en-US" sz="1200" dirty="0">
+                <a:solidFill>
+                  <a:schemeClr val="tx2"/>
+                </a:solidFill>
+                <a:latin typeface="Lucida Console" panose="020B0609040504020204" pitchFamily="49" charset="0"/>
+                <a:cs typeface="Neo Sans Intel"/>
+              </a:rPr>
+              <a:t>      z_im4  = c_im4,</a:t>
+            </a:r>
+          </a:p>
+          <a:p>
+            <a:r>
+              <a:rPr lang="en-US" sz="1200" dirty="0">
+                <a:solidFill>
+                  <a:schemeClr val="tx2"/>
+                </a:solidFill>
+                <a:latin typeface="Lucida Console" panose="020B0609040504020204" pitchFamily="49" charset="0"/>
+                <a:cs typeface="Neo Sans Intel"/>
+              </a:rPr>
+              <a:t>      four4  = SIMD.float32x4.splat (4.0),</a:t>
+            </a:r>
+          </a:p>
+          <a:p>
+            <a:r>
+              <a:rPr lang="en-US" sz="1200" dirty="0">
+                <a:solidFill>
+                  <a:schemeClr val="tx2"/>
+                </a:solidFill>
+                <a:latin typeface="Lucida Console" panose="020B0609040504020204" pitchFamily="49" charset="0"/>
+                <a:cs typeface="Neo Sans Intel"/>
+              </a:rPr>
+              <a:t>      two4   = SIMD.float32x4.splat (2.0),</a:t>
+            </a:r>
+          </a:p>
+          <a:p>
+            <a:r>
+              <a:rPr lang="en-US" sz="1200" dirty="0">
+                <a:solidFill>
+                  <a:schemeClr val="tx2"/>
+                </a:solidFill>
+                <a:latin typeface="Lucida Console" panose="020B0609040504020204" pitchFamily="49" charset="0"/>
+                <a:cs typeface="Neo Sans Intel"/>
+              </a:rPr>
+              <a:t>      count4 = SIMD.int32x4.splat (0),</a:t>
+            </a:r>
+          </a:p>
+          <a:p>
+            <a:r>
+              <a:rPr lang="en-US" sz="1200" dirty="0">
+                <a:solidFill>
+                  <a:schemeClr val="tx2"/>
+                </a:solidFill>
+                <a:latin typeface="Lucida Console" panose="020B0609040504020204" pitchFamily="49" charset="0"/>
+                <a:cs typeface="Neo Sans Intel"/>
+              </a:rPr>
+              <a:t>      one4   = SIMD.int32x4.splat (1),</a:t>
+            </a:r>
+          </a:p>
+          <a:p>
+            <a:r>
+              <a:rPr lang="en-US" sz="1200" dirty="0">
+                <a:solidFill>
+                  <a:schemeClr val="tx2"/>
+                </a:solidFill>
+                <a:latin typeface="Lucida Console" panose="020B0609040504020204" pitchFamily="49" charset="0"/>
+                <a:cs typeface="Neo Sans Intel"/>
+              </a:rPr>
+              <a:t>      i, z_re24, z_im24, mi4, new_re4, new_im4;</a:t>
+            </a:r>
+          </a:p>
+          <a:p>
+            <a:endParaRPr lang="en-US" sz="1200" dirty="0">
+              <a:solidFill>
+                <a:schemeClr val="tx2"/>
+              </a:solidFill>
+              <a:latin typeface="Lucida Console" panose="020B0609040504020204" pitchFamily="49" charset="0"/>
+              <a:cs typeface="Neo Sans Intel"/>
+            </a:endParaRPr>
+          </a:p>
+          <a:p>
+            <a:r>
+              <a:rPr lang="en-US" sz="1200" dirty="0">
+                <a:solidFill>
+                  <a:schemeClr val="tx2"/>
+                </a:solidFill>
+                <a:latin typeface="Lucida Console" panose="020B0609040504020204" pitchFamily="49" charset="0"/>
+                <a:cs typeface="Neo Sans Intel"/>
+              </a:rPr>
+              <a:t>  for (i = 0; i &lt; </a:t>
+            </a:r>
+            <a:r>
+              <a:rPr lang="en-US" sz="1200" dirty="0" err="1">
+                <a:solidFill>
+                  <a:schemeClr val="tx2"/>
+                </a:solidFill>
+                <a:latin typeface="Lucida Console" panose="020B0609040504020204" pitchFamily="49" charset="0"/>
+                <a:cs typeface="Neo Sans Intel"/>
+              </a:rPr>
+              <a:t>max_iterations</a:t>
+            </a:r>
+            <a:r>
+              <a:rPr lang="en-US" sz="1200" dirty="0">
+                <a:solidFill>
+                  <a:schemeClr val="tx2"/>
+                </a:solidFill>
+                <a:latin typeface="Lucida Console" panose="020B0609040504020204" pitchFamily="49" charset="0"/>
+                <a:cs typeface="Neo Sans Intel"/>
+              </a:rPr>
+              <a:t>; ++i) {</a:t>
+            </a:r>
+          </a:p>
+          <a:p>
+            <a:r>
+              <a:rPr lang="en-US" sz="1200" dirty="0">
+                <a:solidFill>
+                  <a:schemeClr val="tx2"/>
+                </a:solidFill>
+                <a:latin typeface="Lucida Console" panose="020B0609040504020204" pitchFamily="49" charset="0"/>
+                <a:cs typeface="Neo Sans Intel"/>
+              </a:rPr>
+              <a:t>    z_re24 = SIMD.float32x4.mul (z_re4, z_re4);</a:t>
+            </a:r>
+          </a:p>
+          <a:p>
+            <a:r>
+              <a:rPr lang="en-US" sz="1200" dirty="0">
+                <a:solidFill>
+                  <a:schemeClr val="tx2"/>
+                </a:solidFill>
+                <a:latin typeface="Lucida Console" panose="020B0609040504020204" pitchFamily="49" charset="0"/>
+                <a:cs typeface="Neo Sans Intel"/>
+              </a:rPr>
+              <a:t>    z_im24 = SIMD.float32x4.mul (z_im4, z_im4);</a:t>
+            </a:r>
+          </a:p>
+          <a:p>
+            <a:r>
+              <a:rPr lang="en-US" sz="1200" dirty="0" smtClean="0">
+                <a:solidFill>
+                  <a:schemeClr val="tx2"/>
+                </a:solidFill>
+                <a:latin typeface="Lucida Console" panose="020B0609040504020204" pitchFamily="49" charset="0"/>
+                <a:cs typeface="Neo Sans Intel"/>
+              </a:rPr>
+              <a:t>    mi4 = SIMD.float32x4.greaterThan(SIMD.float32x4.add </a:t>
+            </a:r>
+            <a:r>
+              <a:rPr lang="en-US" sz="1200" dirty="0">
+                <a:solidFill>
+                  <a:schemeClr val="tx2"/>
+                </a:solidFill>
+                <a:latin typeface="Lucida Console" panose="020B0609040504020204" pitchFamily="49" charset="0"/>
+                <a:cs typeface="Neo Sans Intel"/>
+              </a:rPr>
+              <a:t>(z_re24, z_im24), four4);</a:t>
+            </a:r>
+          </a:p>
+          <a:p>
+            <a:r>
+              <a:rPr lang="en-US" sz="1200" dirty="0" smtClean="0">
+                <a:solidFill>
+                  <a:schemeClr val="tx2"/>
+                </a:solidFill>
+                <a:latin typeface="Lucida Console" panose="020B0609040504020204" pitchFamily="49" charset="0"/>
+                <a:cs typeface="Neo Sans Intel"/>
+              </a:rPr>
+              <a:t>    if (SIMD.int32x4.allTrue()) </a:t>
+            </a:r>
+            <a:r>
+              <a:rPr lang="en-US" sz="1200" dirty="0">
+                <a:solidFill>
+                  <a:schemeClr val="tx2"/>
+                </a:solidFill>
+                <a:latin typeface="Lucida Console" panose="020B0609040504020204" pitchFamily="49" charset="0"/>
+                <a:cs typeface="Neo Sans Intel"/>
+              </a:rPr>
+              <a:t>{</a:t>
+            </a:r>
+          </a:p>
+          <a:p>
+            <a:r>
+              <a:rPr lang="en-US" sz="1200" dirty="0" smtClean="0">
+                <a:solidFill>
+                  <a:schemeClr val="tx2"/>
+                </a:solidFill>
+                <a:latin typeface="Lucida Console" panose="020B0609040504020204" pitchFamily="49" charset="0"/>
+                <a:cs typeface="Neo Sans Intel"/>
+              </a:rPr>
+              <a:t>      </a:t>
+            </a:r>
+            <a:r>
+              <a:rPr lang="en-US" sz="1200" dirty="0">
+                <a:solidFill>
+                  <a:schemeClr val="tx2"/>
+                </a:solidFill>
+                <a:latin typeface="Lucida Console" panose="020B0609040504020204" pitchFamily="49" charset="0"/>
+                <a:cs typeface="Neo Sans Intel"/>
+              </a:rPr>
+              <a:t>// </a:t>
+            </a:r>
+            <a:r>
+              <a:rPr lang="en-US" sz="1200" dirty="0" smtClean="0">
+                <a:solidFill>
+                  <a:schemeClr val="tx2"/>
+                </a:solidFill>
+                <a:latin typeface="Lucida Console" panose="020B0609040504020204" pitchFamily="49" charset="0"/>
+                <a:cs typeface="Neo Sans Intel"/>
+              </a:rPr>
+              <a:t>all </a:t>
+            </a:r>
+            <a:r>
+              <a:rPr lang="en-US" sz="1200" dirty="0">
+                <a:solidFill>
+                  <a:schemeClr val="tx2"/>
+                </a:solidFill>
+                <a:latin typeface="Lucida Console" panose="020B0609040504020204" pitchFamily="49" charset="0"/>
+                <a:cs typeface="Neo Sans Intel"/>
+              </a:rPr>
+              <a:t>4 </a:t>
+            </a:r>
+            <a:r>
+              <a:rPr lang="en-US" sz="1200" dirty="0" smtClean="0">
+                <a:solidFill>
+                  <a:schemeClr val="tx2"/>
+                </a:solidFill>
+                <a:latin typeface="Lucida Console" panose="020B0609040504020204" pitchFamily="49" charset="0"/>
+                <a:cs typeface="Neo Sans Intel"/>
+              </a:rPr>
+              <a:t>values have diverged</a:t>
+            </a:r>
+          </a:p>
+          <a:p>
+            <a:r>
+              <a:rPr lang="en-US" sz="1200" dirty="0" smtClean="0">
+                <a:solidFill>
+                  <a:schemeClr val="tx2"/>
+                </a:solidFill>
+                <a:latin typeface="Lucida Console" panose="020B0609040504020204" pitchFamily="49" charset="0"/>
+                <a:cs typeface="Neo Sans Intel"/>
+              </a:rPr>
+              <a:t>      </a:t>
+            </a:r>
+            <a:r>
+              <a:rPr lang="en-US" sz="1200" dirty="0">
+                <a:solidFill>
+                  <a:schemeClr val="tx2"/>
+                </a:solidFill>
+                <a:latin typeface="Lucida Console" panose="020B0609040504020204" pitchFamily="49" charset="0"/>
+                <a:cs typeface="Neo Sans Intel"/>
+              </a:rPr>
+              <a:t>break;</a:t>
+            </a:r>
+          </a:p>
+          <a:p>
+            <a:r>
+              <a:rPr lang="en-US" sz="1200" dirty="0">
+                <a:solidFill>
+                  <a:schemeClr val="tx2"/>
+                </a:solidFill>
+                <a:latin typeface="Lucida Console" panose="020B0609040504020204" pitchFamily="49" charset="0"/>
+                <a:cs typeface="Neo Sans Intel"/>
+              </a:rPr>
+              <a:t>    }</a:t>
+            </a:r>
+          </a:p>
+          <a:p>
+            <a:r>
+              <a:rPr lang="en-US" sz="1200" dirty="0" smtClean="0">
+                <a:solidFill>
+                  <a:schemeClr val="tx2"/>
+                </a:solidFill>
+                <a:latin typeface="Lucida Console" panose="020B0609040504020204" pitchFamily="49" charset="0"/>
+                <a:cs typeface="Neo Sans Intel"/>
+              </a:rPr>
+              <a:t>    </a:t>
+            </a:r>
+            <a:r>
+              <a:rPr lang="en-US" sz="1200" dirty="0" err="1" smtClean="0">
+                <a:solidFill>
+                  <a:schemeClr val="tx2"/>
+                </a:solidFill>
+                <a:latin typeface="Lucida Console" panose="020B0609040504020204" pitchFamily="49" charset="0"/>
+                <a:cs typeface="Neo Sans Intel"/>
+              </a:rPr>
+              <a:t>var</a:t>
+            </a:r>
+            <a:r>
+              <a:rPr lang="en-US" sz="1200" dirty="0" smtClean="0">
+                <a:solidFill>
+                  <a:schemeClr val="tx2"/>
+                </a:solidFill>
+                <a:latin typeface="Lucida Console" panose="020B0609040504020204" pitchFamily="49" charset="0"/>
+                <a:cs typeface="Neo Sans Intel"/>
+              </a:rPr>
+              <a:t> new_re4 </a:t>
+            </a:r>
+            <a:r>
+              <a:rPr lang="en-US" sz="1200" dirty="0">
+                <a:solidFill>
+                  <a:schemeClr val="tx2"/>
+                </a:solidFill>
+                <a:latin typeface="Lucida Console" panose="020B0609040504020204" pitchFamily="49" charset="0"/>
+                <a:cs typeface="Neo Sans Intel"/>
+              </a:rPr>
+              <a:t>= SIMD.float32x4.sub (z_re24, z_im24);</a:t>
+            </a:r>
+          </a:p>
+          <a:p>
+            <a:r>
+              <a:rPr lang="en-US" sz="1200" dirty="0">
+                <a:solidFill>
+                  <a:schemeClr val="tx2"/>
+                </a:solidFill>
+                <a:latin typeface="Lucida Console" panose="020B0609040504020204" pitchFamily="49" charset="0"/>
+                <a:cs typeface="Neo Sans Intel"/>
+              </a:rPr>
+              <a:t>    </a:t>
+            </a:r>
+            <a:r>
+              <a:rPr lang="en-US" sz="1200" dirty="0" err="1" smtClean="0">
+                <a:solidFill>
+                  <a:schemeClr val="tx2"/>
+                </a:solidFill>
+                <a:latin typeface="Lucida Console" panose="020B0609040504020204" pitchFamily="49" charset="0"/>
+                <a:cs typeface="Neo Sans Intel"/>
+              </a:rPr>
+              <a:t>var</a:t>
+            </a:r>
+            <a:r>
+              <a:rPr lang="en-US" sz="1200" dirty="0" smtClean="0">
+                <a:solidFill>
+                  <a:schemeClr val="tx2"/>
+                </a:solidFill>
+                <a:latin typeface="Lucida Console" panose="020B0609040504020204" pitchFamily="49" charset="0"/>
+                <a:cs typeface="Neo Sans Intel"/>
+              </a:rPr>
+              <a:t> new_im4 </a:t>
+            </a:r>
+            <a:r>
+              <a:rPr lang="en-US" sz="1200" dirty="0">
+                <a:solidFill>
+                  <a:schemeClr val="tx2"/>
+                </a:solidFill>
+                <a:latin typeface="Lucida Console" panose="020B0609040504020204" pitchFamily="49" charset="0"/>
+                <a:cs typeface="Neo Sans Intel"/>
+              </a:rPr>
+              <a:t>= SIMD.float32x4.mul (SIMD.float32x4.mul (two4, z_re4), z_im4);</a:t>
+            </a:r>
+          </a:p>
+          <a:p>
+            <a:r>
+              <a:rPr lang="en-US" sz="1200" dirty="0">
+                <a:solidFill>
+                  <a:schemeClr val="tx2"/>
+                </a:solidFill>
+                <a:latin typeface="Lucida Console" panose="020B0609040504020204" pitchFamily="49" charset="0"/>
+                <a:cs typeface="Neo Sans Intel"/>
+              </a:rPr>
+              <a:t>    z_re4  </a:t>
+            </a:r>
+            <a:r>
+              <a:rPr lang="en-US" sz="1200" dirty="0" smtClean="0">
+                <a:solidFill>
+                  <a:schemeClr val="tx2"/>
+                </a:solidFill>
+                <a:latin typeface="Lucida Console" panose="020B0609040504020204" pitchFamily="49" charset="0"/>
+                <a:cs typeface="Neo Sans Intel"/>
+              </a:rPr>
+              <a:t>     </a:t>
+            </a:r>
+            <a:r>
+              <a:rPr lang="en-US" sz="1200" dirty="0">
+                <a:solidFill>
+                  <a:schemeClr val="tx2"/>
+                </a:solidFill>
+                <a:latin typeface="Lucida Console" panose="020B0609040504020204" pitchFamily="49" charset="0"/>
+                <a:cs typeface="Neo Sans Intel"/>
+              </a:rPr>
+              <a:t>= SIMD.float32x4.add (c_re4, new_re4);</a:t>
+            </a:r>
+          </a:p>
+          <a:p>
+            <a:r>
+              <a:rPr lang="en-US" sz="1200" dirty="0">
+                <a:solidFill>
+                  <a:schemeClr val="tx2"/>
+                </a:solidFill>
+                <a:latin typeface="Lucida Console" panose="020B0609040504020204" pitchFamily="49" charset="0"/>
+                <a:cs typeface="Neo Sans Intel"/>
+              </a:rPr>
+              <a:t>    z_im4   </a:t>
+            </a:r>
+            <a:r>
+              <a:rPr lang="en-US" sz="1200" dirty="0" smtClean="0">
+                <a:solidFill>
+                  <a:schemeClr val="tx2"/>
+                </a:solidFill>
+                <a:latin typeface="Lucida Console" panose="020B0609040504020204" pitchFamily="49" charset="0"/>
+                <a:cs typeface="Neo Sans Intel"/>
+              </a:rPr>
+              <a:t>    = </a:t>
+            </a:r>
+            <a:r>
+              <a:rPr lang="en-US" sz="1200" dirty="0">
+                <a:solidFill>
+                  <a:schemeClr val="tx2"/>
+                </a:solidFill>
+                <a:latin typeface="Lucida Console" panose="020B0609040504020204" pitchFamily="49" charset="0"/>
+                <a:cs typeface="Neo Sans Intel"/>
+              </a:rPr>
+              <a:t>SIMD.float32x4.add (c_im4, new_im4);</a:t>
+            </a:r>
+          </a:p>
+          <a:p>
+            <a:r>
+              <a:rPr lang="en-US" sz="1200" dirty="0">
+                <a:solidFill>
+                  <a:schemeClr val="tx2"/>
+                </a:solidFill>
+                <a:latin typeface="Lucida Console" panose="020B0609040504020204" pitchFamily="49" charset="0"/>
+                <a:cs typeface="Neo Sans Intel"/>
+              </a:rPr>
+              <a:t>    count4  </a:t>
+            </a:r>
+            <a:r>
+              <a:rPr lang="en-US" sz="1200" dirty="0" smtClean="0">
+                <a:solidFill>
+                  <a:schemeClr val="tx2"/>
+                </a:solidFill>
+                <a:latin typeface="Lucida Console" panose="020B0609040504020204" pitchFamily="49" charset="0"/>
+                <a:cs typeface="Neo Sans Intel"/>
+              </a:rPr>
+              <a:t>    = </a:t>
+            </a:r>
+            <a:r>
+              <a:rPr lang="en-US" sz="1200" dirty="0">
+                <a:solidFill>
+                  <a:schemeClr val="tx2"/>
+                </a:solidFill>
+                <a:latin typeface="Lucida Console" panose="020B0609040504020204" pitchFamily="49" charset="0"/>
+                <a:cs typeface="Neo Sans Intel"/>
+              </a:rPr>
+              <a:t>SIMD.int32x4.add (count4, SIMD.int32x4.and (mi4, one4));</a:t>
+            </a:r>
+          </a:p>
+          <a:p>
+            <a:r>
+              <a:rPr lang="en-US" sz="1200" dirty="0">
+                <a:solidFill>
+                  <a:schemeClr val="tx2"/>
+                </a:solidFill>
+                <a:latin typeface="Lucida Console" panose="020B0609040504020204" pitchFamily="49" charset="0"/>
+                <a:cs typeface="Neo Sans Intel"/>
+              </a:rPr>
+              <a:t>  }</a:t>
+            </a:r>
+          </a:p>
+          <a:p>
+            <a:r>
+              <a:rPr lang="en-US" sz="1200" dirty="0">
+                <a:solidFill>
+                  <a:schemeClr val="tx2"/>
+                </a:solidFill>
+                <a:latin typeface="Lucida Console" panose="020B0609040504020204" pitchFamily="49" charset="0"/>
+                <a:cs typeface="Neo Sans Intel"/>
+              </a:rPr>
+              <a:t>  return count4;</a:t>
+            </a:r>
+          </a:p>
+          <a:p>
+            <a:r>
+              <a:rPr lang="en-US" sz="1200" dirty="0">
+                <a:solidFill>
+                  <a:schemeClr val="tx2"/>
+                </a:solidFill>
+                <a:latin typeface="Lucida Console" panose="020B0609040504020204" pitchFamily="49" charset="0"/>
+                <a:cs typeface="Neo Sans Intel"/>
+              </a:rPr>
+              <a:t>}</a:t>
+            </a:r>
+            <a:endParaRPr lang="en-US" sz="1200" dirty="0" smtClean="0">
+              <a:solidFill>
+                <a:schemeClr val="tx2"/>
+              </a:solidFill>
+              <a:latin typeface="Lucida Console" panose="020B0609040504020204" pitchFamily="49" charset="0"/>
+              <a:cs typeface="Neo Sans Intel"/>
+            </a:endParaRPr>
+          </a:p>
+        </p:txBody>
+      </p:sp>
+      <p:sp>
+        <p:nvSpPr>
+          <p:cNvPr id="6" name="TextBox 5"/>
+          <p:cNvSpPr txBox="1"/>
+          <p:nvPr/>
+        </p:nvSpPr>
+        <p:spPr>
+          <a:xfrm>
+            <a:off x="1643377" y="990917"/>
+            <a:ext cx="1067921" cy="461665"/>
+          </a:xfrm>
+          <a:prstGeom prst="rect">
+            <a:avLst/>
+          </a:prstGeom>
+          <a:noFill/>
+        </p:spPr>
+        <p:txBody>
+          <a:bodyPr wrap="none" rtlCol="0">
+            <a:spAutoFit/>
+          </a:bodyPr>
+          <a:lstStyle/>
+          <a:p>
+            <a:r>
+              <a:rPr lang="en-US" sz="2400" b="1" u="sng" dirty="0" smtClean="0">
+                <a:solidFill>
+                  <a:schemeClr val="tx2"/>
+                </a:solidFill>
+                <a:cs typeface="Neo Sans Intel"/>
+              </a:rPr>
+              <a:t>Scalar</a:t>
+            </a:r>
+            <a:endParaRPr lang="en-US" sz="2400" b="1" u="sng" dirty="0" smtClean="0">
+              <a:solidFill>
+                <a:schemeClr val="tx2"/>
+              </a:solidFill>
+              <a:cs typeface="Neo Sans Intel"/>
+            </a:endParaRPr>
+          </a:p>
+        </p:txBody>
+      </p:sp>
+      <p:sp>
+        <p:nvSpPr>
+          <p:cNvPr id="7" name="TextBox 6"/>
+          <p:cNvSpPr txBox="1"/>
+          <p:nvPr/>
+        </p:nvSpPr>
+        <p:spPr>
+          <a:xfrm>
+            <a:off x="7709688" y="990917"/>
+            <a:ext cx="946093" cy="461665"/>
+          </a:xfrm>
+          <a:prstGeom prst="rect">
+            <a:avLst/>
+          </a:prstGeom>
+          <a:noFill/>
+        </p:spPr>
+        <p:txBody>
+          <a:bodyPr wrap="none" rtlCol="0">
+            <a:spAutoFit/>
+          </a:bodyPr>
+          <a:lstStyle/>
+          <a:p>
+            <a:r>
+              <a:rPr lang="en-US" sz="2400" b="1" u="sng" dirty="0" smtClean="0">
+                <a:solidFill>
+                  <a:schemeClr val="tx2"/>
+                </a:solidFill>
+                <a:cs typeface="Neo Sans Intel"/>
+              </a:rPr>
+              <a:t>SIMD</a:t>
+            </a:r>
+            <a:endParaRPr lang="en-US" sz="2400" b="1" u="sng" dirty="0" smtClean="0">
+              <a:solidFill>
+                <a:schemeClr val="tx2"/>
+              </a:solidFill>
+              <a:cs typeface="Neo Sans Intel"/>
+            </a:endParaRPr>
+          </a:p>
+        </p:txBody>
+      </p:sp>
+    </p:spTree>
+    <p:extLst>
+      <p:ext uri="{BB962C8B-B14F-4D97-AF65-F5344CB8AC3E}">
+        <p14:creationId xmlns:p14="http://schemas.microsoft.com/office/powerpoint/2010/main" val="2464460542"/>
+      </p:ext>
+    </p:extLst>
+  </p:cSld>
+  <p:clrMapOvr>
+    <a:masterClrMapping/>
+  </p:clrMapOvr>
+</p:sld>
+</file>
+
+<file path=ppt/slides/slide12.xml><?xml version="1.0" encoding="utf-8"?>
+<p:sld xmlns:a="http://schemas.openxmlformats.org/drawingml/2006/main" xmlns:r="http://schemas.openxmlformats.org/officeDocument/2006/relationships" xmlns:p="http://schemas.openxmlformats.org/presentationml/2006/main">
+  <p:cSld>
+    <p:spTree>
+      <p:nvGrpSpPr>
+        <p:cNvPr id="1" name=""/>
+        <p:cNvGrpSpPr/>
+        <p:nvPr/>
+      </p:nvGrpSpPr>
+      <p:grpSpPr>
+        <a:xfrm>
+          <a:off x="0" y="0"/>
+          <a:ext cx="0" cy="0"/>
+          <a:chOff x="0" y="0"/>
+          <a:chExt cx="0" cy="0"/>
+        </a:xfrm>
+      </p:grpSpPr>
+      <p:sp>
+        <p:nvSpPr>
+          <p:cNvPr id="2" name="Title 1"/>
+          <p:cNvSpPr>
+            <a:spLocks noGrp="1"/>
+          </p:cNvSpPr>
+          <p:nvPr>
+            <p:ph type="title"/>
+          </p:nvPr>
+        </p:nvSpPr>
+        <p:spPr/>
+        <p:txBody>
+          <a:bodyPr/>
+          <a:lstStyle/>
+          <a:p>
+            <a:r>
+              <a:rPr lang="en-US" dirty="0" smtClean="0"/>
+              <a:t>SIMD.JS – Focus</a:t>
+            </a:r>
+            <a:endParaRPr lang="en-US" dirty="0"/>
+          </a:p>
+        </p:txBody>
+      </p:sp>
+      <p:sp>
+        <p:nvSpPr>
+          <p:cNvPr id="3" name="Content Placeholder 2"/>
+          <p:cNvSpPr>
+            <a:spLocks noGrp="1"/>
+          </p:cNvSpPr>
+          <p:nvPr>
+            <p:ph sz="quarter" idx="13"/>
+          </p:nvPr>
+        </p:nvSpPr>
+        <p:spPr/>
+        <p:txBody>
+          <a:bodyPr/>
+          <a:lstStyle/>
+          <a:p>
+            <a:r>
+              <a:rPr lang="en-US" dirty="0" smtClean="0"/>
+              <a:t>Initial focus on architecture overlap (128-bit vectors)</a:t>
+            </a:r>
+          </a:p>
+          <a:p>
+            <a:pPr lvl="1"/>
+            <a:r>
+              <a:rPr lang="en-US" dirty="0" smtClean="0"/>
+              <a:t>Well defined </a:t>
+            </a:r>
+            <a:r>
+              <a:rPr lang="en-US" dirty="0" err="1" smtClean="0"/>
+              <a:t>NaN</a:t>
+            </a:r>
+            <a:r>
+              <a:rPr lang="en-US" dirty="0" smtClean="0"/>
+              <a:t> handling</a:t>
+            </a:r>
+          </a:p>
+          <a:p>
+            <a:pPr lvl="1"/>
+            <a:r>
+              <a:rPr lang="en-US" dirty="0" smtClean="0"/>
+              <a:t>Well defined float32 -&gt; int32 conversions</a:t>
+            </a:r>
+          </a:p>
+          <a:p>
+            <a:pPr lvl="1"/>
+            <a:r>
+              <a:rPr lang="en-US" dirty="0" smtClean="0"/>
+              <a:t>Well defined shift handling for shift counts &gt; 32</a:t>
+            </a:r>
+          </a:p>
+          <a:p>
+            <a:pPr lvl="1"/>
+            <a:r>
+              <a:rPr lang="en-US" dirty="0" smtClean="0"/>
+              <a:t>Precision of </a:t>
+            </a:r>
+            <a:r>
+              <a:rPr lang="en-US" dirty="0" err="1" smtClean="0"/>
+              <a:t>reciprocalSqrt</a:t>
+            </a:r>
+            <a:r>
+              <a:rPr lang="en-US" dirty="0" smtClean="0"/>
+              <a:t> – left undefined</a:t>
+            </a:r>
+          </a:p>
+          <a:p>
+            <a:r>
+              <a:rPr lang="en-US" dirty="0" smtClean="0"/>
+              <a:t>Architecture specific extensions are in the works, for example</a:t>
+            </a:r>
+          </a:p>
+          <a:p>
+            <a:pPr lvl="1"/>
+            <a:r>
+              <a:rPr lang="en-US" dirty="0" smtClean="0"/>
+              <a:t>Float64x2 Division (x86)</a:t>
+            </a:r>
+          </a:p>
+          <a:p>
+            <a:pPr lvl="1"/>
+            <a:r>
+              <a:rPr lang="en-US" dirty="0" err="1" smtClean="0"/>
+              <a:t>Fma</a:t>
+            </a:r>
+            <a:r>
+              <a:rPr lang="en-US" dirty="0" smtClean="0"/>
+              <a:t> (NEON, AVX)</a:t>
+            </a:r>
+          </a:p>
+          <a:p>
+            <a:pPr lvl="1"/>
+            <a:r>
+              <a:rPr lang="en-US" dirty="0" smtClean="0"/>
+              <a:t>Vector shifts (NEON)</a:t>
+            </a:r>
+          </a:p>
+          <a:p>
+            <a:pPr lvl="1"/>
+            <a:endParaRPr lang="en-US" dirty="0" smtClean="0"/>
+          </a:p>
+          <a:p>
+            <a:endParaRPr lang="en-US" dirty="0"/>
+          </a:p>
+        </p:txBody>
+      </p:sp>
+    </p:spTree>
+    <p:extLst>
+      <p:ext uri="{BB962C8B-B14F-4D97-AF65-F5344CB8AC3E}">
+        <p14:creationId xmlns:p14="http://schemas.microsoft.com/office/powerpoint/2010/main" val="2790065815"/>
+      </p:ext>
+    </p:extLst>
+  </p:cSld>
+  <p:clrMapOvr>
+    <a:masterClrMapping/>
+  </p:clrMapOvr>
+</p:sld>
+</file>
+
 <file path=ppt/slides/slide2.xml><?xml version="1.0" encoding="utf-8"?>
 <p:sld xmlns:a="http://schemas.openxmlformats.org/drawingml/2006/main" xmlns:r="http://schemas.openxmlformats.org/officeDocument/2006/relationships" xmlns:p="http://schemas.openxmlformats.org/presentationml/2006/main">
   <p:cSld>
@@ -6264,6 +8376,89 @@
     <p:extLst>
       <p:ext uri="{BB962C8B-B14F-4D97-AF65-F5344CB8AC3E}">
         <p14:creationId xmlns:p14="http://schemas.microsoft.com/office/powerpoint/2010/main" val="1056251742"/>
+      </p:ext>
+    </p:extLst>
+  </p:cSld>
+  <p:clrMapOvr>
+    <a:masterClrMapping/>
+  </p:clrMapOvr>
+</p:sld>
+</file>
+
+<file path=ppt/slides/slide9.xml><?xml version="1.0" encoding="utf-8"?>
+<p:sld xmlns:a="http://schemas.openxmlformats.org/drawingml/2006/main" xmlns:r="http://schemas.openxmlformats.org/officeDocument/2006/relationships" xmlns:p="http://schemas.openxmlformats.org/presentationml/2006/main">
+  <p:cSld>
+    <p:spTree>
+      <p:nvGrpSpPr>
+        <p:cNvPr id="1" name=""/>
+        <p:cNvGrpSpPr/>
+        <p:nvPr/>
+      </p:nvGrpSpPr>
+      <p:grpSpPr>
+        <a:xfrm>
+          <a:off x="0" y="0"/>
+          <a:ext cx="0" cy="0"/>
+          <a:chOff x="0" y="0"/>
+          <a:chExt cx="0" cy="0"/>
+        </a:xfrm>
+      </p:grpSpPr>
+      <p:sp>
+        <p:nvSpPr>
+          <p:cNvPr id="2" name="Title 1"/>
+          <p:cNvSpPr>
+            <a:spLocks noGrp="1"/>
+          </p:cNvSpPr>
+          <p:nvPr>
+            <p:ph type="title"/>
+          </p:nvPr>
+        </p:nvSpPr>
+        <p:spPr/>
+        <p:txBody>
+          <a:bodyPr/>
+          <a:lstStyle/>
+          <a:p>
+            <a:r>
+              <a:rPr lang="en-US" dirty="0" smtClean="0"/>
+              <a:t>SIMD.JS – Object Hierarchy</a:t>
+            </a:r>
+            <a:endParaRPr lang="en-US" dirty="0"/>
+          </a:p>
+        </p:txBody>
+      </p:sp>
+      <p:pic>
+        <p:nvPicPr>
+          <p:cNvPr id="4" name="Picture 3"/>
+          <p:cNvPicPr>
+            <a:picLocks noChangeAspect="1"/>
+          </p:cNvPicPr>
+          <p:nvPr/>
+        </p:nvPicPr>
+        <p:blipFill>
+          <a:blip r:embed="rId2">
+            <a:extLst>
+              <a:ext uri="{28A0092B-C50C-407E-A947-70E740481C1C}">
+                <a14:useLocalDpi xmlns:a14="http://schemas.microsoft.com/office/drawing/2010/main" val="0"/>
+              </a:ext>
+            </a:extLst>
+          </a:blip>
+          <a:stretch>
+            <a:fillRect/>
+          </a:stretch>
+        </p:blipFill>
+        <p:spPr>
+          <a:xfrm>
+            <a:off x="1411693" y="1166497"/>
+            <a:ext cx="9364382" cy="4525006"/>
+          </a:xfrm>
+          <a:prstGeom prst="rect">
+            <a:avLst/>
+          </a:prstGeom>
+        </p:spPr>
+      </p:pic>
+    </p:spTree>
+    <p:extLst>
+      <p:ext uri="{BB962C8B-B14F-4D97-AF65-F5344CB8AC3E}">
+        <p14:creationId xmlns:p14="http://schemas.microsoft.com/office/powerpoint/2010/main" val="1837532814"/>
       </p:ext>
     </p:extLst>
   </p:cSld>

</xml_diff>

<commit_message>
Added more slides for SIMD.JS and Emscripten
</commit_message>
<xml_diff>
--- a/simdjs-presentation.pptx
+++ b/simdjs-presentation.pptx
@@ -17,6 +17,12 @@
     <p:sldId id="266" r:id="rId11"/>
     <p:sldId id="267" r:id="rId12"/>
     <p:sldId id="265" r:id="rId13"/>
+    <p:sldId id="268" r:id="rId14"/>
+    <p:sldId id="269" r:id="rId15"/>
+    <p:sldId id="270" r:id="rId16"/>
+    <p:sldId id="271" r:id="rId17"/>
+    <p:sldId id="272" r:id="rId18"/>
+    <p:sldId id="273" r:id="rId19"/>
   </p:sldIdLst>
   <p:sldSz cx="12192000" cy="6858000"/>
   <p:notesSz cx="6858000" cy="9144000"/>
@@ -1352,7 +1358,7 @@
           <a:p>
             <a:fld id="{D7BAD4AB-A0C0-4804-835B-7CAD5144033B}" type="datetimeFigureOut">
               <a:rPr lang="en-US" smtClean="0"/>
-              <a:t>2/6/2015</a:t>
+              <a:t>2/7/2015</a:t>
             </a:fld>
             <a:endParaRPr lang="en-US"/>
           </a:p>
@@ -1454,7 +1460,7 @@
           <a:p>
             <a:fld id="{D7BAD4AB-A0C0-4804-835B-7CAD5144033B}" type="datetimeFigureOut">
               <a:rPr lang="en-US" smtClean="0"/>
-              <a:t>2/6/2015</a:t>
+              <a:t>2/7/2015</a:t>
             </a:fld>
             <a:endParaRPr lang="en-US"/>
           </a:p>
@@ -2616,7 +2622,7 @@
           <a:p>
             <a:fld id="{D7BAD4AB-A0C0-4804-835B-7CAD5144033B}" type="datetimeFigureOut">
               <a:rPr lang="en-US" smtClean="0"/>
-              <a:t>2/6/2015</a:t>
+              <a:t>2/7/2015</a:t>
             </a:fld>
             <a:endParaRPr lang="en-US"/>
           </a:p>
@@ -2825,7 +2831,7 @@
           <a:p>
             <a:fld id="{D7BAD4AB-A0C0-4804-835B-7CAD5144033B}" type="datetimeFigureOut">
               <a:rPr lang="en-US" smtClean="0"/>
-              <a:t>2/6/2015</a:t>
+              <a:t>2/7/2015</a:t>
             </a:fld>
             <a:endParaRPr lang="en-US"/>
           </a:p>
@@ -3059,7 +3065,7 @@
           <a:p>
             <a:fld id="{D7BAD4AB-A0C0-4804-835B-7CAD5144033B}" type="datetimeFigureOut">
               <a:rPr lang="en-US" smtClean="0"/>
-              <a:t>2/6/2015</a:t>
+              <a:t>2/7/2015</a:t>
             </a:fld>
             <a:endParaRPr lang="en-US"/>
           </a:p>
@@ -3514,7 +3520,7 @@
           <a:p>
             <a:fld id="{D7BAD4AB-A0C0-4804-835B-7CAD5144033B}" type="datetimeFigureOut">
               <a:rPr lang="en-US" smtClean="0"/>
-              <a:t>2/6/2015</a:t>
+              <a:t>2/7/2015</a:t>
             </a:fld>
             <a:endParaRPr lang="en-US"/>
           </a:p>
@@ -3765,7 +3771,7 @@
           <a:p>
             <a:fld id="{D7BAD4AB-A0C0-4804-835B-7CAD5144033B}" type="datetimeFigureOut">
               <a:rPr lang="en-US" smtClean="0"/>
-              <a:t>2/6/2015</a:t>
+              <a:t>2/7/2015</a:t>
             </a:fld>
             <a:endParaRPr lang="en-US"/>
           </a:p>
@@ -3975,7 +3981,7 @@
           <a:p>
             <a:fld id="{D7BAD4AB-A0C0-4804-835B-7CAD5144033B}" type="datetimeFigureOut">
               <a:rPr lang="en-US" smtClean="0"/>
-              <a:t>2/6/2015</a:t>
+              <a:t>2/7/2015</a:t>
             </a:fld>
             <a:endParaRPr lang="en-US"/>
           </a:p>
@@ -4416,7 +4422,7 @@
           <a:p>
             <a:fld id="{D7BAD4AB-A0C0-4804-835B-7CAD5144033B}" type="datetimeFigureOut">
               <a:rPr lang="en-US" smtClean="0"/>
-              <a:t>2/6/2015</a:t>
+              <a:t>2/7/2015</a:t>
             </a:fld>
             <a:endParaRPr lang="en-US"/>
           </a:p>
@@ -4795,7 +4801,7 @@
           <a:p>
             <a:fld id="{D7BAD4AB-A0C0-4804-835B-7CAD5144033B}" type="datetimeFigureOut">
               <a:rPr lang="en-US" smtClean="0"/>
-              <a:t>2/6/2015</a:t>
+              <a:t>2/7/2015</a:t>
             </a:fld>
             <a:endParaRPr lang="en-US"/>
           </a:p>
@@ -7238,12 +7244,6 @@
               </a:rPr>
               <a:t>Scalar</a:t>
             </a:r>
-            <a:endParaRPr lang="en-US" sz="2400" b="1" u="sng" dirty="0" smtClean="0">
-              <a:solidFill>
-                <a:schemeClr val="tx2"/>
-              </a:solidFill>
-              <a:cs typeface="Neo Sans Intel"/>
-            </a:endParaRPr>
           </a:p>
         </p:txBody>
       </p:sp>
@@ -7278,12 +7278,6 @@
               </a:rPr>
               <a:t>SIMD</a:t>
             </a:r>
-            <a:endParaRPr lang="en-US" sz="2400" b="1" u="sng" dirty="0" smtClean="0">
-              <a:solidFill>
-                <a:schemeClr val="tx2"/>
-              </a:solidFill>
-              <a:cs typeface="Neo Sans Intel"/>
-            </a:endParaRPr>
           </a:p>
         </p:txBody>
       </p:sp>
@@ -7413,13 +7407,6 @@
           <a:p>
             <a:pPr lvl="1"/>
             <a:r>
-              <a:rPr lang="en-US" dirty="0" smtClean="0"/>
-              <a:t>Float64x2 Division (x86)</a:t>
-            </a:r>
-          </a:p>
-          <a:p>
-            <a:pPr lvl="1"/>
-            <a:r>
               <a:rPr lang="en-US" dirty="0" err="1" smtClean="0"/>
               <a:t>Fma</a:t>
             </a:r>
@@ -7448,6 +7435,2609 @@
     <p:extLst>
       <p:ext uri="{BB962C8B-B14F-4D97-AF65-F5344CB8AC3E}">
         <p14:creationId xmlns:p14="http://schemas.microsoft.com/office/powerpoint/2010/main" val="2790065815"/>
+      </p:ext>
+    </p:extLst>
+  </p:cSld>
+  <p:clrMapOvr>
+    <a:masterClrMapping/>
+  </p:clrMapOvr>
+</p:sld>
+</file>
+
+<file path=ppt/slides/slide13.xml><?xml version="1.0" encoding="utf-8"?>
+<p:sld xmlns:a="http://schemas.openxmlformats.org/drawingml/2006/main" xmlns:r="http://schemas.openxmlformats.org/officeDocument/2006/relationships" xmlns:p="http://schemas.openxmlformats.org/presentationml/2006/main">
+  <p:cSld>
+    <p:spTree>
+      <p:nvGrpSpPr>
+        <p:cNvPr id="1" name=""/>
+        <p:cNvGrpSpPr/>
+        <p:nvPr/>
+      </p:nvGrpSpPr>
+      <p:grpSpPr>
+        <a:xfrm>
+          <a:off x="0" y="0"/>
+          <a:ext cx="0" cy="0"/>
+          <a:chOff x="0" y="0"/>
+          <a:chExt cx="0" cy="0"/>
+        </a:xfrm>
+      </p:grpSpPr>
+      <p:sp>
+        <p:nvSpPr>
+          <p:cNvPr id="2" name="Title 1"/>
+          <p:cNvSpPr>
+            <a:spLocks noGrp="1"/>
+          </p:cNvSpPr>
+          <p:nvPr>
+            <p:ph type="title"/>
+          </p:nvPr>
+        </p:nvSpPr>
+        <p:spPr/>
+        <p:txBody>
+          <a:bodyPr/>
+          <a:lstStyle/>
+          <a:p>
+            <a:r>
+              <a:rPr lang="en-US" dirty="0" smtClean="0"/>
+              <a:t>Emscripten - Basics</a:t>
+            </a:r>
+            <a:endParaRPr lang="en-US" dirty="0"/>
+          </a:p>
+        </p:txBody>
+      </p:sp>
+      <p:sp>
+        <p:nvSpPr>
+          <p:cNvPr id="3" name="Content Placeholder 2"/>
+          <p:cNvSpPr>
+            <a:spLocks noGrp="1"/>
+          </p:cNvSpPr>
+          <p:nvPr>
+            <p:ph sz="quarter" idx="13"/>
+          </p:nvPr>
+        </p:nvSpPr>
+        <p:spPr/>
+        <p:txBody>
+          <a:bodyPr/>
+          <a:lstStyle/>
+          <a:p>
+            <a:pPr marL="342900" indent="-342900">
+              <a:buFont typeface="Arial" panose="020B0604020202020204" pitchFamily="34" charset="0"/>
+              <a:buChar char="•"/>
+            </a:pPr>
+            <a:r>
+              <a:rPr lang="en-US" dirty="0" smtClean="0"/>
+              <a:t>Brainchild of Mozilla’s Alon Zakai</a:t>
+            </a:r>
+          </a:p>
+          <a:p>
+            <a:pPr marL="342900" indent="-342900">
+              <a:buFont typeface="Arial" panose="020B0604020202020204" pitchFamily="34" charset="0"/>
+              <a:buChar char="•"/>
+            </a:pPr>
+            <a:r>
+              <a:rPr lang="en-US" dirty="0" smtClean="0"/>
+              <a:t>Compiles C/C++ to JavaScript</a:t>
+            </a:r>
+          </a:p>
+          <a:p>
+            <a:pPr marL="342900" indent="-342900">
+              <a:buFont typeface="Arial" panose="020B0604020202020204" pitchFamily="34" charset="0"/>
+              <a:buChar char="•"/>
+            </a:pPr>
+            <a:r>
+              <a:rPr lang="en-US" dirty="0" smtClean="0"/>
+              <a:t>Uses clang/LLVM for C/C++ front-end and optimizer framework</a:t>
+            </a:r>
+          </a:p>
+          <a:p>
+            <a:pPr marL="342900" indent="-342900">
+              <a:buFont typeface="Arial" panose="020B0604020202020204" pitchFamily="34" charset="0"/>
+              <a:buChar char="•"/>
+            </a:pPr>
+            <a:r>
+              <a:rPr lang="en-US" dirty="0" smtClean="0"/>
+              <a:t>Models memory with JS </a:t>
+            </a:r>
+            <a:r>
+              <a:rPr lang="en-US" dirty="0" err="1" smtClean="0"/>
+              <a:t>TypedArrays</a:t>
+            </a:r>
+            <a:endParaRPr lang="en-US" dirty="0" smtClean="0"/>
+          </a:p>
+          <a:p>
+            <a:pPr marL="342900" indent="-342900">
+              <a:buFont typeface="Arial" panose="020B0604020202020204" pitchFamily="34" charset="0"/>
+              <a:buChar char="•"/>
+            </a:pPr>
+            <a:r>
+              <a:rPr lang="en-US" dirty="0" smtClean="0"/>
+              <a:t>Generates the asm.js subset of JavaScript</a:t>
+            </a:r>
+          </a:p>
+          <a:p>
+            <a:pPr marL="342900" indent="-342900">
+              <a:buFont typeface="Arial" panose="020B0604020202020204" pitchFamily="34" charset="0"/>
+              <a:buChar char="•"/>
+            </a:pPr>
+            <a:r>
+              <a:rPr lang="en-US" dirty="0"/>
+              <a:t>Tools available to create bindings between handwritten JS and Emscripten generated JS (</a:t>
+            </a:r>
+            <a:r>
+              <a:rPr lang="en-US" dirty="0" err="1"/>
+              <a:t>webidl_binder</a:t>
+            </a:r>
+            <a:r>
+              <a:rPr lang="en-US" dirty="0"/>
+              <a:t>)</a:t>
+            </a:r>
+          </a:p>
+          <a:p>
+            <a:pPr marL="342900" indent="-342900">
+              <a:buFont typeface="Arial" panose="020B0604020202020204" pitchFamily="34" charset="0"/>
+              <a:buChar char="•"/>
+            </a:pPr>
+            <a:r>
+              <a:rPr lang="en-US" dirty="0" smtClean="0"/>
+              <a:t>Several large C/C++ applications/games have been ported to the web platform (e.g., Unity, Unreal, box2D)</a:t>
+            </a:r>
+            <a:endParaRPr lang="en-US" dirty="0"/>
+          </a:p>
+        </p:txBody>
+      </p:sp>
+    </p:spTree>
+    <p:extLst>
+      <p:ext uri="{BB962C8B-B14F-4D97-AF65-F5344CB8AC3E}">
+        <p14:creationId xmlns:p14="http://schemas.microsoft.com/office/powerpoint/2010/main" val="2591634468"/>
+      </p:ext>
+    </p:extLst>
+  </p:cSld>
+  <p:clrMapOvr>
+    <a:masterClrMapping/>
+  </p:clrMapOvr>
+</p:sld>
+</file>
+
+<file path=ppt/slides/slide14.xml><?xml version="1.0" encoding="utf-8"?>
+<p:sld xmlns:a="http://schemas.openxmlformats.org/drawingml/2006/main" xmlns:r="http://schemas.openxmlformats.org/officeDocument/2006/relationships" xmlns:p="http://schemas.openxmlformats.org/presentationml/2006/main">
+  <p:cSld>
+    <p:spTree>
+      <p:nvGrpSpPr>
+        <p:cNvPr id="1" name=""/>
+        <p:cNvGrpSpPr/>
+        <p:nvPr/>
+      </p:nvGrpSpPr>
+      <p:grpSpPr>
+        <a:xfrm>
+          <a:off x="0" y="0"/>
+          <a:ext cx="0" cy="0"/>
+          <a:chOff x="0" y="0"/>
+          <a:chExt cx="0" cy="0"/>
+        </a:xfrm>
+      </p:grpSpPr>
+      <p:sp>
+        <p:nvSpPr>
+          <p:cNvPr id="2" name="Title 1"/>
+          <p:cNvSpPr>
+            <a:spLocks noGrp="1"/>
+          </p:cNvSpPr>
+          <p:nvPr>
+            <p:ph type="title"/>
+          </p:nvPr>
+        </p:nvSpPr>
+        <p:spPr/>
+        <p:txBody>
+          <a:bodyPr/>
+          <a:lstStyle/>
+          <a:p>
+            <a:r>
+              <a:rPr lang="en-US" dirty="0" smtClean="0"/>
+              <a:t>Emscripten – C/C++ -&gt; JS Memory Modelling</a:t>
+            </a:r>
+            <a:endParaRPr lang="en-US" dirty="0"/>
+          </a:p>
+        </p:txBody>
+      </p:sp>
+      <p:sp>
+        <p:nvSpPr>
+          <p:cNvPr id="3" name="Content Placeholder 2"/>
+          <p:cNvSpPr>
+            <a:spLocks noGrp="1"/>
+          </p:cNvSpPr>
+          <p:nvPr>
+            <p:ph sz="quarter" idx="13"/>
+          </p:nvPr>
+        </p:nvSpPr>
+        <p:spPr>
+          <a:xfrm>
+            <a:off x="607484" y="2215564"/>
+            <a:ext cx="4487030" cy="2587556"/>
+          </a:xfrm>
+        </p:spPr>
+        <p:txBody>
+          <a:bodyPr/>
+          <a:lstStyle/>
+          <a:p>
+            <a:pPr marL="342900" indent="-342900">
+              <a:buFont typeface="Arial" panose="020B0604020202020204" pitchFamily="34" charset="0"/>
+              <a:buChar char="•"/>
+            </a:pPr>
+            <a:r>
+              <a:rPr lang="en-US" dirty="0" smtClean="0"/>
+              <a:t>Views over the same memory (buffer) for basic C/C++ types</a:t>
+            </a:r>
+          </a:p>
+          <a:p>
+            <a:pPr marL="342900" indent="-342900">
+              <a:buFont typeface="Arial" panose="020B0604020202020204" pitchFamily="34" charset="0"/>
+              <a:buChar char="•"/>
+            </a:pPr>
+            <a:r>
+              <a:rPr lang="en-US" dirty="0" smtClean="0"/>
+              <a:t>Pointers are indices used to access elements of these arrays</a:t>
+            </a:r>
+            <a:endParaRPr lang="en-US" dirty="0"/>
+          </a:p>
+        </p:txBody>
+      </p:sp>
+      <p:sp>
+        <p:nvSpPr>
+          <p:cNvPr id="5" name="TextBox 4"/>
+          <p:cNvSpPr txBox="1"/>
+          <p:nvPr/>
+        </p:nvSpPr>
+        <p:spPr>
+          <a:xfrm>
+            <a:off x="5628905" y="2078181"/>
+            <a:ext cx="6181500" cy="2862322"/>
+          </a:xfrm>
+          <a:prstGeom prst="rect">
+            <a:avLst/>
+          </a:prstGeom>
+          <a:noFill/>
+        </p:spPr>
+        <p:txBody>
+          <a:bodyPr wrap="none" rtlCol="0">
+            <a:spAutoFit/>
+          </a:bodyPr>
+          <a:lstStyle/>
+          <a:p>
+            <a:r>
+              <a:rPr lang="en-US" dirty="0" err="1">
+                <a:solidFill>
+                  <a:schemeClr val="tx2"/>
+                </a:solidFill>
+                <a:latin typeface="Lucida Console" panose="020B0609040504020204" pitchFamily="49" charset="0"/>
+                <a:cs typeface="Neo Sans Intel"/>
+              </a:rPr>
+              <a:t>var</a:t>
+            </a:r>
+            <a:r>
+              <a:rPr lang="en-US" dirty="0">
+                <a:solidFill>
+                  <a:schemeClr val="tx2"/>
+                </a:solidFill>
+                <a:latin typeface="Lucida Console" panose="020B0609040504020204" pitchFamily="49" charset="0"/>
+                <a:cs typeface="Neo Sans Intel"/>
+              </a:rPr>
+              <a:t> buffer = new </a:t>
+            </a:r>
+            <a:r>
+              <a:rPr lang="en-US" dirty="0" err="1">
+                <a:solidFill>
+                  <a:schemeClr val="tx2"/>
+                </a:solidFill>
+                <a:latin typeface="Lucida Console" panose="020B0609040504020204" pitchFamily="49" charset="0"/>
+                <a:cs typeface="Neo Sans Intel"/>
+              </a:rPr>
+              <a:t>ArrayBuffer</a:t>
+            </a:r>
+            <a:r>
+              <a:rPr lang="en-US" dirty="0">
+                <a:solidFill>
+                  <a:schemeClr val="tx2"/>
+                </a:solidFill>
+                <a:latin typeface="Lucida Console" panose="020B0609040504020204" pitchFamily="49" charset="0"/>
+                <a:cs typeface="Neo Sans Intel"/>
+              </a:rPr>
+              <a:t>(TOTAL_MEMORY);</a:t>
+            </a:r>
+          </a:p>
+          <a:p>
+            <a:r>
+              <a:rPr lang="en-US" dirty="0">
+                <a:solidFill>
+                  <a:schemeClr val="tx2"/>
+                </a:solidFill>
+                <a:latin typeface="Lucida Console" panose="020B0609040504020204" pitchFamily="49" charset="0"/>
+                <a:cs typeface="Neo Sans Intel"/>
+              </a:rPr>
+              <a:t>HEAP8 = new Int8Array(buffer);</a:t>
+            </a:r>
+          </a:p>
+          <a:p>
+            <a:r>
+              <a:rPr lang="en-US" dirty="0">
+                <a:solidFill>
+                  <a:schemeClr val="tx2"/>
+                </a:solidFill>
+                <a:latin typeface="Lucida Console" panose="020B0609040504020204" pitchFamily="49" charset="0"/>
+                <a:cs typeface="Neo Sans Intel"/>
+              </a:rPr>
+              <a:t>HEAP16 = new Int16Array(buffer);</a:t>
+            </a:r>
+          </a:p>
+          <a:p>
+            <a:r>
+              <a:rPr lang="en-US" dirty="0">
+                <a:solidFill>
+                  <a:schemeClr val="tx2"/>
+                </a:solidFill>
+                <a:latin typeface="Lucida Console" panose="020B0609040504020204" pitchFamily="49" charset="0"/>
+                <a:cs typeface="Neo Sans Intel"/>
+              </a:rPr>
+              <a:t>HEAP32 = new Int32Array(buffer);</a:t>
+            </a:r>
+          </a:p>
+          <a:p>
+            <a:r>
+              <a:rPr lang="en-US" dirty="0">
+                <a:solidFill>
+                  <a:schemeClr val="tx2"/>
+                </a:solidFill>
+                <a:latin typeface="Lucida Console" panose="020B0609040504020204" pitchFamily="49" charset="0"/>
+                <a:cs typeface="Neo Sans Intel"/>
+              </a:rPr>
+              <a:t>HEAPU8 = new Uint8Array(buffer);</a:t>
+            </a:r>
+          </a:p>
+          <a:p>
+            <a:r>
+              <a:rPr lang="en-US" dirty="0">
+                <a:solidFill>
+                  <a:schemeClr val="tx2"/>
+                </a:solidFill>
+                <a:latin typeface="Lucida Console" panose="020B0609040504020204" pitchFamily="49" charset="0"/>
+                <a:cs typeface="Neo Sans Intel"/>
+              </a:rPr>
+              <a:t>HEAPU16 = new Uint16Array(buffer);</a:t>
+            </a:r>
+          </a:p>
+          <a:p>
+            <a:r>
+              <a:rPr lang="en-US" dirty="0">
+                <a:solidFill>
+                  <a:schemeClr val="tx2"/>
+                </a:solidFill>
+                <a:latin typeface="Lucida Console" panose="020B0609040504020204" pitchFamily="49" charset="0"/>
+                <a:cs typeface="Neo Sans Intel"/>
+              </a:rPr>
+              <a:t>HEAPU32 = new Uint32Array(buffer);</a:t>
+            </a:r>
+          </a:p>
+          <a:p>
+            <a:r>
+              <a:rPr lang="en-US" dirty="0">
+                <a:solidFill>
+                  <a:schemeClr val="tx2"/>
+                </a:solidFill>
+                <a:latin typeface="Lucida Console" panose="020B0609040504020204" pitchFamily="49" charset="0"/>
+                <a:cs typeface="Neo Sans Intel"/>
+              </a:rPr>
+              <a:t>HEAPF32 = new Float32Array(buffer);</a:t>
+            </a:r>
+          </a:p>
+          <a:p>
+            <a:r>
+              <a:rPr lang="en-US" dirty="0">
+                <a:solidFill>
+                  <a:schemeClr val="tx2"/>
+                </a:solidFill>
+                <a:latin typeface="Lucida Console" panose="020B0609040504020204" pitchFamily="49" charset="0"/>
+                <a:cs typeface="Neo Sans Intel"/>
+              </a:rPr>
+              <a:t>HEAPF64 = new Float64Array(buffer);</a:t>
+            </a:r>
+          </a:p>
+          <a:p>
+            <a:endParaRPr lang="en-US" dirty="0" smtClean="0">
+              <a:solidFill>
+                <a:schemeClr val="tx2"/>
+              </a:solidFill>
+              <a:latin typeface="Lucida Console" panose="020B0609040504020204" pitchFamily="49" charset="0"/>
+              <a:cs typeface="Neo Sans Intel"/>
+            </a:endParaRPr>
+          </a:p>
+        </p:txBody>
+      </p:sp>
+    </p:spTree>
+    <p:extLst>
+      <p:ext uri="{BB962C8B-B14F-4D97-AF65-F5344CB8AC3E}">
+        <p14:creationId xmlns:p14="http://schemas.microsoft.com/office/powerpoint/2010/main" val="10713401"/>
+      </p:ext>
+    </p:extLst>
+  </p:cSld>
+  <p:clrMapOvr>
+    <a:masterClrMapping/>
+  </p:clrMapOvr>
+</p:sld>
+</file>
+
+<file path=ppt/slides/slide15.xml><?xml version="1.0" encoding="utf-8"?>
+<p:sld xmlns:a="http://schemas.openxmlformats.org/drawingml/2006/main" xmlns:r="http://schemas.openxmlformats.org/officeDocument/2006/relationships" xmlns:p="http://schemas.openxmlformats.org/presentationml/2006/main">
+  <p:cSld>
+    <p:spTree>
+      <p:nvGrpSpPr>
+        <p:cNvPr id="1" name=""/>
+        <p:cNvGrpSpPr/>
+        <p:nvPr/>
+      </p:nvGrpSpPr>
+      <p:grpSpPr>
+        <a:xfrm>
+          <a:off x="0" y="0"/>
+          <a:ext cx="0" cy="0"/>
+          <a:chOff x="0" y="0"/>
+          <a:chExt cx="0" cy="0"/>
+        </a:xfrm>
+      </p:grpSpPr>
+      <p:sp>
+        <p:nvSpPr>
+          <p:cNvPr id="2" name="Title 1"/>
+          <p:cNvSpPr>
+            <a:spLocks noGrp="1"/>
+          </p:cNvSpPr>
+          <p:nvPr>
+            <p:ph type="title"/>
+          </p:nvPr>
+        </p:nvSpPr>
+        <p:spPr/>
+        <p:txBody>
+          <a:bodyPr/>
+          <a:lstStyle/>
+          <a:p>
+            <a:r>
+              <a:rPr lang="en-US" dirty="0" smtClean="0"/>
+              <a:t>Emscripten – Generated Code Example</a:t>
+            </a:r>
+            <a:endParaRPr lang="en-US" dirty="0"/>
+          </a:p>
+        </p:txBody>
+      </p:sp>
+      <p:sp>
+        <p:nvSpPr>
+          <p:cNvPr id="3" name="Content Placeholder 2"/>
+          <p:cNvSpPr>
+            <a:spLocks noGrp="1"/>
+          </p:cNvSpPr>
+          <p:nvPr>
+            <p:ph sz="quarter" idx="13"/>
+          </p:nvPr>
+        </p:nvSpPr>
+        <p:spPr>
+          <a:xfrm>
+            <a:off x="607484" y="3139698"/>
+            <a:ext cx="4647426" cy="3427358"/>
+          </a:xfrm>
+        </p:spPr>
+        <p:txBody>
+          <a:bodyPr>
+            <a:normAutofit fontScale="92500" lnSpcReduction="10000"/>
+          </a:bodyPr>
+          <a:lstStyle/>
+          <a:p>
+            <a:pPr marL="342900" indent="-342900">
+              <a:buFont typeface="Arial" panose="020B0604020202020204" pitchFamily="34" charset="0"/>
+              <a:buChar char="•"/>
+            </a:pPr>
+            <a:r>
+              <a:rPr lang="en-US" dirty="0" smtClean="0"/>
+              <a:t>Unary ‘+’ (+expr) used as hint to JIT compiler to indicate number</a:t>
+            </a:r>
+          </a:p>
+          <a:p>
+            <a:pPr marL="342900" indent="-342900">
+              <a:buFont typeface="Arial" panose="020B0604020202020204" pitchFamily="34" charset="0"/>
+              <a:buChar char="•"/>
+            </a:pPr>
+            <a:r>
+              <a:rPr lang="en-US" dirty="0" smtClean="0"/>
+              <a:t>Bitwise-Or zero (expr | 0) used to indicate 32-bit signed </a:t>
+            </a:r>
+            <a:r>
+              <a:rPr lang="en-US" dirty="0" err="1" smtClean="0"/>
+              <a:t>int</a:t>
+            </a:r>
+            <a:endParaRPr lang="en-US" dirty="0" smtClean="0"/>
+          </a:p>
+          <a:p>
+            <a:pPr marL="342900" indent="-342900">
+              <a:buFont typeface="Arial" panose="020B0604020202020204" pitchFamily="34" charset="0"/>
+              <a:buChar char="•"/>
+            </a:pPr>
+            <a:r>
+              <a:rPr lang="en-US" dirty="0" smtClean="0"/>
+              <a:t>Unsigned shift right (&gt;&gt;&gt;) used to indicate 32-bit unsigned </a:t>
+            </a:r>
+            <a:r>
+              <a:rPr lang="en-US" dirty="0" err="1" smtClean="0"/>
+              <a:t>int</a:t>
+            </a:r>
+            <a:endParaRPr lang="en-US" dirty="0" smtClean="0"/>
+          </a:p>
+          <a:p>
+            <a:pPr marL="342900" indent="-342900">
+              <a:buFont typeface="Arial" panose="020B0604020202020204" pitchFamily="34" charset="0"/>
+              <a:buChar char="•"/>
+            </a:pPr>
+            <a:r>
+              <a:rPr lang="en-US" dirty="0" smtClean="0"/>
+              <a:t>Addresses are byte addresses. Need to shift right by 2 to get the right index</a:t>
+            </a:r>
+            <a:endParaRPr lang="en-US" dirty="0"/>
+          </a:p>
+        </p:txBody>
+      </p:sp>
+      <p:sp>
+        <p:nvSpPr>
+          <p:cNvPr id="4" name="TextBox 3"/>
+          <p:cNvSpPr txBox="1"/>
+          <p:nvPr/>
+        </p:nvSpPr>
+        <p:spPr>
+          <a:xfrm>
+            <a:off x="5394372" y="1570037"/>
+            <a:ext cx="6320961" cy="3139321"/>
+          </a:xfrm>
+          <a:prstGeom prst="rect">
+            <a:avLst/>
+          </a:prstGeom>
+          <a:noFill/>
+        </p:spPr>
+        <p:txBody>
+          <a:bodyPr wrap="none" rtlCol="0">
+            <a:spAutoFit/>
+          </a:bodyPr>
+          <a:lstStyle/>
+          <a:p>
+            <a:r>
+              <a:rPr lang="en-US" dirty="0" smtClean="0">
+                <a:solidFill>
+                  <a:schemeClr val="tx2"/>
+                </a:solidFill>
+                <a:latin typeface="Lucida Console" panose="020B0609040504020204" pitchFamily="49" charset="0"/>
+                <a:cs typeface="Neo Sans Intel"/>
+              </a:rPr>
+              <a:t>while </a:t>
+            </a:r>
+            <a:r>
+              <a:rPr lang="en-US" dirty="0">
+                <a:solidFill>
+                  <a:schemeClr val="tx2"/>
+                </a:solidFill>
+                <a:latin typeface="Lucida Console" panose="020B0609040504020204" pitchFamily="49" charset="0"/>
+                <a:cs typeface="Neo Sans Intel"/>
+              </a:rPr>
+              <a:t>(1) {</a:t>
+            </a:r>
+          </a:p>
+          <a:p>
+            <a:r>
+              <a:rPr lang="en-US" dirty="0" smtClean="0">
+                <a:solidFill>
+                  <a:schemeClr val="tx2"/>
+                </a:solidFill>
+                <a:latin typeface="Lucida Console" panose="020B0609040504020204" pitchFamily="49" charset="0"/>
+                <a:cs typeface="Neo Sans Intel"/>
+              </a:rPr>
+              <a:t> </a:t>
+            </a:r>
+            <a:r>
+              <a:rPr lang="en-US" dirty="0">
+                <a:solidFill>
+                  <a:schemeClr val="tx2"/>
+                </a:solidFill>
+                <a:latin typeface="Lucida Console" panose="020B0609040504020204" pitchFamily="49" charset="0"/>
+                <a:cs typeface="Neo Sans Intel"/>
+              </a:rPr>
+              <a:t>$add = $sum$04 + +HEAPF32[$a$addr$06 &gt;&gt; 2];</a:t>
+            </a:r>
+          </a:p>
+          <a:p>
+            <a:r>
+              <a:rPr lang="en-US" dirty="0" smtClean="0">
+                <a:solidFill>
+                  <a:schemeClr val="tx2"/>
+                </a:solidFill>
+                <a:latin typeface="Lucida Console" panose="020B0609040504020204" pitchFamily="49" charset="0"/>
+                <a:cs typeface="Neo Sans Intel"/>
+              </a:rPr>
+              <a:t> </a:t>
+            </a:r>
+            <a:r>
+              <a:rPr lang="en-US" dirty="0">
+                <a:solidFill>
+                  <a:schemeClr val="tx2"/>
+                </a:solidFill>
+                <a:latin typeface="Lucida Console" panose="020B0609040504020204" pitchFamily="49" charset="0"/>
+                <a:cs typeface="Neo Sans Intel"/>
+              </a:rPr>
+              <a:t>$j$05 = $j$05 + 4 | 0;</a:t>
+            </a:r>
+          </a:p>
+          <a:p>
+            <a:r>
+              <a:rPr lang="en-US" dirty="0" smtClean="0">
+                <a:solidFill>
+                  <a:schemeClr val="tx2"/>
+                </a:solidFill>
+                <a:latin typeface="Lucida Console" panose="020B0609040504020204" pitchFamily="49" charset="0"/>
+                <a:cs typeface="Neo Sans Intel"/>
+              </a:rPr>
+              <a:t> </a:t>
+            </a:r>
+            <a:r>
+              <a:rPr lang="en-US" dirty="0">
+                <a:solidFill>
+                  <a:schemeClr val="tx2"/>
+                </a:solidFill>
+                <a:latin typeface="Lucida Console" panose="020B0609040504020204" pitchFamily="49" charset="0"/>
+                <a:cs typeface="Neo Sans Intel"/>
+              </a:rPr>
+              <a:t>if (!($j$05 &gt;&gt;&gt; 0 &lt; $length &gt;&gt;&gt; 0)) {</a:t>
+            </a:r>
+          </a:p>
+          <a:p>
+            <a:r>
+              <a:rPr lang="en-US" dirty="0" smtClean="0">
+                <a:solidFill>
+                  <a:schemeClr val="tx2"/>
+                </a:solidFill>
+                <a:latin typeface="Lucida Console" panose="020B0609040504020204" pitchFamily="49" charset="0"/>
+                <a:cs typeface="Neo Sans Intel"/>
+              </a:rPr>
+              <a:t>  </a:t>
+            </a:r>
+            <a:r>
+              <a:rPr lang="en-US" dirty="0">
+                <a:solidFill>
+                  <a:schemeClr val="tx2"/>
+                </a:solidFill>
+                <a:latin typeface="Lucida Console" panose="020B0609040504020204" pitchFamily="49" charset="0"/>
+                <a:cs typeface="Neo Sans Intel"/>
+              </a:rPr>
+              <a:t>$sum$0$lcssa = $add;</a:t>
+            </a:r>
+          </a:p>
+          <a:p>
+            <a:r>
+              <a:rPr lang="en-US" dirty="0" smtClean="0">
+                <a:solidFill>
+                  <a:schemeClr val="tx2"/>
+                </a:solidFill>
+                <a:latin typeface="Lucida Console" panose="020B0609040504020204" pitchFamily="49" charset="0"/>
+                <a:cs typeface="Neo Sans Intel"/>
+              </a:rPr>
+              <a:t>  </a:t>
+            </a:r>
+            <a:r>
+              <a:rPr lang="en-US" dirty="0">
+                <a:solidFill>
+                  <a:schemeClr val="tx2"/>
+                </a:solidFill>
+                <a:latin typeface="Lucida Console" panose="020B0609040504020204" pitchFamily="49" charset="0"/>
+                <a:cs typeface="Neo Sans Intel"/>
+              </a:rPr>
+              <a:t>break;</a:t>
+            </a:r>
+          </a:p>
+          <a:p>
+            <a:r>
+              <a:rPr lang="en-US" dirty="0" smtClean="0">
+                <a:solidFill>
+                  <a:schemeClr val="tx2"/>
+                </a:solidFill>
+                <a:latin typeface="Lucida Console" panose="020B0609040504020204" pitchFamily="49" charset="0"/>
+                <a:cs typeface="Neo Sans Intel"/>
+              </a:rPr>
+              <a:t> </a:t>
+            </a:r>
+            <a:r>
+              <a:rPr lang="en-US" dirty="0">
+                <a:solidFill>
+                  <a:schemeClr val="tx2"/>
+                </a:solidFill>
+                <a:latin typeface="Lucida Console" panose="020B0609040504020204" pitchFamily="49" charset="0"/>
+                <a:cs typeface="Neo Sans Intel"/>
+              </a:rPr>
+              <a:t>} else {</a:t>
+            </a:r>
+          </a:p>
+          <a:p>
+            <a:r>
+              <a:rPr lang="en-US" dirty="0" smtClean="0">
+                <a:solidFill>
+                  <a:schemeClr val="tx2"/>
+                </a:solidFill>
+                <a:latin typeface="Lucida Console" panose="020B0609040504020204" pitchFamily="49" charset="0"/>
+                <a:cs typeface="Neo Sans Intel"/>
+              </a:rPr>
+              <a:t>  </a:t>
+            </a:r>
+            <a:r>
+              <a:rPr lang="en-US" dirty="0">
+                <a:solidFill>
+                  <a:schemeClr val="tx2"/>
+                </a:solidFill>
+                <a:latin typeface="Lucida Console" panose="020B0609040504020204" pitchFamily="49" charset="0"/>
+                <a:cs typeface="Neo Sans Intel"/>
+              </a:rPr>
+              <a:t>$a$addr$06 = $a$addr$06 + 4 | 0;</a:t>
+            </a:r>
+          </a:p>
+          <a:p>
+            <a:r>
+              <a:rPr lang="en-US" dirty="0" smtClean="0">
+                <a:solidFill>
+                  <a:schemeClr val="tx2"/>
+                </a:solidFill>
+                <a:latin typeface="Lucida Console" panose="020B0609040504020204" pitchFamily="49" charset="0"/>
+                <a:cs typeface="Neo Sans Intel"/>
+              </a:rPr>
+              <a:t>  </a:t>
+            </a:r>
+            <a:r>
+              <a:rPr lang="en-US" dirty="0">
+                <a:solidFill>
+                  <a:schemeClr val="tx2"/>
+                </a:solidFill>
+                <a:latin typeface="Lucida Console" panose="020B0609040504020204" pitchFamily="49" charset="0"/>
+                <a:cs typeface="Neo Sans Intel"/>
+              </a:rPr>
+              <a:t>$sum$04 = $add;</a:t>
+            </a:r>
+          </a:p>
+          <a:p>
+            <a:r>
+              <a:rPr lang="en-US" dirty="0" smtClean="0">
+                <a:solidFill>
+                  <a:schemeClr val="tx2"/>
+                </a:solidFill>
+                <a:latin typeface="Lucida Console" panose="020B0609040504020204" pitchFamily="49" charset="0"/>
+                <a:cs typeface="Neo Sans Intel"/>
+              </a:rPr>
+              <a:t> </a:t>
+            </a:r>
+            <a:r>
+              <a:rPr lang="en-US" dirty="0">
+                <a:solidFill>
+                  <a:schemeClr val="tx2"/>
+                </a:solidFill>
+                <a:latin typeface="Lucida Console" panose="020B0609040504020204" pitchFamily="49" charset="0"/>
+                <a:cs typeface="Neo Sans Intel"/>
+              </a:rPr>
+              <a:t>}</a:t>
+            </a:r>
+          </a:p>
+          <a:p>
+            <a:r>
+              <a:rPr lang="en-US" dirty="0" smtClean="0">
+                <a:solidFill>
+                  <a:schemeClr val="tx2"/>
+                </a:solidFill>
+                <a:latin typeface="Lucida Console" panose="020B0609040504020204" pitchFamily="49" charset="0"/>
+                <a:cs typeface="Neo Sans Intel"/>
+              </a:rPr>
+              <a:t>}</a:t>
+            </a:r>
+          </a:p>
+        </p:txBody>
+      </p:sp>
+      <p:sp>
+        <p:nvSpPr>
+          <p:cNvPr id="5" name="TextBox 4"/>
+          <p:cNvSpPr txBox="1"/>
+          <p:nvPr/>
+        </p:nvSpPr>
+        <p:spPr>
+          <a:xfrm>
+            <a:off x="607484" y="1570037"/>
+            <a:ext cx="4647426" cy="1477328"/>
+          </a:xfrm>
+          <a:prstGeom prst="rect">
+            <a:avLst/>
+          </a:prstGeom>
+          <a:noFill/>
+        </p:spPr>
+        <p:txBody>
+          <a:bodyPr wrap="none" rtlCol="0">
+            <a:spAutoFit/>
+          </a:bodyPr>
+          <a:lstStyle/>
+          <a:p>
+            <a:r>
+              <a:rPr lang="en-US" dirty="0" smtClean="0">
+                <a:solidFill>
+                  <a:schemeClr val="tx2"/>
+                </a:solidFill>
+                <a:latin typeface="Lucida Console" panose="020B0609040504020204" pitchFamily="49" charset="0"/>
+                <a:cs typeface="Neo Sans Intel"/>
+              </a:rPr>
+              <a:t>for </a:t>
+            </a:r>
+            <a:r>
+              <a:rPr lang="en-US" dirty="0">
+                <a:solidFill>
+                  <a:schemeClr val="tx2"/>
+                </a:solidFill>
+                <a:latin typeface="Lucida Console" panose="020B0609040504020204" pitchFamily="49" charset="0"/>
+                <a:cs typeface="Neo Sans Intel"/>
+              </a:rPr>
+              <a:t>(uint32_t j = 0, l = length</a:t>
+            </a:r>
+            <a:r>
+              <a:rPr lang="en-US" dirty="0" smtClean="0">
+                <a:solidFill>
+                  <a:schemeClr val="tx2"/>
+                </a:solidFill>
+                <a:latin typeface="Lucida Console" panose="020B0609040504020204" pitchFamily="49" charset="0"/>
+                <a:cs typeface="Neo Sans Intel"/>
+              </a:rPr>
+              <a:t>;</a:t>
+            </a:r>
+          </a:p>
+          <a:p>
+            <a:r>
+              <a:rPr lang="en-US" dirty="0" smtClean="0">
+                <a:solidFill>
+                  <a:schemeClr val="tx2"/>
+                </a:solidFill>
+                <a:latin typeface="Lucida Console" panose="020B0609040504020204" pitchFamily="49" charset="0"/>
+                <a:cs typeface="Neo Sans Intel"/>
+              </a:rPr>
+              <a:t>     </a:t>
+            </a:r>
+            <a:r>
+              <a:rPr lang="en-US" dirty="0">
+                <a:solidFill>
+                  <a:schemeClr val="tx2"/>
+                </a:solidFill>
+                <a:latin typeface="Lucida Console" panose="020B0609040504020204" pitchFamily="49" charset="0"/>
+                <a:cs typeface="Neo Sans Intel"/>
+              </a:rPr>
+              <a:t>j &lt; l</a:t>
+            </a:r>
+            <a:r>
+              <a:rPr lang="en-US" dirty="0" smtClean="0">
+                <a:solidFill>
+                  <a:schemeClr val="tx2"/>
+                </a:solidFill>
+                <a:latin typeface="Lucida Console" panose="020B0609040504020204" pitchFamily="49" charset="0"/>
+                <a:cs typeface="Neo Sans Intel"/>
+              </a:rPr>
+              <a:t>;</a:t>
+            </a:r>
+          </a:p>
+          <a:p>
+            <a:r>
+              <a:rPr lang="en-US" dirty="0" smtClean="0">
+                <a:solidFill>
+                  <a:schemeClr val="tx2"/>
+                </a:solidFill>
+                <a:latin typeface="Lucida Console" panose="020B0609040504020204" pitchFamily="49" charset="0"/>
+                <a:cs typeface="Neo Sans Intel"/>
+              </a:rPr>
+              <a:t>     </a:t>
+            </a:r>
+            <a:r>
+              <a:rPr lang="en-US" dirty="0">
+                <a:solidFill>
+                  <a:schemeClr val="tx2"/>
+                </a:solidFill>
+                <a:latin typeface="Lucida Console" panose="020B0609040504020204" pitchFamily="49" charset="0"/>
+                <a:cs typeface="Neo Sans Intel"/>
+              </a:rPr>
+              <a:t>j = j + 4) {</a:t>
+            </a:r>
+          </a:p>
+          <a:p>
+            <a:r>
+              <a:rPr lang="en-US" dirty="0" smtClean="0">
+                <a:solidFill>
+                  <a:schemeClr val="tx2"/>
+                </a:solidFill>
+                <a:latin typeface="Lucida Console" panose="020B0609040504020204" pitchFamily="49" charset="0"/>
+                <a:cs typeface="Neo Sans Intel"/>
+              </a:rPr>
+              <a:t>  </a:t>
+            </a:r>
+            <a:r>
+              <a:rPr lang="en-US" dirty="0">
+                <a:solidFill>
+                  <a:schemeClr val="tx2"/>
+                </a:solidFill>
+                <a:latin typeface="Lucida Console" panose="020B0609040504020204" pitchFamily="49" charset="0"/>
+                <a:cs typeface="Neo Sans Intel"/>
+              </a:rPr>
+              <a:t>sum = sum + *(a++);</a:t>
+            </a:r>
+          </a:p>
+          <a:p>
+            <a:r>
+              <a:rPr lang="en-US" dirty="0" smtClean="0">
+                <a:solidFill>
+                  <a:schemeClr val="tx2"/>
+                </a:solidFill>
+                <a:latin typeface="Lucida Console" panose="020B0609040504020204" pitchFamily="49" charset="0"/>
+                <a:cs typeface="Neo Sans Intel"/>
+              </a:rPr>
+              <a:t>}</a:t>
+            </a:r>
+          </a:p>
+        </p:txBody>
+      </p:sp>
+      <p:sp>
+        <p:nvSpPr>
+          <p:cNvPr id="6" name="Oval 5"/>
+          <p:cNvSpPr/>
+          <p:nvPr/>
+        </p:nvSpPr>
+        <p:spPr>
+          <a:xfrm>
+            <a:off x="7818120" y="1644842"/>
+            <a:ext cx="3897213" cy="710025"/>
+          </a:xfrm>
+          <a:prstGeom prst="ellipse">
+            <a:avLst/>
+          </a:prstGeom>
+          <a:noFill/>
+          <a:ln w="38100">
+            <a:solidFill>
+              <a:srgbClr val="FF0000"/>
+            </a:solidFill>
+          </a:ln>
+          <a:effectLst/>
+        </p:spPr>
+        <p:style>
+          <a:lnRef idx="1">
+            <a:schemeClr val="accent1"/>
+          </a:lnRef>
+          <a:fillRef idx="3">
+            <a:schemeClr val="accent1"/>
+          </a:fillRef>
+          <a:effectRef idx="2">
+            <a:schemeClr val="accent1"/>
+          </a:effectRef>
+          <a:fontRef idx="minor">
+            <a:schemeClr val="lt1"/>
+          </a:fontRef>
+        </p:style>
+        <p:txBody>
+          <a:bodyPr rtlCol="0" anchor="ctr"/>
+          <a:lstStyle/>
+          <a:p>
+            <a:pPr algn="ctr"/>
+            <a:endParaRPr lang="en-US"/>
+          </a:p>
+        </p:txBody>
+      </p:sp>
+      <p:sp>
+        <p:nvSpPr>
+          <p:cNvPr id="7" name="Oval 6"/>
+          <p:cNvSpPr/>
+          <p:nvPr/>
+        </p:nvSpPr>
+        <p:spPr>
+          <a:xfrm>
+            <a:off x="7101840" y="3321242"/>
+            <a:ext cx="3897213" cy="710025"/>
+          </a:xfrm>
+          <a:prstGeom prst="ellipse">
+            <a:avLst/>
+          </a:prstGeom>
+          <a:noFill/>
+          <a:ln w="38100">
+            <a:solidFill>
+              <a:srgbClr val="FF0000"/>
+            </a:solidFill>
+          </a:ln>
+          <a:effectLst/>
+        </p:spPr>
+        <p:style>
+          <a:lnRef idx="1">
+            <a:schemeClr val="accent1"/>
+          </a:lnRef>
+          <a:fillRef idx="3">
+            <a:schemeClr val="accent1"/>
+          </a:fillRef>
+          <a:effectRef idx="2">
+            <a:schemeClr val="accent1"/>
+          </a:effectRef>
+          <a:fontRef idx="minor">
+            <a:schemeClr val="lt1"/>
+          </a:fontRef>
+        </p:style>
+        <p:txBody>
+          <a:bodyPr rtlCol="0" anchor="ctr"/>
+          <a:lstStyle/>
+          <a:p>
+            <a:pPr algn="ctr"/>
+            <a:endParaRPr lang="en-US"/>
+          </a:p>
+        </p:txBody>
+      </p:sp>
+      <p:sp>
+        <p:nvSpPr>
+          <p:cNvPr id="8" name="TextBox 7"/>
+          <p:cNvSpPr txBox="1"/>
+          <p:nvPr/>
+        </p:nvSpPr>
+        <p:spPr>
+          <a:xfrm>
+            <a:off x="5392165" y="4797587"/>
+            <a:ext cx="6325375" cy="984885"/>
+          </a:xfrm>
+          <a:prstGeom prst="rect">
+            <a:avLst/>
+          </a:prstGeom>
+          <a:solidFill>
+            <a:srgbClr val="FF0000"/>
+          </a:solidFill>
+          <a:effectLst>
+            <a:reflection blurRad="6350" stA="50000" endA="300" endPos="55000" dir="5400000" sy="-100000" algn="bl" rotWithShape="0"/>
+          </a:effectLst>
+          <a:scene3d>
+            <a:camera prst="orthographicFront"/>
+            <a:lightRig rig="threePt" dir="t"/>
+          </a:scene3d>
+          <a:sp3d>
+            <a:bevelT/>
+          </a:sp3d>
+        </p:spPr>
+        <p:txBody>
+          <a:bodyPr wrap="square" tIns="182880" bIns="182880" rtlCol="0">
+            <a:spAutoFit/>
+          </a:bodyPr>
+          <a:lstStyle/>
+          <a:p>
+            <a:pPr algn="ctr"/>
+            <a:r>
+              <a:rPr lang="en-US" sz="2000" b="1" dirty="0" smtClean="0">
+                <a:solidFill>
+                  <a:schemeClr val="bg1"/>
+                </a:solidFill>
+                <a:cs typeface="Neo Sans Intel"/>
+              </a:rPr>
+              <a:t>Type hints and no dynamic allocations allow JIT compilers to generate very efficient code QUICKLY!</a:t>
+            </a:r>
+          </a:p>
+        </p:txBody>
+      </p:sp>
+      <p:sp>
+        <p:nvSpPr>
+          <p:cNvPr id="9" name="Oval 8"/>
+          <p:cNvSpPr/>
+          <p:nvPr/>
+        </p:nvSpPr>
+        <p:spPr>
+          <a:xfrm>
+            <a:off x="6151418" y="2354867"/>
+            <a:ext cx="1935678" cy="471460"/>
+          </a:xfrm>
+          <a:prstGeom prst="ellipse">
+            <a:avLst/>
+          </a:prstGeom>
+          <a:noFill/>
+          <a:ln w="38100">
+            <a:solidFill>
+              <a:srgbClr val="FF0000"/>
+            </a:solidFill>
+          </a:ln>
+          <a:effectLst/>
+        </p:spPr>
+        <p:style>
+          <a:lnRef idx="1">
+            <a:schemeClr val="accent1"/>
+          </a:lnRef>
+          <a:fillRef idx="3">
+            <a:schemeClr val="accent1"/>
+          </a:fillRef>
+          <a:effectRef idx="2">
+            <a:schemeClr val="accent1"/>
+          </a:effectRef>
+          <a:fontRef idx="minor">
+            <a:schemeClr val="lt1"/>
+          </a:fontRef>
+        </p:style>
+        <p:txBody>
+          <a:bodyPr rtlCol="0" anchor="ctr"/>
+          <a:lstStyle/>
+          <a:p>
+            <a:pPr algn="ctr"/>
+            <a:endParaRPr lang="en-US"/>
+          </a:p>
+        </p:txBody>
+      </p:sp>
+    </p:spTree>
+    <p:extLst>
+      <p:ext uri="{BB962C8B-B14F-4D97-AF65-F5344CB8AC3E}">
+        <p14:creationId xmlns:p14="http://schemas.microsoft.com/office/powerpoint/2010/main" val="3388736133"/>
+      </p:ext>
+    </p:extLst>
+  </p:cSld>
+  <p:clrMapOvr>
+    <a:masterClrMapping/>
+  </p:clrMapOvr>
+</p:sld>
+</file>
+
+<file path=ppt/slides/slide16.xml><?xml version="1.0" encoding="utf-8"?>
+<p:sld xmlns:a="http://schemas.openxmlformats.org/drawingml/2006/main" xmlns:r="http://schemas.openxmlformats.org/officeDocument/2006/relationships" xmlns:p="http://schemas.openxmlformats.org/presentationml/2006/main">
+  <p:cSld>
+    <p:spTree>
+      <p:nvGrpSpPr>
+        <p:cNvPr id="1" name=""/>
+        <p:cNvGrpSpPr/>
+        <p:nvPr/>
+      </p:nvGrpSpPr>
+      <p:grpSpPr>
+        <a:xfrm>
+          <a:off x="0" y="0"/>
+          <a:ext cx="0" cy="0"/>
+          <a:chOff x="0" y="0"/>
+          <a:chExt cx="0" cy="0"/>
+        </a:xfrm>
+      </p:grpSpPr>
+      <p:sp>
+        <p:nvSpPr>
+          <p:cNvPr id="2" name="Title 1"/>
+          <p:cNvSpPr>
+            <a:spLocks noGrp="1"/>
+          </p:cNvSpPr>
+          <p:nvPr>
+            <p:ph type="title"/>
+          </p:nvPr>
+        </p:nvSpPr>
+        <p:spPr/>
+        <p:txBody>
+          <a:bodyPr/>
+          <a:lstStyle/>
+          <a:p>
+            <a:r>
+              <a:rPr lang="en-US" dirty="0" smtClean="0"/>
+              <a:t>Emscripten – Showcase Uses</a:t>
+            </a:r>
+            <a:endParaRPr lang="en-US" dirty="0"/>
+          </a:p>
+        </p:txBody>
+      </p:sp>
+      <p:sp>
+        <p:nvSpPr>
+          <p:cNvPr id="7" name="TextBox 6"/>
+          <p:cNvSpPr txBox="1"/>
+          <p:nvPr/>
+        </p:nvSpPr>
+        <p:spPr>
+          <a:xfrm>
+            <a:off x="2754769" y="1108372"/>
+            <a:ext cx="1770036" cy="461665"/>
+          </a:xfrm>
+          <a:prstGeom prst="rect">
+            <a:avLst/>
+          </a:prstGeom>
+          <a:noFill/>
+        </p:spPr>
+        <p:txBody>
+          <a:bodyPr wrap="none" rtlCol="0">
+            <a:spAutoFit/>
+          </a:bodyPr>
+          <a:lstStyle/>
+          <a:p>
+            <a:r>
+              <a:rPr lang="en-US" sz="2400" dirty="0" smtClean="0">
+                <a:solidFill>
+                  <a:schemeClr val="tx2"/>
+                </a:solidFill>
+                <a:cs typeface="Neo Sans Intel"/>
+              </a:rPr>
+              <a:t>Epic Unreal</a:t>
+            </a:r>
+          </a:p>
+        </p:txBody>
+      </p:sp>
+      <p:sp>
+        <p:nvSpPr>
+          <p:cNvPr id="8" name="TextBox 7"/>
+          <p:cNvSpPr txBox="1"/>
+          <p:nvPr/>
+        </p:nvSpPr>
+        <p:spPr>
+          <a:xfrm>
+            <a:off x="9192221" y="1030510"/>
+            <a:ext cx="923651" cy="461665"/>
+          </a:xfrm>
+          <a:prstGeom prst="rect">
+            <a:avLst/>
+          </a:prstGeom>
+          <a:noFill/>
+        </p:spPr>
+        <p:txBody>
+          <a:bodyPr wrap="none" rtlCol="0">
+            <a:spAutoFit/>
+          </a:bodyPr>
+          <a:lstStyle/>
+          <a:p>
+            <a:r>
+              <a:rPr lang="en-US" sz="2400" dirty="0" smtClean="0">
+                <a:solidFill>
+                  <a:schemeClr val="tx2"/>
+                </a:solidFill>
+                <a:cs typeface="Neo Sans Intel"/>
+              </a:rPr>
+              <a:t>Unity</a:t>
+            </a:r>
+          </a:p>
+        </p:txBody>
+      </p:sp>
+      <p:sp>
+        <p:nvSpPr>
+          <p:cNvPr id="9" name="TextBox 8"/>
+          <p:cNvSpPr txBox="1"/>
+          <p:nvPr/>
+        </p:nvSpPr>
+        <p:spPr>
+          <a:xfrm>
+            <a:off x="225632" y="5184457"/>
+            <a:ext cx="6828312" cy="1384995"/>
+          </a:xfrm>
+          <a:prstGeom prst="rect">
+            <a:avLst/>
+          </a:prstGeom>
+          <a:noFill/>
+        </p:spPr>
+        <p:txBody>
+          <a:bodyPr wrap="square" rtlCol="0">
+            <a:spAutoFit/>
+          </a:bodyPr>
+          <a:lstStyle/>
+          <a:p>
+            <a:pPr marL="457200" indent="-457200">
+              <a:buFont typeface="Arial" panose="020B0604020202020204" pitchFamily="34" charset="0"/>
+              <a:buChar char="•"/>
+            </a:pPr>
+            <a:r>
+              <a:rPr lang="en-US" sz="2800" dirty="0" smtClean="0">
+                <a:solidFill>
+                  <a:schemeClr val="tx2"/>
+                </a:solidFill>
+                <a:cs typeface="Neo Sans Intel"/>
+              </a:rPr>
+              <a:t>Over a million lines of C++ code ported to JS</a:t>
+            </a:r>
+          </a:p>
+          <a:p>
+            <a:pPr marL="457200" indent="-457200">
+              <a:buFont typeface="Arial" panose="020B0604020202020204" pitchFamily="34" charset="0"/>
+              <a:buChar char="•"/>
+            </a:pPr>
+            <a:r>
+              <a:rPr lang="en-US" sz="2800" dirty="0" smtClean="0">
+                <a:solidFill>
+                  <a:schemeClr val="tx2"/>
+                </a:solidFill>
+                <a:cs typeface="Neo Sans Intel"/>
+              </a:rPr>
+              <a:t>4 days to port</a:t>
+            </a:r>
+          </a:p>
+        </p:txBody>
+      </p:sp>
+      <p:pic>
+        <p:nvPicPr>
+          <p:cNvPr id="3" name="Picture 2"/>
+          <p:cNvPicPr>
+            <a:picLocks noChangeAspect="1"/>
+          </p:cNvPicPr>
+          <p:nvPr/>
+        </p:nvPicPr>
+        <p:blipFill>
+          <a:blip r:embed="rId2">
+            <a:extLst>
+              <a:ext uri="{28A0092B-C50C-407E-A947-70E740481C1C}">
+                <a14:useLocalDpi xmlns:a14="http://schemas.microsoft.com/office/drawing/2010/main" val="0"/>
+              </a:ext>
+            </a:extLst>
+          </a:blip>
+          <a:stretch>
+            <a:fillRect/>
+          </a:stretch>
+        </p:blipFill>
+        <p:spPr>
+          <a:xfrm>
+            <a:off x="86688" y="1492175"/>
+            <a:ext cx="7106198" cy="3692282"/>
+          </a:xfrm>
+          <a:prstGeom prst="rect">
+            <a:avLst/>
+          </a:prstGeom>
+        </p:spPr>
+      </p:pic>
+      <p:pic>
+        <p:nvPicPr>
+          <p:cNvPr id="4" name="Picture 3"/>
+          <p:cNvPicPr>
+            <a:picLocks noChangeAspect="1"/>
+          </p:cNvPicPr>
+          <p:nvPr/>
+        </p:nvPicPr>
+        <p:blipFill>
+          <a:blip r:embed="rId3">
+            <a:extLst>
+              <a:ext uri="{28A0092B-C50C-407E-A947-70E740481C1C}">
+                <a14:useLocalDpi xmlns:a14="http://schemas.microsoft.com/office/drawing/2010/main" val="0"/>
+              </a:ext>
+            </a:extLst>
+          </a:blip>
+          <a:stretch>
+            <a:fillRect/>
+          </a:stretch>
+        </p:blipFill>
+        <p:spPr>
+          <a:xfrm>
+            <a:off x="7344704" y="1501003"/>
+            <a:ext cx="4618684" cy="4280019"/>
+          </a:xfrm>
+          <a:prstGeom prst="rect">
+            <a:avLst/>
+          </a:prstGeom>
+        </p:spPr>
+      </p:pic>
+    </p:spTree>
+    <p:extLst>
+      <p:ext uri="{BB962C8B-B14F-4D97-AF65-F5344CB8AC3E}">
+        <p14:creationId xmlns:p14="http://schemas.microsoft.com/office/powerpoint/2010/main" val="809491598"/>
+      </p:ext>
+    </p:extLst>
+  </p:cSld>
+  <p:clrMapOvr>
+    <a:masterClrMapping/>
+  </p:clrMapOvr>
+</p:sld>
+</file>
+
+<file path=ppt/slides/slide17.xml><?xml version="1.0" encoding="utf-8"?>
+<p:sld xmlns:a="http://schemas.openxmlformats.org/drawingml/2006/main" xmlns:r="http://schemas.openxmlformats.org/officeDocument/2006/relationships" xmlns:p="http://schemas.openxmlformats.org/presentationml/2006/main">
+  <p:cSld>
+    <p:spTree>
+      <p:nvGrpSpPr>
+        <p:cNvPr id="1" name=""/>
+        <p:cNvGrpSpPr/>
+        <p:nvPr/>
+      </p:nvGrpSpPr>
+      <p:grpSpPr>
+        <a:xfrm>
+          <a:off x="0" y="0"/>
+          <a:ext cx="0" cy="0"/>
+          <a:chOff x="0" y="0"/>
+          <a:chExt cx="0" cy="0"/>
+        </a:xfrm>
+      </p:grpSpPr>
+      <p:sp>
+        <p:nvSpPr>
+          <p:cNvPr id="2" name="Title 1"/>
+          <p:cNvSpPr>
+            <a:spLocks noGrp="1"/>
+          </p:cNvSpPr>
+          <p:nvPr>
+            <p:ph type="title"/>
+          </p:nvPr>
+        </p:nvSpPr>
+        <p:spPr/>
+        <p:txBody>
+          <a:bodyPr/>
+          <a:lstStyle/>
+          <a:p>
+            <a:r>
+              <a:rPr lang="en-US" dirty="0" smtClean="0"/>
+              <a:t>SIMD.JS and Emscripten – A Perfect Match!</a:t>
+            </a:r>
+            <a:endParaRPr lang="en-US" dirty="0"/>
+          </a:p>
+        </p:txBody>
+      </p:sp>
+      <p:sp>
+        <p:nvSpPr>
+          <p:cNvPr id="3" name="Content Placeholder 2"/>
+          <p:cNvSpPr>
+            <a:spLocks noGrp="1"/>
+          </p:cNvSpPr>
+          <p:nvPr>
+            <p:ph sz="quarter" idx="13"/>
+          </p:nvPr>
+        </p:nvSpPr>
+        <p:spPr/>
+        <p:txBody>
+          <a:bodyPr/>
+          <a:lstStyle/>
+          <a:p>
+            <a:pPr marL="342900" indent="-342900">
+              <a:buFont typeface="Arial" panose="020B0604020202020204" pitchFamily="34" charset="0"/>
+              <a:buChar char="•"/>
+            </a:pPr>
+            <a:r>
+              <a:rPr lang="en-US" dirty="0" smtClean="0"/>
+              <a:t>Performance critical C/C++ code uses SIMD to get acceptable performance</a:t>
+            </a:r>
+          </a:p>
+          <a:p>
+            <a:pPr lvl="2"/>
+            <a:r>
+              <a:rPr lang="en-US" dirty="0" smtClean="0"/>
+              <a:t>Games, physics, image manipulation, video encoding/decoding, signal processing, etc.</a:t>
+            </a:r>
+          </a:p>
+          <a:p>
+            <a:pPr marL="342900" indent="-342900">
+              <a:buFont typeface="Arial" panose="020B0604020202020204" pitchFamily="34" charset="0"/>
+              <a:buChar char="•"/>
+            </a:pPr>
+            <a:r>
+              <a:rPr lang="en-US" dirty="0" smtClean="0"/>
+              <a:t>SIMD.JS enables Emscripten to fully utilize these highly optimized C/C++ code sequences</a:t>
+            </a:r>
+            <a:endParaRPr lang="en-US" dirty="0"/>
+          </a:p>
+        </p:txBody>
+      </p:sp>
+    </p:spTree>
+    <p:extLst>
+      <p:ext uri="{BB962C8B-B14F-4D97-AF65-F5344CB8AC3E}">
+        <p14:creationId xmlns:p14="http://schemas.microsoft.com/office/powerpoint/2010/main" val="2092965777"/>
+      </p:ext>
+    </p:extLst>
+  </p:cSld>
+  <p:clrMapOvr>
+    <a:masterClrMapping/>
+  </p:clrMapOvr>
+</p:sld>
+</file>
+
+<file path=ppt/slides/slide18.xml><?xml version="1.0" encoding="utf-8"?>
+<p:sld xmlns:a="http://schemas.openxmlformats.org/drawingml/2006/main" xmlns:r="http://schemas.openxmlformats.org/officeDocument/2006/relationships" xmlns:p="http://schemas.openxmlformats.org/presentationml/2006/main">
+  <p:cSld>
+    <p:spTree>
+      <p:nvGrpSpPr>
+        <p:cNvPr id="1" name=""/>
+        <p:cNvGrpSpPr/>
+        <p:nvPr/>
+      </p:nvGrpSpPr>
+      <p:grpSpPr>
+        <a:xfrm>
+          <a:off x="0" y="0"/>
+          <a:ext cx="0" cy="0"/>
+          <a:chOff x="0" y="0"/>
+          <a:chExt cx="0" cy="0"/>
+        </a:xfrm>
+      </p:grpSpPr>
+      <p:sp>
+        <p:nvSpPr>
+          <p:cNvPr id="2" name="Title 1"/>
+          <p:cNvSpPr>
+            <a:spLocks noGrp="1"/>
+          </p:cNvSpPr>
+          <p:nvPr>
+            <p:ph type="title"/>
+          </p:nvPr>
+        </p:nvSpPr>
+        <p:spPr/>
+        <p:txBody>
+          <a:bodyPr/>
+          <a:lstStyle/>
+          <a:p>
+            <a:r>
+              <a:rPr lang="en-US" dirty="0" smtClean="0"/>
+              <a:t>Emscripten – Compiling SIMD C/C++ Code</a:t>
+            </a:r>
+            <a:endParaRPr lang="en-US" dirty="0"/>
+          </a:p>
+        </p:txBody>
+      </p:sp>
+      <p:sp>
+        <p:nvSpPr>
+          <p:cNvPr id="3" name="Content Placeholder 2"/>
+          <p:cNvSpPr>
+            <a:spLocks noGrp="1"/>
+          </p:cNvSpPr>
+          <p:nvPr>
+            <p:ph sz="quarter" idx="13"/>
+          </p:nvPr>
+        </p:nvSpPr>
+        <p:spPr>
+          <a:xfrm>
+            <a:off x="607484" y="1604435"/>
+            <a:ext cx="10970683" cy="402496"/>
+          </a:xfrm>
+        </p:spPr>
+        <p:txBody>
+          <a:bodyPr/>
+          <a:lstStyle/>
+          <a:p>
+            <a:r>
+              <a:rPr lang="en-US" dirty="0" smtClean="0"/>
+              <a:t>$ </a:t>
+            </a:r>
+            <a:r>
+              <a:rPr lang="en-US" dirty="0" err="1" smtClean="0"/>
+              <a:t>emcc</a:t>
+            </a:r>
+            <a:r>
+              <a:rPr lang="en-US" dirty="0" smtClean="0"/>
+              <a:t> –O2 –g average-</a:t>
+            </a:r>
+            <a:r>
+              <a:rPr lang="en-US" dirty="0" err="1" smtClean="0"/>
+              <a:t>intrin.c</a:t>
+            </a:r>
+            <a:endParaRPr lang="en-US" dirty="0"/>
+          </a:p>
+        </p:txBody>
+      </p:sp>
+      <p:grpSp>
+        <p:nvGrpSpPr>
+          <p:cNvPr id="12" name="Group 11"/>
+          <p:cNvGrpSpPr/>
+          <p:nvPr/>
+        </p:nvGrpSpPr>
+        <p:grpSpPr>
+          <a:xfrm>
+            <a:off x="5974081" y="2076493"/>
+            <a:ext cx="5930178" cy="3262432"/>
+            <a:chOff x="5974081" y="2076493"/>
+            <a:chExt cx="5930178" cy="3262432"/>
+          </a:xfrm>
+        </p:grpSpPr>
+        <p:grpSp>
+          <p:nvGrpSpPr>
+            <p:cNvPr id="9" name="Group 8"/>
+            <p:cNvGrpSpPr/>
+            <p:nvPr/>
+          </p:nvGrpSpPr>
+          <p:grpSpPr>
+            <a:xfrm>
+              <a:off x="5974081" y="2076493"/>
+              <a:ext cx="5930178" cy="3262432"/>
+              <a:chOff x="5974081" y="2076493"/>
+              <a:chExt cx="5930178" cy="3262432"/>
+            </a:xfrm>
+          </p:grpSpPr>
+          <p:sp>
+            <p:nvSpPr>
+              <p:cNvPr id="5" name="TextBox 4"/>
+              <p:cNvSpPr txBox="1"/>
+              <p:nvPr/>
+            </p:nvSpPr>
+            <p:spPr>
+              <a:xfrm>
+                <a:off x="5974081" y="2538158"/>
+                <a:ext cx="5930178" cy="2800767"/>
+              </a:xfrm>
+              <a:prstGeom prst="rect">
+                <a:avLst/>
+              </a:prstGeom>
+              <a:noFill/>
+              <a:ln w="25400">
+                <a:solidFill>
+                  <a:schemeClr val="accent1"/>
+                </a:solidFill>
+              </a:ln>
+            </p:spPr>
+            <p:txBody>
+              <a:bodyPr wrap="square" rtlCol="0">
+                <a:spAutoFit/>
+              </a:bodyPr>
+              <a:lstStyle/>
+              <a:p>
+                <a:r>
+                  <a:rPr lang="en-US" sz="1600" dirty="0" smtClean="0">
+                    <a:solidFill>
+                      <a:schemeClr val="tx2"/>
+                    </a:solidFill>
+                    <a:latin typeface="Lucida Console" panose="020B0609040504020204" pitchFamily="49" charset="0"/>
+                    <a:cs typeface="Neo Sans Intel"/>
+                  </a:rPr>
+                  <a:t>while </a:t>
+                </a:r>
+                <a:r>
+                  <a:rPr lang="en-US" sz="1600" dirty="0">
+                    <a:solidFill>
+                      <a:schemeClr val="tx2"/>
+                    </a:solidFill>
+                    <a:latin typeface="Lucida Console" panose="020B0609040504020204" pitchFamily="49" charset="0"/>
+                    <a:cs typeface="Neo Sans Intel"/>
+                  </a:rPr>
+                  <a:t>(1) {</a:t>
+                </a:r>
+              </a:p>
+              <a:p>
+                <a:r>
+                  <a:rPr lang="en-US" sz="1600" dirty="0" smtClean="0">
+                    <a:solidFill>
+                      <a:schemeClr val="tx2"/>
+                    </a:solidFill>
+                    <a:latin typeface="Lucida Console" panose="020B0609040504020204" pitchFamily="49" charset="0"/>
+                    <a:cs typeface="Neo Sans Intel"/>
+                  </a:rPr>
+                  <a:t> </a:t>
+                </a:r>
+                <a:r>
+                  <a:rPr lang="en-US" sz="1600" dirty="0">
+                    <a:solidFill>
+                      <a:schemeClr val="tx2"/>
+                    </a:solidFill>
+                    <a:latin typeface="Lucida Console" panose="020B0609040504020204" pitchFamily="49" charset="0"/>
+                    <a:cs typeface="Neo Sans Intel"/>
+                  </a:rPr>
+                  <a:t>$</a:t>
+                </a:r>
+                <a:r>
+                  <a:rPr lang="en-US" sz="1600" dirty="0" err="1">
+                    <a:solidFill>
+                      <a:schemeClr val="tx2"/>
+                    </a:solidFill>
+                    <a:latin typeface="Lucida Console" panose="020B0609040504020204" pitchFamily="49" charset="0"/>
+                    <a:cs typeface="Neo Sans Intel"/>
+                  </a:rPr>
+                  <a:t>add$i</a:t>
+                </a:r>
+                <a:r>
+                  <a:rPr lang="en-US" sz="1600" dirty="0">
+                    <a:solidFill>
+                      <a:schemeClr val="tx2"/>
+                    </a:solidFill>
+                    <a:latin typeface="Lucida Console" panose="020B0609040504020204" pitchFamily="49" charset="0"/>
+                    <a:cs typeface="Neo Sans Intel"/>
+                  </a:rPr>
+                  <a:t> = SIMD_float32x4_add</a:t>
+                </a:r>
+                <a:r>
+                  <a:rPr lang="en-US" sz="1600" dirty="0" smtClean="0">
+                    <a:solidFill>
+                      <a:schemeClr val="tx2"/>
+                    </a:solidFill>
+                    <a:latin typeface="Lucida Console" panose="020B0609040504020204" pitchFamily="49" charset="0"/>
+                    <a:cs typeface="Neo Sans Intel"/>
+                  </a:rPr>
+                  <a:t>(</a:t>
+                </a:r>
+              </a:p>
+              <a:p>
+                <a:r>
+                  <a:rPr lang="en-US" sz="1600" dirty="0" smtClean="0">
+                    <a:solidFill>
+                      <a:schemeClr val="tx2"/>
+                    </a:solidFill>
+                    <a:latin typeface="Lucida Console" panose="020B0609040504020204" pitchFamily="49" charset="0"/>
+                    <a:cs typeface="Neo Sans Intel"/>
+                  </a:rPr>
+                  <a:t>           $</a:t>
+                </a:r>
+                <a:r>
+                  <a:rPr lang="en-US" sz="1600" dirty="0">
+                    <a:solidFill>
+                      <a:schemeClr val="tx2"/>
+                    </a:solidFill>
+                    <a:latin typeface="Lucida Console" panose="020B0609040504020204" pitchFamily="49" charset="0"/>
+                    <a:cs typeface="Neo Sans Intel"/>
+                  </a:rPr>
+                  <a:t>sumx4$010</a:t>
+                </a:r>
+                <a:r>
+                  <a:rPr lang="en-US" sz="1600" dirty="0" smtClean="0">
+                    <a:solidFill>
+                      <a:schemeClr val="tx2"/>
+                    </a:solidFill>
+                    <a:latin typeface="Lucida Console" panose="020B0609040504020204" pitchFamily="49" charset="0"/>
+                    <a:cs typeface="Neo Sans Intel"/>
+                  </a:rPr>
+                  <a:t>,</a:t>
+                </a:r>
+              </a:p>
+              <a:p>
+                <a:r>
+                  <a:rPr lang="en-US" sz="1600" dirty="0" smtClean="0">
+                    <a:solidFill>
+                      <a:schemeClr val="tx2"/>
+                    </a:solidFill>
+                    <a:latin typeface="Lucida Console" panose="020B0609040504020204" pitchFamily="49" charset="0"/>
+                    <a:cs typeface="Neo Sans Intel"/>
+                  </a:rPr>
+                  <a:t>           </a:t>
+                </a:r>
+                <a:r>
+                  <a:rPr lang="en-US" sz="1600" dirty="0">
+                    <a:solidFill>
+                      <a:schemeClr val="tx2"/>
+                    </a:solidFill>
+                    <a:latin typeface="Lucida Console" panose="020B0609040504020204" pitchFamily="49" charset="0"/>
+                    <a:cs typeface="Neo Sans Intel"/>
+                  </a:rPr>
+                  <a:t>SIMD_float32x4_load</a:t>
+                </a:r>
+                <a:r>
+                  <a:rPr lang="en-US" sz="1600" dirty="0" smtClean="0">
+                    <a:solidFill>
+                      <a:schemeClr val="tx2"/>
+                    </a:solidFill>
+                    <a:latin typeface="Lucida Console" panose="020B0609040504020204" pitchFamily="49" charset="0"/>
+                    <a:cs typeface="Neo Sans Intel"/>
+                  </a:rPr>
+                  <a:t>(</a:t>
+                </a:r>
+              </a:p>
+              <a:p>
+                <a:r>
+                  <a:rPr lang="en-US" sz="1600" dirty="0" smtClean="0">
+                    <a:solidFill>
+                      <a:schemeClr val="tx2"/>
+                    </a:solidFill>
+                    <a:latin typeface="Lucida Console" panose="020B0609040504020204" pitchFamily="49" charset="0"/>
+                    <a:cs typeface="Neo Sans Intel"/>
+                  </a:rPr>
+                  <a:t>            buffer</a:t>
+                </a:r>
+                <a:r>
+                  <a:rPr lang="en-US" sz="1600" dirty="0">
+                    <a:solidFill>
+                      <a:schemeClr val="tx2"/>
+                    </a:solidFill>
+                    <a:latin typeface="Lucida Console" panose="020B0609040504020204" pitchFamily="49" charset="0"/>
+                    <a:cs typeface="Neo Sans Intel"/>
+                  </a:rPr>
+                  <a:t>, $a + ($j$09 &lt;&lt; 2) | 0));</a:t>
+                </a:r>
+              </a:p>
+              <a:p>
+                <a:r>
+                  <a:rPr lang="en-US" sz="1600" dirty="0" smtClean="0">
+                    <a:solidFill>
+                      <a:schemeClr val="tx2"/>
+                    </a:solidFill>
+                    <a:latin typeface="Lucida Console" panose="020B0609040504020204" pitchFamily="49" charset="0"/>
+                    <a:cs typeface="Neo Sans Intel"/>
+                  </a:rPr>
+                  <a:t> </a:t>
+                </a:r>
+                <a:r>
+                  <a:rPr lang="en-US" sz="1600" dirty="0">
+                    <a:solidFill>
+                      <a:schemeClr val="tx2"/>
+                    </a:solidFill>
+                    <a:latin typeface="Lucida Console" panose="020B0609040504020204" pitchFamily="49" charset="0"/>
+                    <a:cs typeface="Neo Sans Intel"/>
+                  </a:rPr>
+                  <a:t>$j$09 = $j$09 + 4 | 0;</a:t>
+                </a:r>
+              </a:p>
+              <a:p>
+                <a:r>
+                  <a:rPr lang="en-US" sz="1600" dirty="0" smtClean="0">
+                    <a:solidFill>
+                      <a:schemeClr val="tx2"/>
+                    </a:solidFill>
+                    <a:latin typeface="Lucida Console" panose="020B0609040504020204" pitchFamily="49" charset="0"/>
+                    <a:cs typeface="Neo Sans Intel"/>
+                  </a:rPr>
+                  <a:t> </a:t>
+                </a:r>
+                <a:r>
+                  <a:rPr lang="en-US" sz="1600" dirty="0">
+                    <a:solidFill>
+                      <a:schemeClr val="tx2"/>
+                    </a:solidFill>
+                    <a:latin typeface="Lucida Console" panose="020B0609040504020204" pitchFamily="49" charset="0"/>
+                    <a:cs typeface="Neo Sans Intel"/>
+                  </a:rPr>
+                  <a:t>if (!($j$09 &gt;&gt;&gt; 0 &lt; $length &gt;&gt;&gt; 0)) {</a:t>
+                </a:r>
+              </a:p>
+              <a:p>
+                <a:r>
+                  <a:rPr lang="en-US" sz="1600" dirty="0" smtClean="0">
+                    <a:solidFill>
+                      <a:schemeClr val="tx2"/>
+                    </a:solidFill>
+                    <a:latin typeface="Lucida Console" panose="020B0609040504020204" pitchFamily="49" charset="0"/>
+                    <a:cs typeface="Neo Sans Intel"/>
+                  </a:rPr>
+                  <a:t>  </a:t>
+                </a:r>
+                <a:r>
+                  <a:rPr lang="en-US" sz="1600" dirty="0">
+                    <a:solidFill>
+                      <a:schemeClr val="tx2"/>
+                    </a:solidFill>
+                    <a:latin typeface="Lucida Console" panose="020B0609040504020204" pitchFamily="49" charset="0"/>
+                    <a:cs typeface="Neo Sans Intel"/>
+                  </a:rPr>
+                  <a:t>$sumx4$0$lcssa = $</a:t>
+                </a:r>
+                <a:r>
+                  <a:rPr lang="en-US" sz="1600" dirty="0" err="1">
+                    <a:solidFill>
+                      <a:schemeClr val="tx2"/>
+                    </a:solidFill>
+                    <a:latin typeface="Lucida Console" panose="020B0609040504020204" pitchFamily="49" charset="0"/>
+                    <a:cs typeface="Neo Sans Intel"/>
+                  </a:rPr>
+                  <a:t>add$i</a:t>
+                </a:r>
+                <a:r>
+                  <a:rPr lang="en-US" sz="1600" dirty="0">
+                    <a:solidFill>
+                      <a:schemeClr val="tx2"/>
+                    </a:solidFill>
+                    <a:latin typeface="Lucida Console" panose="020B0609040504020204" pitchFamily="49" charset="0"/>
+                    <a:cs typeface="Neo Sans Intel"/>
+                  </a:rPr>
+                  <a:t>;</a:t>
+                </a:r>
+              </a:p>
+              <a:p>
+                <a:r>
+                  <a:rPr lang="en-US" sz="1600" dirty="0" smtClean="0">
+                    <a:solidFill>
+                      <a:schemeClr val="tx2"/>
+                    </a:solidFill>
+                    <a:latin typeface="Lucida Console" panose="020B0609040504020204" pitchFamily="49" charset="0"/>
+                    <a:cs typeface="Neo Sans Intel"/>
+                  </a:rPr>
+                  <a:t>  </a:t>
+                </a:r>
+                <a:r>
+                  <a:rPr lang="en-US" sz="1600" dirty="0">
+                    <a:solidFill>
+                      <a:schemeClr val="tx2"/>
+                    </a:solidFill>
+                    <a:latin typeface="Lucida Console" panose="020B0609040504020204" pitchFamily="49" charset="0"/>
+                    <a:cs typeface="Neo Sans Intel"/>
+                  </a:rPr>
+                  <a:t>break;</a:t>
+                </a:r>
+              </a:p>
+              <a:p>
+                <a:r>
+                  <a:rPr lang="en-US" sz="1600" dirty="0" smtClean="0">
+                    <a:solidFill>
+                      <a:schemeClr val="tx2"/>
+                    </a:solidFill>
+                    <a:latin typeface="Lucida Console" panose="020B0609040504020204" pitchFamily="49" charset="0"/>
+                    <a:cs typeface="Neo Sans Intel"/>
+                  </a:rPr>
+                  <a:t> </a:t>
+                </a:r>
+                <a:r>
+                  <a:rPr lang="en-US" sz="1600" dirty="0">
+                    <a:solidFill>
+                      <a:schemeClr val="tx2"/>
+                    </a:solidFill>
+                    <a:latin typeface="Lucida Console" panose="020B0609040504020204" pitchFamily="49" charset="0"/>
+                    <a:cs typeface="Neo Sans Intel"/>
+                  </a:rPr>
+                  <a:t>} else $sumx4$010 = $</a:t>
+                </a:r>
+                <a:r>
+                  <a:rPr lang="en-US" sz="1600" dirty="0" err="1">
+                    <a:solidFill>
+                      <a:schemeClr val="tx2"/>
+                    </a:solidFill>
+                    <a:latin typeface="Lucida Console" panose="020B0609040504020204" pitchFamily="49" charset="0"/>
+                    <a:cs typeface="Neo Sans Intel"/>
+                  </a:rPr>
+                  <a:t>add$i</a:t>
+                </a:r>
+                <a:r>
+                  <a:rPr lang="en-US" sz="1600" dirty="0">
+                    <a:solidFill>
+                      <a:schemeClr val="tx2"/>
+                    </a:solidFill>
+                    <a:latin typeface="Lucida Console" panose="020B0609040504020204" pitchFamily="49" charset="0"/>
+                    <a:cs typeface="Neo Sans Intel"/>
+                  </a:rPr>
+                  <a:t>;</a:t>
+                </a:r>
+              </a:p>
+              <a:p>
+                <a:r>
+                  <a:rPr lang="en-US" sz="1600" dirty="0" smtClean="0">
+                    <a:solidFill>
+                      <a:schemeClr val="tx2"/>
+                    </a:solidFill>
+                    <a:latin typeface="Lucida Console" panose="020B0609040504020204" pitchFamily="49" charset="0"/>
+                    <a:cs typeface="Neo Sans Intel"/>
+                  </a:rPr>
+                  <a:t>}</a:t>
+                </a:r>
+              </a:p>
+            </p:txBody>
+          </p:sp>
+          <p:sp>
+            <p:nvSpPr>
+              <p:cNvPr id="7" name="TextBox 6"/>
+              <p:cNvSpPr txBox="1"/>
+              <p:nvPr/>
+            </p:nvSpPr>
+            <p:spPr>
+              <a:xfrm>
+                <a:off x="6417486" y="2076493"/>
+                <a:ext cx="5043368" cy="461665"/>
+              </a:xfrm>
+              <a:prstGeom prst="rect">
+                <a:avLst/>
+              </a:prstGeom>
+              <a:noFill/>
+            </p:spPr>
+            <p:txBody>
+              <a:bodyPr wrap="none" rtlCol="0">
+                <a:spAutoFit/>
+              </a:bodyPr>
+              <a:lstStyle/>
+              <a:p>
+                <a:r>
+                  <a:rPr lang="en-US" sz="2400" u="sng" dirty="0" smtClean="0">
+                    <a:solidFill>
+                      <a:schemeClr val="tx2"/>
+                    </a:solidFill>
+                    <a:cs typeface="Neo Sans Intel"/>
+                  </a:rPr>
+                  <a:t>asm.js code with SIMD.JS (for loop)</a:t>
+                </a:r>
+              </a:p>
+            </p:txBody>
+          </p:sp>
+        </p:grpSp>
+        <p:sp>
+          <p:nvSpPr>
+            <p:cNvPr id="10" name="Oval 9"/>
+            <p:cNvSpPr/>
+            <p:nvPr/>
+          </p:nvSpPr>
+          <p:spPr>
+            <a:xfrm>
+              <a:off x="7162800" y="2742510"/>
+              <a:ext cx="2712720" cy="455820"/>
+            </a:xfrm>
+            <a:prstGeom prst="ellipse">
+              <a:avLst/>
+            </a:prstGeom>
+            <a:noFill/>
+            <a:ln w="25400">
+              <a:solidFill>
+                <a:srgbClr val="FF0000"/>
+              </a:solidFill>
+            </a:ln>
+            <a:effectLst/>
+          </p:spPr>
+          <p:style>
+            <a:lnRef idx="1">
+              <a:schemeClr val="accent1"/>
+            </a:lnRef>
+            <a:fillRef idx="3">
+              <a:schemeClr val="accent1"/>
+            </a:fillRef>
+            <a:effectRef idx="2">
+              <a:schemeClr val="accent1"/>
+            </a:effectRef>
+            <a:fontRef idx="minor">
+              <a:schemeClr val="lt1"/>
+            </a:fontRef>
+          </p:style>
+          <p:txBody>
+            <a:bodyPr rtlCol="0" anchor="ctr"/>
+            <a:lstStyle/>
+            <a:p>
+              <a:pPr algn="ctr"/>
+              <a:endParaRPr lang="en-US"/>
+            </a:p>
+          </p:txBody>
+        </p:sp>
+        <p:sp>
+          <p:nvSpPr>
+            <p:cNvPr id="11" name="Oval 10"/>
+            <p:cNvSpPr/>
+            <p:nvPr/>
+          </p:nvSpPr>
+          <p:spPr>
+            <a:xfrm>
+              <a:off x="7315200" y="3208529"/>
+              <a:ext cx="2712720" cy="455820"/>
+            </a:xfrm>
+            <a:prstGeom prst="ellipse">
+              <a:avLst/>
+            </a:prstGeom>
+            <a:noFill/>
+            <a:ln w="25400">
+              <a:solidFill>
+                <a:srgbClr val="FF0000"/>
+              </a:solidFill>
+            </a:ln>
+            <a:effectLst/>
+          </p:spPr>
+          <p:style>
+            <a:lnRef idx="1">
+              <a:schemeClr val="accent1"/>
+            </a:lnRef>
+            <a:fillRef idx="3">
+              <a:schemeClr val="accent1"/>
+            </a:fillRef>
+            <a:effectRef idx="2">
+              <a:schemeClr val="accent1"/>
+            </a:effectRef>
+            <a:fontRef idx="minor">
+              <a:schemeClr val="lt1"/>
+            </a:fontRef>
+          </p:style>
+          <p:txBody>
+            <a:bodyPr rtlCol="0" anchor="ctr"/>
+            <a:lstStyle/>
+            <a:p>
+              <a:pPr algn="ctr"/>
+              <a:endParaRPr lang="en-US"/>
+            </a:p>
+          </p:txBody>
+        </p:sp>
+      </p:grpSp>
+      <p:grpSp>
+        <p:nvGrpSpPr>
+          <p:cNvPr id="15" name="Group 14"/>
+          <p:cNvGrpSpPr/>
+          <p:nvPr/>
+        </p:nvGrpSpPr>
+        <p:grpSpPr>
+          <a:xfrm>
+            <a:off x="248409" y="2076493"/>
+            <a:ext cx="5492209" cy="3778432"/>
+            <a:chOff x="248409" y="2076493"/>
+            <a:chExt cx="5492209" cy="3778432"/>
+          </a:xfrm>
+        </p:grpSpPr>
+        <p:grpSp>
+          <p:nvGrpSpPr>
+            <p:cNvPr id="8" name="Group 7"/>
+            <p:cNvGrpSpPr/>
+            <p:nvPr/>
+          </p:nvGrpSpPr>
+          <p:grpSpPr>
+            <a:xfrm>
+              <a:off x="248409" y="2076493"/>
+              <a:ext cx="5492209" cy="3778432"/>
+              <a:chOff x="248409" y="2076493"/>
+              <a:chExt cx="5492209" cy="3778432"/>
+            </a:xfrm>
+          </p:grpSpPr>
+          <p:sp>
+            <p:nvSpPr>
+              <p:cNvPr id="4" name="TextBox 3"/>
+              <p:cNvSpPr txBox="1"/>
+              <p:nvPr/>
+            </p:nvSpPr>
+            <p:spPr>
+              <a:xfrm>
+                <a:off x="248409" y="2561716"/>
+                <a:ext cx="5492209" cy="3293209"/>
+              </a:xfrm>
+              <a:prstGeom prst="rect">
+                <a:avLst/>
+              </a:prstGeom>
+              <a:noFill/>
+              <a:ln w="25400">
+                <a:solidFill>
+                  <a:schemeClr val="accent1"/>
+                </a:solidFill>
+              </a:ln>
+            </p:spPr>
+            <p:txBody>
+              <a:bodyPr wrap="none" rtlCol="0">
+                <a:spAutoFit/>
+              </a:bodyPr>
+              <a:lstStyle/>
+              <a:p>
+                <a:r>
+                  <a:rPr lang="en-US" sz="1600" dirty="0">
+                    <a:solidFill>
+                      <a:schemeClr val="tx2"/>
+                    </a:solidFill>
+                    <a:latin typeface="Lucida Console" panose="020B0609040504020204" pitchFamily="49" charset="0"/>
+                    <a:cs typeface="Neo Sans Intel"/>
+                  </a:rPr>
+                  <a:t>float </a:t>
+                </a:r>
+                <a:r>
+                  <a:rPr lang="en-US" sz="1600" dirty="0" err="1">
+                    <a:solidFill>
+                      <a:schemeClr val="tx2"/>
+                    </a:solidFill>
+                    <a:latin typeface="Lucida Console" panose="020B0609040504020204" pitchFamily="49" charset="0"/>
+                    <a:cs typeface="Neo Sans Intel"/>
+                  </a:rPr>
+                  <a:t>averageIntrin</a:t>
+                </a:r>
+                <a:r>
+                  <a:rPr lang="en-US" sz="1600" dirty="0">
+                    <a:solidFill>
+                      <a:schemeClr val="tx2"/>
+                    </a:solidFill>
+                    <a:latin typeface="Lucida Console" panose="020B0609040504020204" pitchFamily="49" charset="0"/>
+                    <a:cs typeface="Neo Sans Intel"/>
+                  </a:rPr>
+                  <a:t>(float *a</a:t>
+                </a:r>
+                <a:r>
+                  <a:rPr lang="en-US" sz="1600" dirty="0" smtClean="0">
+                    <a:solidFill>
+                      <a:schemeClr val="tx2"/>
+                    </a:solidFill>
+                    <a:latin typeface="Lucida Console" panose="020B0609040504020204" pitchFamily="49" charset="0"/>
+                    <a:cs typeface="Neo Sans Intel"/>
+                  </a:rPr>
+                  <a:t>,</a:t>
+                </a:r>
+              </a:p>
+              <a:p>
+                <a:r>
+                  <a:rPr lang="en-US" sz="1600" dirty="0">
+                    <a:solidFill>
+                      <a:schemeClr val="tx2"/>
+                    </a:solidFill>
+                    <a:latin typeface="Lucida Console" panose="020B0609040504020204" pitchFamily="49" charset="0"/>
+                    <a:cs typeface="Neo Sans Intel"/>
+                  </a:rPr>
+                  <a:t> </a:t>
+                </a:r>
+                <a:r>
+                  <a:rPr lang="en-US" sz="1600" dirty="0" smtClean="0">
+                    <a:solidFill>
+                      <a:schemeClr val="tx2"/>
+                    </a:solidFill>
+                    <a:latin typeface="Lucida Console" panose="020B0609040504020204" pitchFamily="49" charset="0"/>
+                    <a:cs typeface="Neo Sans Intel"/>
+                  </a:rPr>
+                  <a:t>                   uint32_t </a:t>
+                </a:r>
+                <a:r>
+                  <a:rPr lang="en-US" sz="1600" dirty="0">
+                    <a:solidFill>
+                      <a:schemeClr val="tx2"/>
+                    </a:solidFill>
+                    <a:latin typeface="Lucida Console" panose="020B0609040504020204" pitchFamily="49" charset="0"/>
+                    <a:cs typeface="Neo Sans Intel"/>
+                  </a:rPr>
+                  <a:t>length) {</a:t>
+                </a:r>
+              </a:p>
+              <a:p>
+                <a:r>
+                  <a:rPr lang="en-US" sz="1600" dirty="0">
+                    <a:solidFill>
+                      <a:schemeClr val="tx2"/>
+                    </a:solidFill>
+                    <a:latin typeface="Lucida Console" panose="020B0609040504020204" pitchFamily="49" charset="0"/>
+                    <a:cs typeface="Neo Sans Intel"/>
+                  </a:rPr>
+                  <a:t>  __m128 sumx4 = _mm_set_ps1(0.0);</a:t>
+                </a:r>
+              </a:p>
+              <a:p>
+                <a:r>
+                  <a:rPr lang="en-US" sz="1600" dirty="0">
+                    <a:solidFill>
+                      <a:schemeClr val="tx2"/>
+                    </a:solidFill>
+                    <a:latin typeface="Lucida Console" panose="020B0609040504020204" pitchFamily="49" charset="0"/>
+                    <a:cs typeface="Neo Sans Intel"/>
+                  </a:rPr>
+                  <a:t>  for (uint32_t j = 0</a:t>
+                </a:r>
+                <a:r>
+                  <a:rPr lang="en-US" sz="1600" dirty="0" smtClean="0">
+                    <a:solidFill>
+                      <a:schemeClr val="tx2"/>
+                    </a:solidFill>
+                    <a:latin typeface="Lucida Console" panose="020B0609040504020204" pitchFamily="49" charset="0"/>
+                    <a:cs typeface="Neo Sans Intel"/>
+                  </a:rPr>
+                  <a:t>, </a:t>
+                </a:r>
+                <a:r>
+                  <a:rPr lang="en-US" sz="1600" dirty="0">
+                    <a:solidFill>
+                      <a:schemeClr val="tx2"/>
+                    </a:solidFill>
+                    <a:latin typeface="Lucida Console" panose="020B0609040504020204" pitchFamily="49" charset="0"/>
+                    <a:cs typeface="Neo Sans Intel"/>
+                  </a:rPr>
+                  <a:t>l = length</a:t>
+                </a:r>
+                <a:r>
+                  <a:rPr lang="en-US" sz="1600" dirty="0" smtClean="0">
+                    <a:solidFill>
+                      <a:schemeClr val="tx2"/>
+                    </a:solidFill>
+                    <a:latin typeface="Lucida Console" panose="020B0609040504020204" pitchFamily="49" charset="0"/>
+                    <a:cs typeface="Neo Sans Intel"/>
+                  </a:rPr>
+                  <a:t>;</a:t>
+                </a:r>
+              </a:p>
+              <a:p>
+                <a:r>
+                  <a:rPr lang="en-US" sz="1600" dirty="0">
+                    <a:solidFill>
+                      <a:schemeClr val="tx2"/>
+                    </a:solidFill>
+                    <a:latin typeface="Lucida Console" panose="020B0609040504020204" pitchFamily="49" charset="0"/>
+                    <a:cs typeface="Neo Sans Intel"/>
+                  </a:rPr>
+                  <a:t> </a:t>
+                </a:r>
+                <a:r>
+                  <a:rPr lang="en-US" sz="1600" dirty="0" smtClean="0">
+                    <a:solidFill>
+                      <a:schemeClr val="tx2"/>
+                    </a:solidFill>
+                    <a:latin typeface="Lucida Console" panose="020B0609040504020204" pitchFamily="49" charset="0"/>
+                    <a:cs typeface="Neo Sans Intel"/>
+                  </a:rPr>
+                  <a:t>      </a:t>
+                </a:r>
+                <a:r>
+                  <a:rPr lang="en-US" sz="1600" dirty="0">
+                    <a:solidFill>
+                      <a:schemeClr val="tx2"/>
+                    </a:solidFill>
+                    <a:latin typeface="Lucida Console" panose="020B0609040504020204" pitchFamily="49" charset="0"/>
+                    <a:cs typeface="Neo Sans Intel"/>
+                  </a:rPr>
+                  <a:t>j &lt; l; j = j + 4) {</a:t>
+                </a:r>
+              </a:p>
+              <a:p>
+                <a:r>
+                  <a:rPr lang="en-US" sz="1600" dirty="0">
+                    <a:solidFill>
+                      <a:schemeClr val="tx2"/>
+                    </a:solidFill>
+                    <a:latin typeface="Lucida Console" panose="020B0609040504020204" pitchFamily="49" charset="0"/>
+                    <a:cs typeface="Neo Sans Intel"/>
+                  </a:rPr>
+                  <a:t>    sumx4 = _</a:t>
+                </a:r>
+                <a:r>
+                  <a:rPr lang="en-US" sz="1600" dirty="0" err="1">
+                    <a:solidFill>
+                      <a:schemeClr val="tx2"/>
+                    </a:solidFill>
+                    <a:latin typeface="Lucida Console" panose="020B0609040504020204" pitchFamily="49" charset="0"/>
+                    <a:cs typeface="Neo Sans Intel"/>
+                  </a:rPr>
+                  <a:t>mm_add_ps</a:t>
+                </a:r>
+                <a:r>
+                  <a:rPr lang="en-US" sz="1600" dirty="0" smtClean="0">
+                    <a:solidFill>
+                      <a:schemeClr val="tx2"/>
+                    </a:solidFill>
+                    <a:latin typeface="Lucida Console" panose="020B0609040504020204" pitchFamily="49" charset="0"/>
+                    <a:cs typeface="Neo Sans Intel"/>
+                  </a:rPr>
+                  <a:t>(</a:t>
+                </a:r>
+              </a:p>
+              <a:p>
+                <a:r>
+                  <a:rPr lang="en-US" sz="1600" dirty="0">
+                    <a:solidFill>
+                      <a:schemeClr val="tx2"/>
+                    </a:solidFill>
+                    <a:latin typeface="Lucida Console" panose="020B0609040504020204" pitchFamily="49" charset="0"/>
+                    <a:cs typeface="Neo Sans Intel"/>
+                  </a:rPr>
+                  <a:t> </a:t>
+                </a:r>
+                <a:r>
+                  <a:rPr lang="en-US" sz="1600" dirty="0" smtClean="0">
+                    <a:solidFill>
+                      <a:schemeClr val="tx2"/>
+                    </a:solidFill>
+                    <a:latin typeface="Lucida Console" panose="020B0609040504020204" pitchFamily="49" charset="0"/>
+                    <a:cs typeface="Neo Sans Intel"/>
+                  </a:rPr>
+                  <a:t>             sumx4,_</a:t>
+                </a:r>
+                <a:r>
+                  <a:rPr lang="en-US" sz="1600" dirty="0">
+                    <a:solidFill>
+                      <a:schemeClr val="tx2"/>
+                    </a:solidFill>
+                    <a:latin typeface="Lucida Console" panose="020B0609040504020204" pitchFamily="49" charset="0"/>
+                    <a:cs typeface="Neo Sans Intel"/>
+                  </a:rPr>
+                  <a:t>mm_loadu_ps(&amp;(a[j])));</a:t>
+                </a:r>
+              </a:p>
+              <a:p>
+                <a:r>
+                  <a:rPr lang="en-US" sz="1600" dirty="0">
+                    <a:solidFill>
+                      <a:schemeClr val="tx2"/>
+                    </a:solidFill>
+                    <a:latin typeface="Lucida Console" panose="020B0609040504020204" pitchFamily="49" charset="0"/>
+                    <a:cs typeface="Neo Sans Intel"/>
+                  </a:rPr>
+                  <a:t>  }</a:t>
+                </a:r>
+              </a:p>
+              <a:p>
+                <a:r>
+                  <a:rPr lang="en-US" sz="1600" dirty="0">
+                    <a:solidFill>
+                      <a:schemeClr val="tx2"/>
+                    </a:solidFill>
+                    <a:latin typeface="Lucida Console" panose="020B0609040504020204" pitchFamily="49" charset="0"/>
+                    <a:cs typeface="Neo Sans Intel"/>
+                  </a:rPr>
+                  <a:t>  float mSumx4[4];</a:t>
+                </a:r>
+              </a:p>
+              <a:p>
+                <a:r>
+                  <a:rPr lang="en-US" sz="1600" dirty="0">
+                    <a:solidFill>
+                      <a:schemeClr val="tx2"/>
+                    </a:solidFill>
+                    <a:latin typeface="Lucida Console" panose="020B0609040504020204" pitchFamily="49" charset="0"/>
+                    <a:cs typeface="Neo Sans Intel"/>
+                  </a:rPr>
+                  <a:t>  _</a:t>
+                </a:r>
+                <a:r>
+                  <a:rPr lang="en-US" sz="1600" dirty="0" err="1">
+                    <a:solidFill>
+                      <a:schemeClr val="tx2"/>
+                    </a:solidFill>
+                    <a:latin typeface="Lucida Console" panose="020B0609040504020204" pitchFamily="49" charset="0"/>
+                    <a:cs typeface="Neo Sans Intel"/>
+                  </a:rPr>
+                  <a:t>mm_storeu_ps</a:t>
+                </a:r>
+                <a:r>
+                  <a:rPr lang="en-US" sz="1600" dirty="0">
+                    <a:solidFill>
+                      <a:schemeClr val="tx2"/>
+                    </a:solidFill>
+                    <a:latin typeface="Lucida Console" panose="020B0609040504020204" pitchFamily="49" charset="0"/>
+                    <a:cs typeface="Neo Sans Intel"/>
+                  </a:rPr>
+                  <a:t>(mSumx4, sumx4);</a:t>
+                </a:r>
+              </a:p>
+              <a:p>
+                <a:r>
+                  <a:rPr lang="en-US" sz="1600" dirty="0">
+                    <a:solidFill>
+                      <a:schemeClr val="tx2"/>
+                    </a:solidFill>
+                    <a:latin typeface="Lucida Console" panose="020B0609040504020204" pitchFamily="49" charset="0"/>
+                    <a:cs typeface="Neo Sans Intel"/>
+                  </a:rPr>
+                  <a:t>  return (mSumx4[0] + mSumx4[1] </a:t>
+                </a:r>
+                <a:r>
+                  <a:rPr lang="en-US" sz="1600" dirty="0" smtClean="0">
+                    <a:solidFill>
+                      <a:schemeClr val="tx2"/>
+                    </a:solidFill>
+                    <a:latin typeface="Lucida Console" panose="020B0609040504020204" pitchFamily="49" charset="0"/>
+                    <a:cs typeface="Neo Sans Intel"/>
+                  </a:rPr>
+                  <a:t>+</a:t>
+                </a:r>
+              </a:p>
+              <a:p>
+                <a:r>
+                  <a:rPr lang="en-US" sz="1600" dirty="0">
+                    <a:solidFill>
+                      <a:schemeClr val="tx2"/>
+                    </a:solidFill>
+                    <a:latin typeface="Lucida Console" panose="020B0609040504020204" pitchFamily="49" charset="0"/>
+                    <a:cs typeface="Neo Sans Intel"/>
+                  </a:rPr>
+                  <a:t> </a:t>
+                </a:r>
+                <a:r>
+                  <a:rPr lang="en-US" sz="1600" dirty="0" smtClean="0">
+                    <a:solidFill>
+                      <a:schemeClr val="tx2"/>
+                    </a:solidFill>
+                    <a:latin typeface="Lucida Console" panose="020B0609040504020204" pitchFamily="49" charset="0"/>
+                    <a:cs typeface="Neo Sans Intel"/>
+                  </a:rPr>
+                  <a:t>         </a:t>
+                </a:r>
+                <a:r>
+                  <a:rPr lang="en-US" sz="1600" dirty="0">
+                    <a:solidFill>
+                      <a:schemeClr val="tx2"/>
+                    </a:solidFill>
+                    <a:latin typeface="Lucida Console" panose="020B0609040504020204" pitchFamily="49" charset="0"/>
+                    <a:cs typeface="Neo Sans Intel"/>
+                  </a:rPr>
+                  <a:t>mSumx4[2] + mSumx4[3])/length;</a:t>
+                </a:r>
+              </a:p>
+              <a:p>
+                <a:r>
+                  <a:rPr lang="en-US" sz="1600" dirty="0">
+                    <a:solidFill>
+                      <a:schemeClr val="tx2"/>
+                    </a:solidFill>
+                    <a:latin typeface="Lucida Console" panose="020B0609040504020204" pitchFamily="49" charset="0"/>
+                    <a:cs typeface="Neo Sans Intel"/>
+                  </a:rPr>
+                  <a:t>}</a:t>
+                </a:r>
+                <a:endParaRPr lang="en-US" sz="1600" dirty="0" smtClean="0">
+                  <a:solidFill>
+                    <a:schemeClr val="tx2"/>
+                  </a:solidFill>
+                  <a:latin typeface="Lucida Console" panose="020B0609040504020204" pitchFamily="49" charset="0"/>
+                  <a:cs typeface="Neo Sans Intel"/>
+                </a:endParaRPr>
+              </a:p>
+            </p:txBody>
+          </p:sp>
+          <p:sp>
+            <p:nvSpPr>
+              <p:cNvPr id="6" name="TextBox 5"/>
+              <p:cNvSpPr txBox="1"/>
+              <p:nvPr/>
+            </p:nvSpPr>
+            <p:spPr>
+              <a:xfrm>
+                <a:off x="1138877" y="2076493"/>
+                <a:ext cx="3711272" cy="461665"/>
+              </a:xfrm>
+              <a:prstGeom prst="rect">
+                <a:avLst/>
+              </a:prstGeom>
+              <a:noFill/>
+            </p:spPr>
+            <p:txBody>
+              <a:bodyPr wrap="none" rtlCol="0">
+                <a:spAutoFit/>
+              </a:bodyPr>
+              <a:lstStyle/>
+              <a:p>
+                <a:r>
+                  <a:rPr lang="en-US" sz="2400" u="sng" dirty="0" smtClean="0">
+                    <a:solidFill>
+                      <a:schemeClr val="tx2"/>
+                    </a:solidFill>
+                    <a:cs typeface="Neo Sans Intel"/>
+                  </a:rPr>
+                  <a:t>C code with x86 </a:t>
+                </a:r>
+                <a:r>
+                  <a:rPr lang="en-US" sz="2400" u="sng" dirty="0" err="1" smtClean="0">
+                    <a:solidFill>
+                      <a:schemeClr val="tx2"/>
+                    </a:solidFill>
+                    <a:cs typeface="Neo Sans Intel"/>
+                  </a:rPr>
+                  <a:t>intrinsics</a:t>
+                </a:r>
+                <a:endParaRPr lang="en-US" sz="2400" u="sng" dirty="0" smtClean="0">
+                  <a:solidFill>
+                    <a:schemeClr val="tx2"/>
+                  </a:solidFill>
+                  <a:cs typeface="Neo Sans Intel"/>
+                </a:endParaRPr>
+              </a:p>
+            </p:txBody>
+          </p:sp>
+        </p:grpSp>
+        <p:sp>
+          <p:nvSpPr>
+            <p:cNvPr id="13" name="Oval 12"/>
+            <p:cNvSpPr/>
+            <p:nvPr/>
+          </p:nvSpPr>
+          <p:spPr>
+            <a:xfrm>
+              <a:off x="1783080" y="3809999"/>
+              <a:ext cx="1569720" cy="320041"/>
+            </a:xfrm>
+            <a:prstGeom prst="ellipse">
+              <a:avLst/>
+            </a:prstGeom>
+            <a:noFill/>
+            <a:ln w="25400">
+              <a:solidFill>
+                <a:srgbClr val="FF0000"/>
+              </a:solidFill>
+            </a:ln>
+            <a:effectLst/>
+          </p:spPr>
+          <p:style>
+            <a:lnRef idx="1">
+              <a:schemeClr val="accent1"/>
+            </a:lnRef>
+            <a:fillRef idx="3">
+              <a:schemeClr val="accent1"/>
+            </a:fillRef>
+            <a:effectRef idx="2">
+              <a:schemeClr val="accent1"/>
+            </a:effectRef>
+            <a:fontRef idx="minor">
+              <a:schemeClr val="lt1"/>
+            </a:fontRef>
+          </p:style>
+          <p:txBody>
+            <a:bodyPr rtlCol="0" anchor="ctr"/>
+            <a:lstStyle/>
+            <a:p>
+              <a:pPr algn="ctr"/>
+              <a:endParaRPr lang="en-US"/>
+            </a:p>
+          </p:txBody>
+        </p:sp>
+        <p:sp>
+          <p:nvSpPr>
+            <p:cNvPr id="14" name="Oval 13"/>
+            <p:cNvSpPr/>
+            <p:nvPr/>
+          </p:nvSpPr>
+          <p:spPr>
+            <a:xfrm>
+              <a:off x="2684672" y="4048299"/>
+              <a:ext cx="1792060" cy="356061"/>
+            </a:xfrm>
+            <a:prstGeom prst="ellipse">
+              <a:avLst/>
+            </a:prstGeom>
+            <a:noFill/>
+            <a:ln w="25400">
+              <a:solidFill>
+                <a:srgbClr val="FF0000"/>
+              </a:solidFill>
+            </a:ln>
+            <a:effectLst/>
+          </p:spPr>
+          <p:style>
+            <a:lnRef idx="1">
+              <a:schemeClr val="accent1"/>
+            </a:lnRef>
+            <a:fillRef idx="3">
+              <a:schemeClr val="accent1"/>
+            </a:fillRef>
+            <a:effectRef idx="2">
+              <a:schemeClr val="accent1"/>
+            </a:effectRef>
+            <a:fontRef idx="minor">
+              <a:schemeClr val="lt1"/>
+            </a:fontRef>
+          </p:style>
+          <p:txBody>
+            <a:bodyPr rtlCol="0" anchor="ctr"/>
+            <a:lstStyle/>
+            <a:p>
+              <a:pPr algn="ctr"/>
+              <a:endParaRPr lang="en-US"/>
+            </a:p>
+          </p:txBody>
+        </p:sp>
+      </p:grpSp>
+    </p:spTree>
+    <p:extLst>
+      <p:ext uri="{BB962C8B-B14F-4D97-AF65-F5344CB8AC3E}">
+        <p14:creationId xmlns:p14="http://schemas.microsoft.com/office/powerpoint/2010/main" val="3316198848"/>
       </p:ext>
     </p:extLst>
   </p:cSld>
@@ -8178,7 +10768,7 @@
           <a:p>
             <a:r>
               <a:rPr lang="en-US" dirty="0" smtClean="0"/>
-              <a:t>Demo</a:t>
+              <a:t>Demo - Mandelbrot</a:t>
             </a:r>
             <a:endParaRPr lang="en-US" dirty="0"/>
           </a:p>
@@ -8186,7 +10776,7 @@
       </p:sp>
       <p:pic>
         <p:nvPicPr>
-          <p:cNvPr id="4" name="Picture 3"/>
+          <p:cNvPr id="5" name="Picture 4"/>
           <p:cNvPicPr>
             <a:picLocks noChangeAspect="1"/>
           </p:cNvPicPr>
@@ -8206,8 +10796,38 @@
         </p:blipFill>
         <p:spPr>
           <a:xfrm>
-            <a:off x="2491792" y="990917"/>
-            <a:ext cx="7204183" cy="5580705"/>
+            <a:off x="6178855" y="1570036"/>
+            <a:ext cx="5442053" cy="3839191"/>
+          </a:xfrm>
+          <a:prstGeom prst="rect">
+            <a:avLst/>
+          </a:prstGeom>
+        </p:spPr>
+      </p:pic>
+      <p:pic>
+        <p:nvPicPr>
+          <p:cNvPr id="6" name="Picture 5"/>
+          <p:cNvPicPr>
+            <a:picLocks noChangeAspect="1"/>
+          </p:cNvPicPr>
+          <p:nvPr/>
+        </p:nvPicPr>
+        <p:blipFill>
+          <a:blip r:embed="rId3">
+            <a:extLst>
+              <a:ext uri="{28A0092B-C50C-407E-A947-70E740481C1C}">
+                <a14:useLocalDpi xmlns:a14="http://schemas.microsoft.com/office/drawing/2010/main" val="0"/>
+              </a:ext>
+            </a:extLst>
+          </a:blip>
+          <a:stretch>
+            <a:fillRect/>
+          </a:stretch>
+        </p:blipFill>
+        <p:spPr>
+          <a:xfrm>
+            <a:off x="716271" y="1570117"/>
+            <a:ext cx="5353797" cy="3839111"/>
           </a:xfrm>
           <a:prstGeom prst="rect">
             <a:avLst/>

</xml_diff>

<commit_message>
Final touches and a .pdf version
</commit_message>
<xml_diff>
--- a/simdjs-presentation.pptx
+++ b/simdjs-presentation.pptx
@@ -23,6 +23,14 @@
     <p:sldId id="271" r:id="rId17"/>
     <p:sldId id="272" r:id="rId18"/>
     <p:sldId id="273" r:id="rId19"/>
+    <p:sldId id="274" r:id="rId20"/>
+    <p:sldId id="275" r:id="rId21"/>
+    <p:sldId id="276" r:id="rId22"/>
+    <p:sldId id="277" r:id="rId23"/>
+    <p:sldId id="278" r:id="rId24"/>
+    <p:sldId id="279" r:id="rId25"/>
+    <p:sldId id="280" r:id="rId26"/>
+    <p:sldId id="281" r:id="rId27"/>
   </p:sldIdLst>
   <p:sldSz cx="12192000" cy="6858000"/>
   <p:notesSz cx="6858000" cy="9144000"/>
@@ -362,7 +370,7 @@
           <a:noFill/>
           <a:extLst>
             <a:ext uri="{909E8E84-426E-40dd-AFC4-6F175D3DCCD1}">
-              <a14:hiddenFill xmlns="" xmlns:a14="http://schemas.microsoft.com/office/drawing/2010/main">
+              <a14:hiddenFill xmlns:a14="http://schemas.microsoft.com/office/drawing/2010/main" xmlns="">
                 <a:solidFill>
                   <a:srgbClr val="FFFFFF"/>
                 </a:solidFill>
@@ -403,7 +411,7 @@
           <a:noFill/>
           <a:extLst>
             <a:ext uri="{909E8E84-426E-40dd-AFC4-6F175D3DCCD1}">
-              <a14:hiddenFill xmlns="" xmlns:a14="http://schemas.microsoft.com/office/drawing/2010/main">
+              <a14:hiddenFill xmlns:a14="http://schemas.microsoft.com/office/drawing/2010/main" xmlns="">
                 <a:solidFill>
                   <a:srgbClr val="FFFFFF"/>
                 </a:solidFill>
@@ -726,7 +734,7 @@
           <a:noFill/>
           <a:extLst>
             <a:ext uri="{909E8E84-426E-40dd-AFC4-6F175D3DCCD1}">
-              <a14:hiddenFill xmlns="" xmlns:a14="http://schemas.microsoft.com/office/drawing/2010/main">
+              <a14:hiddenFill xmlns:a14="http://schemas.microsoft.com/office/drawing/2010/main" xmlns="">
                 <a:solidFill>
                   <a:srgbClr val="FFFFFF"/>
                 </a:solidFill>
@@ -1012,7 +1020,7 @@
           <a:noFill/>
           <a:extLst>
             <a:ext uri="{909E8E84-426E-40dd-AFC4-6F175D3DCCD1}">
-              <a14:hiddenFill xmlns="" xmlns:a14="http://schemas.microsoft.com/office/drawing/2010/main">
+              <a14:hiddenFill xmlns:a14="http://schemas.microsoft.com/office/drawing/2010/main" xmlns="">
                 <a:solidFill>
                   <a:srgbClr val="FFFFFF"/>
                 </a:solidFill>
@@ -1621,7 +1629,7 @@
           <a:noFill/>
           <a:extLst>
             <a:ext uri="{909E8E84-426E-40dd-AFC4-6F175D3DCCD1}">
-              <a14:hiddenFill xmlns="" xmlns:a14="http://schemas.microsoft.com/office/drawing/2010/main">
+              <a14:hiddenFill xmlns:a14="http://schemas.microsoft.com/office/drawing/2010/main" xmlns="">
                 <a:solidFill>
                   <a:srgbClr val="FFFFFF"/>
                 </a:solidFill>
@@ -2559,7 +2567,7 @@
           <a:noFill/>
           <a:extLst>
             <a:ext uri="{909E8E84-426E-40dd-AFC4-6F175D3DCCD1}">
-              <a14:hiddenFill xmlns="" xmlns:a14="http://schemas.microsoft.com/office/drawing/2010/main">
+              <a14:hiddenFill xmlns:a14="http://schemas.microsoft.com/office/drawing/2010/main" xmlns="">
                 <a:solidFill>
                   <a:srgbClr val="FFFFFF"/>
                 </a:solidFill>
@@ -4653,7 +4661,7 @@
           <a:noFill/>
           <a:extLst>
             <a:ext uri="{909E8E84-426E-40dd-AFC4-6F175D3DCCD1}">
-              <a14:hiddenFill xmlns="" xmlns:a14="http://schemas.microsoft.com/office/drawing/2010/main">
+              <a14:hiddenFill xmlns:a14="http://schemas.microsoft.com/office/drawing/2010/main" xmlns="">
                 <a:solidFill>
                   <a:srgbClr val="FFFFFF"/>
                 </a:solidFill>
@@ -7673,7 +7681,7 @@
             </a:pPr>
             <a:r>
               <a:rPr lang="en-US" dirty="0" smtClean="0"/>
-              <a:t>Pointers are indices used to access elements of these arrays</a:t>
+              <a:t>C/C++ pointers used as indices to access elements of these arrays</a:t>
             </a:r>
             <a:endParaRPr lang="en-US" dirty="0"/>
           </a:p>
@@ -7940,7 +7948,15 @@
             </a:pPr>
             <a:r>
               <a:rPr lang="en-US" dirty="0" smtClean="0"/>
-              <a:t>Bitwise-Or zero (expr | 0) used to indicate 32-bit signed </a:t>
+              <a:t>Bitwise-Or zero (</a:t>
+            </a:r>
+            <a:r>
+              <a:rPr lang="en-US" dirty="0" smtClean="0"/>
+              <a:t>expr|0</a:t>
+            </a:r>
+            <a:r>
+              <a:rPr lang="en-US" dirty="0" smtClean="0"/>
+              <a:t>) used to indicate 32-bit signed </a:t>
             </a:r>
             <a:r>
               <a:rPr lang="en-US" dirty="0" err="1" smtClean="0"/>
@@ -8725,7 +8741,7 @@
                 </a:solidFill>
                 <a:cs typeface="Neo Sans Intel"/>
               </a:rPr>
-              <a:t>4 days to port</a:t>
+              <a:t>4 days to port!</a:t>
             </a:r>
           </a:p>
         </p:txBody>
@@ -10047,6 +10063,204 @@
 </p:sld>
 </file>
 
+<file path=ppt/slides/slide19.xml><?xml version="1.0" encoding="utf-8"?>
+<p:sld xmlns:a="http://schemas.openxmlformats.org/drawingml/2006/main" xmlns:r="http://schemas.openxmlformats.org/officeDocument/2006/relationships" xmlns:p="http://schemas.openxmlformats.org/presentationml/2006/main">
+  <p:cSld>
+    <p:spTree>
+      <p:nvGrpSpPr>
+        <p:cNvPr id="1" name=""/>
+        <p:cNvGrpSpPr/>
+        <p:nvPr/>
+      </p:nvGrpSpPr>
+      <p:grpSpPr>
+        <a:xfrm>
+          <a:off x="0" y="0"/>
+          <a:ext cx="0" cy="0"/>
+          <a:chOff x="0" y="0"/>
+          <a:chExt cx="0" cy="0"/>
+        </a:xfrm>
+      </p:grpSpPr>
+      <p:sp>
+        <p:nvSpPr>
+          <p:cNvPr id="2" name="Title 1"/>
+          <p:cNvSpPr>
+            <a:spLocks noGrp="1"/>
+          </p:cNvSpPr>
+          <p:nvPr>
+            <p:ph type="title"/>
+          </p:nvPr>
+        </p:nvSpPr>
+        <p:spPr/>
+        <p:txBody>
+          <a:bodyPr/>
+          <a:lstStyle/>
+          <a:p>
+            <a:r>
+              <a:rPr lang="en-US" dirty="0" smtClean="0"/>
+              <a:t>Benchmarks</a:t>
+            </a:r>
+            <a:endParaRPr lang="en-US" dirty="0"/>
+          </a:p>
+        </p:txBody>
+      </p:sp>
+      <p:sp>
+        <p:nvSpPr>
+          <p:cNvPr id="3" name="Content Placeholder 2"/>
+          <p:cNvSpPr>
+            <a:spLocks noGrp="1"/>
+          </p:cNvSpPr>
+          <p:nvPr>
+            <p:ph sz="quarter" idx="13"/>
+          </p:nvPr>
+        </p:nvSpPr>
+        <p:spPr>
+          <a:xfrm>
+            <a:off x="609601" y="1175657"/>
+            <a:ext cx="10970683" cy="5177642"/>
+          </a:xfrm>
+        </p:spPr>
+        <p:txBody>
+          <a:bodyPr>
+            <a:normAutofit lnSpcReduction="10000"/>
+          </a:bodyPr>
+          <a:lstStyle/>
+          <a:p>
+            <a:pPr marL="342900" indent="-342900">
+              <a:buFont typeface="Arial" panose="020B0604020202020204" pitchFamily="34" charset="0"/>
+              <a:buChar char="•"/>
+            </a:pPr>
+            <a:r>
+              <a:rPr lang="en-US" dirty="0" smtClean="0"/>
+              <a:t>Handwritten JavaScript benchmark kernels:</a:t>
+            </a:r>
+          </a:p>
+          <a:p>
+            <a:pPr marL="643459" lvl="1" indent="-342900">
+              <a:buFont typeface="Arial" panose="020B0604020202020204" pitchFamily="34" charset="0"/>
+              <a:buChar char="•"/>
+            </a:pPr>
+            <a:r>
+              <a:rPr lang="en-US" dirty="0" smtClean="0"/>
+              <a:t>Average, Mandelbrot, </a:t>
+            </a:r>
+            <a:r>
+              <a:rPr lang="en-US" dirty="0" err="1" smtClean="0"/>
+              <a:t>MatrixMultiplication</a:t>
+            </a:r>
+            <a:r>
+              <a:rPr lang="en-US" dirty="0" smtClean="0"/>
+              <a:t>, </a:t>
+            </a:r>
+            <a:r>
+              <a:rPr lang="en-US" dirty="0" err="1" smtClean="0"/>
+              <a:t>VertexTransform</a:t>
+            </a:r>
+            <a:r>
+              <a:rPr lang="en-US" dirty="0" smtClean="0"/>
+              <a:t>, </a:t>
+            </a:r>
+            <a:r>
+              <a:rPr lang="en-US" dirty="0" err="1" smtClean="0"/>
+              <a:t>MatrixTranspose</a:t>
+            </a:r>
+            <a:r>
+              <a:rPr lang="en-US" dirty="0" smtClean="0"/>
+              <a:t>, </a:t>
+            </a:r>
+            <a:r>
+              <a:rPr lang="en-US" dirty="0" err="1" smtClean="0"/>
+              <a:t>MatrixInverse</a:t>
+            </a:r>
+            <a:endParaRPr lang="en-US" dirty="0" smtClean="0"/>
+          </a:p>
+          <a:p>
+            <a:pPr marL="643459" lvl="1" indent="-342900">
+              <a:buFont typeface="Arial" panose="020B0604020202020204" pitchFamily="34" charset="0"/>
+              <a:buChar char="•"/>
+            </a:pPr>
+            <a:r>
+              <a:rPr lang="en-US" dirty="0" smtClean="0"/>
+              <a:t>Vector/Matrix math important for game/physics</a:t>
+            </a:r>
+          </a:p>
+          <a:p>
+            <a:pPr marL="643459" lvl="1" indent="-342900">
+              <a:buFont typeface="Arial" panose="020B0604020202020204" pitchFamily="34" charset="0"/>
+              <a:buChar char="•"/>
+            </a:pPr>
+            <a:r>
+              <a:rPr lang="en-US" dirty="0" smtClean="0"/>
+              <a:t>Kernels for both scalar and SIMD implementations</a:t>
+            </a:r>
+          </a:p>
+          <a:p>
+            <a:pPr marL="643459" lvl="1" indent="-342900">
+              <a:buFont typeface="Arial" panose="020B0604020202020204" pitchFamily="34" charset="0"/>
+              <a:buChar char="•"/>
+            </a:pPr>
+            <a:r>
+              <a:rPr lang="en-US" dirty="0" smtClean="0"/>
+              <a:t>Measure speedup (SIMD/scalar)</a:t>
+            </a:r>
+          </a:p>
+          <a:p>
+            <a:pPr marL="342900" indent="-342900">
+              <a:buFont typeface="Arial" panose="020B0604020202020204" pitchFamily="34" charset="0"/>
+              <a:buChar char="•"/>
+            </a:pPr>
+            <a:r>
+              <a:rPr lang="en-US" dirty="0" smtClean="0"/>
+              <a:t>Manually converted to C++</a:t>
+            </a:r>
+          </a:p>
+          <a:p>
+            <a:pPr marL="342900" indent="-342900">
+              <a:buFont typeface="Arial" panose="020B0604020202020204" pitchFamily="34" charset="0"/>
+              <a:buChar char="•"/>
+            </a:pPr>
+            <a:r>
+              <a:rPr lang="en-US" dirty="0" smtClean="0"/>
+              <a:t>Automatically compiled back to JavaScript with Emscripten</a:t>
+            </a:r>
+          </a:p>
+          <a:p>
+            <a:pPr marL="342900" indent="-342900">
+              <a:buFont typeface="Arial" panose="020B0604020202020204" pitchFamily="34" charset="0"/>
+              <a:buChar char="•"/>
+            </a:pPr>
+            <a:r>
+              <a:rPr lang="en-US" dirty="0" smtClean="0"/>
+              <a:t>JavaScript code executed with both Chromium and Firefox SIMD prototypes</a:t>
+            </a:r>
+          </a:p>
+          <a:p>
+            <a:pPr marL="342900" indent="-342900">
+              <a:buFont typeface="Arial" panose="020B0604020202020204" pitchFamily="34" charset="0"/>
+              <a:buChar char="•"/>
+            </a:pPr>
+            <a:r>
+              <a:rPr lang="en-US" dirty="0" smtClean="0"/>
+              <a:t>Native clang/LLVM compiler used to compile C++ code</a:t>
+            </a:r>
+          </a:p>
+          <a:p>
+            <a:endParaRPr lang="en-US" dirty="0"/>
+          </a:p>
+        </p:txBody>
+      </p:sp>
+    </p:spTree>
+    <p:extLst>
+      <p:ext uri="{BB962C8B-B14F-4D97-AF65-F5344CB8AC3E}">
+        <p14:creationId xmlns:p14="http://schemas.microsoft.com/office/powerpoint/2010/main" val="3150181395"/>
+      </p:ext>
+    </p:extLst>
+  </p:cSld>
+  <p:clrMapOvr>
+    <a:masterClrMapping/>
+  </p:clrMapOvr>
+</p:sld>
+</file>
+
 <file path=ppt/slides/slide2.xml><?xml version="1.0" encoding="utf-8"?>
 <p:sld xmlns:a="http://schemas.openxmlformats.org/drawingml/2006/main" xmlns:r="http://schemas.openxmlformats.org/officeDocument/2006/relationships" xmlns:p="http://schemas.openxmlformats.org/presentationml/2006/main">
   <p:cSld>
@@ -10158,7 +10372,21 @@
             </a:pPr>
             <a:r>
               <a:rPr lang="en-US" dirty="0" smtClean="0"/>
+              <a:t>Benchmark </a:t>
+            </a:r>
+            <a:r>
+              <a:rPr lang="en-US" dirty="0" smtClean="0"/>
               <a:t>Results</a:t>
+            </a:r>
+          </a:p>
+          <a:p>
+            <a:pPr marL="342900" indent="-342900">
+              <a:buFont typeface="Arial" panose="020B0604020202020204" pitchFamily="34" charset="0"/>
+              <a:buChar char="•"/>
+            </a:pPr>
+            <a:r>
+              <a:rPr lang="en-US" dirty="0" smtClean="0"/>
+              <a:t>Summary</a:t>
             </a:r>
             <a:endParaRPr lang="en-US" dirty="0"/>
           </a:p>
@@ -10168,6 +10396,2460 @@
     <p:extLst>
       <p:ext uri="{BB962C8B-B14F-4D97-AF65-F5344CB8AC3E}">
         <p14:creationId xmlns:p14="http://schemas.microsoft.com/office/powerpoint/2010/main" val="4258955792"/>
+      </p:ext>
+    </p:extLst>
+  </p:cSld>
+  <p:clrMapOvr>
+    <a:masterClrMapping/>
+  </p:clrMapOvr>
+</p:sld>
+</file>
+
+<file path=ppt/slides/slide20.xml><?xml version="1.0" encoding="utf-8"?>
+<p:sld xmlns:a="http://schemas.openxmlformats.org/drawingml/2006/main" xmlns:r="http://schemas.openxmlformats.org/officeDocument/2006/relationships" xmlns:p="http://schemas.openxmlformats.org/presentationml/2006/main">
+  <p:cSld>
+    <p:spTree>
+      <p:nvGrpSpPr>
+        <p:cNvPr id="1" name=""/>
+        <p:cNvGrpSpPr/>
+        <p:nvPr/>
+      </p:nvGrpSpPr>
+      <p:grpSpPr>
+        <a:xfrm>
+          <a:off x="0" y="0"/>
+          <a:ext cx="0" cy="0"/>
+          <a:chOff x="0" y="0"/>
+          <a:chExt cx="0" cy="0"/>
+        </a:xfrm>
+      </p:grpSpPr>
+      <p:sp>
+        <p:nvSpPr>
+          <p:cNvPr id="2" name="Title 1"/>
+          <p:cNvSpPr>
+            <a:spLocks noGrp="1"/>
+          </p:cNvSpPr>
+          <p:nvPr>
+            <p:ph type="title"/>
+          </p:nvPr>
+        </p:nvSpPr>
+        <p:spPr/>
+        <p:txBody>
+          <a:bodyPr/>
+          <a:lstStyle/>
+          <a:p>
+            <a:r>
+              <a:rPr lang="en-US" dirty="0" smtClean="0"/>
+              <a:t>Benchmarks – Handwritten JavaScript</a:t>
+            </a:r>
+            <a:endParaRPr lang="en-US" dirty="0"/>
+          </a:p>
+        </p:txBody>
+      </p:sp>
+      <p:grpSp>
+        <p:nvGrpSpPr>
+          <p:cNvPr id="10" name="Group 9"/>
+          <p:cNvGrpSpPr/>
+          <p:nvPr/>
+        </p:nvGrpSpPr>
+        <p:grpSpPr>
+          <a:xfrm>
+            <a:off x="1747516" y="1108372"/>
+            <a:ext cx="5985934" cy="2769989"/>
+            <a:chOff x="1747516" y="1108372"/>
+            <a:chExt cx="5985934" cy="2769989"/>
+          </a:xfrm>
+        </p:grpSpPr>
+        <p:sp>
+          <p:nvSpPr>
+            <p:cNvPr id="4" name="TextBox 3"/>
+            <p:cNvSpPr txBox="1"/>
+            <p:nvPr/>
+          </p:nvSpPr>
+          <p:spPr>
+            <a:xfrm>
+              <a:off x="1747516" y="1570037"/>
+              <a:ext cx="5985934" cy="2308324"/>
+            </a:xfrm>
+            <a:prstGeom prst="rect">
+              <a:avLst/>
+            </a:prstGeom>
+            <a:noFill/>
+          </p:spPr>
+          <p:txBody>
+            <a:bodyPr wrap="none" rtlCol="0">
+              <a:spAutoFit/>
+            </a:bodyPr>
+            <a:lstStyle/>
+            <a:p>
+              <a:r>
+                <a:rPr lang="en-US" sz="1600" dirty="0" smtClean="0">
+                  <a:solidFill>
+                    <a:schemeClr val="tx2"/>
+                  </a:solidFill>
+                  <a:latin typeface="Lucida Console" panose="020B0609040504020204" pitchFamily="49" charset="0"/>
+                  <a:cs typeface="Neo Sans Intel"/>
+                </a:rPr>
+                <a:t>function </a:t>
+              </a:r>
+              <a:r>
+                <a:rPr lang="en-US" sz="1600" dirty="0">
+                  <a:solidFill>
+                    <a:schemeClr val="tx2"/>
+                  </a:solidFill>
+                  <a:latin typeface="Lucida Console" panose="020B0609040504020204" pitchFamily="49" charset="0"/>
+                  <a:cs typeface="Neo Sans Intel"/>
+                </a:rPr>
+                <a:t>average(n) {</a:t>
+              </a:r>
+            </a:p>
+            <a:p>
+              <a:r>
+                <a:rPr lang="en-US" sz="1600" dirty="0" smtClean="0">
+                  <a:solidFill>
+                    <a:schemeClr val="tx2"/>
+                  </a:solidFill>
+                  <a:latin typeface="Lucida Console" panose="020B0609040504020204" pitchFamily="49" charset="0"/>
+                  <a:cs typeface="Neo Sans Intel"/>
+                </a:rPr>
+                <a:t>  </a:t>
+              </a:r>
+              <a:r>
+                <a:rPr lang="en-US" sz="1600" dirty="0">
+                  <a:solidFill>
+                    <a:schemeClr val="tx2"/>
+                  </a:solidFill>
+                  <a:latin typeface="Lucida Console" panose="020B0609040504020204" pitchFamily="49" charset="0"/>
+                  <a:cs typeface="Neo Sans Intel"/>
+                </a:rPr>
+                <a:t>for (</a:t>
+              </a:r>
+              <a:r>
+                <a:rPr lang="en-US" sz="1600" dirty="0" err="1">
+                  <a:solidFill>
+                    <a:schemeClr val="tx2"/>
+                  </a:solidFill>
+                  <a:latin typeface="Lucida Console" panose="020B0609040504020204" pitchFamily="49" charset="0"/>
+                  <a:cs typeface="Neo Sans Intel"/>
+                </a:rPr>
+                <a:t>var</a:t>
+              </a:r>
+              <a:r>
+                <a:rPr lang="en-US" sz="1600" dirty="0">
+                  <a:solidFill>
+                    <a:schemeClr val="tx2"/>
+                  </a:solidFill>
+                  <a:latin typeface="Lucida Console" panose="020B0609040504020204" pitchFamily="49" charset="0"/>
+                  <a:cs typeface="Neo Sans Intel"/>
+                </a:rPr>
+                <a:t> i = 0; i &lt; n; ++i) {</a:t>
+              </a:r>
+            </a:p>
+            <a:p>
+              <a:r>
+                <a:rPr lang="en-US" sz="1600" dirty="0" smtClean="0">
+                  <a:solidFill>
+                    <a:schemeClr val="tx2"/>
+                  </a:solidFill>
+                  <a:latin typeface="Lucida Console" panose="020B0609040504020204" pitchFamily="49" charset="0"/>
+                  <a:cs typeface="Neo Sans Intel"/>
+                </a:rPr>
+                <a:t>    </a:t>
+              </a:r>
+              <a:r>
+                <a:rPr lang="en-US" sz="1600" dirty="0" err="1">
+                  <a:solidFill>
+                    <a:schemeClr val="tx2"/>
+                  </a:solidFill>
+                  <a:latin typeface="Lucida Console" panose="020B0609040504020204" pitchFamily="49" charset="0"/>
+                  <a:cs typeface="Neo Sans Intel"/>
+                </a:rPr>
+                <a:t>var</a:t>
+              </a:r>
+              <a:r>
+                <a:rPr lang="en-US" sz="1600" dirty="0">
+                  <a:solidFill>
+                    <a:schemeClr val="tx2"/>
+                  </a:solidFill>
+                  <a:latin typeface="Lucida Console" panose="020B0609040504020204" pitchFamily="49" charset="0"/>
+                  <a:cs typeface="Neo Sans Intel"/>
+                </a:rPr>
+                <a:t> sum = 0.0;</a:t>
+              </a:r>
+            </a:p>
+            <a:p>
+              <a:r>
+                <a:rPr lang="en-US" sz="1600" dirty="0" smtClean="0">
+                  <a:solidFill>
+                    <a:schemeClr val="tx2"/>
+                  </a:solidFill>
+                  <a:latin typeface="Lucida Console" panose="020B0609040504020204" pitchFamily="49" charset="0"/>
+                  <a:cs typeface="Neo Sans Intel"/>
+                </a:rPr>
+                <a:t>    </a:t>
+              </a:r>
+              <a:r>
+                <a:rPr lang="en-US" sz="1600" dirty="0">
+                  <a:solidFill>
+                    <a:schemeClr val="tx2"/>
+                  </a:solidFill>
+                  <a:latin typeface="Lucida Console" panose="020B0609040504020204" pitchFamily="49" charset="0"/>
+                  <a:cs typeface="Neo Sans Intel"/>
+                </a:rPr>
+                <a:t>for (</a:t>
+              </a:r>
+              <a:r>
+                <a:rPr lang="en-US" sz="1600" dirty="0" err="1">
+                  <a:solidFill>
+                    <a:schemeClr val="tx2"/>
+                  </a:solidFill>
+                  <a:latin typeface="Lucida Console" panose="020B0609040504020204" pitchFamily="49" charset="0"/>
+                  <a:cs typeface="Neo Sans Intel"/>
+                </a:rPr>
+                <a:t>var</a:t>
+              </a:r>
+              <a:r>
+                <a:rPr lang="en-US" sz="1600" dirty="0">
+                  <a:solidFill>
+                    <a:schemeClr val="tx2"/>
+                  </a:solidFill>
+                  <a:latin typeface="Lucida Console" panose="020B0609040504020204" pitchFamily="49" charset="0"/>
+                  <a:cs typeface="Neo Sans Intel"/>
+                </a:rPr>
+                <a:t> j = 0, l = </a:t>
+              </a:r>
+              <a:r>
+                <a:rPr lang="en-US" sz="1600" dirty="0" err="1">
+                  <a:solidFill>
+                    <a:schemeClr val="tx2"/>
+                  </a:solidFill>
+                  <a:latin typeface="Lucida Console" panose="020B0609040504020204" pitchFamily="49" charset="0"/>
+                  <a:cs typeface="Neo Sans Intel"/>
+                </a:rPr>
+                <a:t>a.length</a:t>
+              </a:r>
+              <a:r>
+                <a:rPr lang="en-US" sz="1600" dirty="0">
+                  <a:solidFill>
+                    <a:schemeClr val="tx2"/>
+                  </a:solidFill>
+                  <a:latin typeface="Lucida Console" panose="020B0609040504020204" pitchFamily="49" charset="0"/>
+                  <a:cs typeface="Neo Sans Intel"/>
+                </a:rPr>
+                <a:t>; j &lt; l; ++j) {</a:t>
+              </a:r>
+            </a:p>
+            <a:p>
+              <a:r>
+                <a:rPr lang="en-US" sz="1600" dirty="0" smtClean="0">
+                  <a:solidFill>
+                    <a:schemeClr val="tx2"/>
+                  </a:solidFill>
+                  <a:latin typeface="Lucida Console" panose="020B0609040504020204" pitchFamily="49" charset="0"/>
+                  <a:cs typeface="Neo Sans Intel"/>
+                </a:rPr>
+                <a:t>      </a:t>
+              </a:r>
+              <a:r>
+                <a:rPr lang="en-US" sz="1600" dirty="0">
+                  <a:solidFill>
+                    <a:schemeClr val="tx2"/>
+                  </a:solidFill>
+                  <a:latin typeface="Lucida Console" panose="020B0609040504020204" pitchFamily="49" charset="0"/>
+                  <a:cs typeface="Neo Sans Intel"/>
+                </a:rPr>
+                <a:t>sum += a[j];</a:t>
+              </a:r>
+            </a:p>
+            <a:p>
+              <a:r>
+                <a:rPr lang="en-US" sz="1600" dirty="0" smtClean="0">
+                  <a:solidFill>
+                    <a:schemeClr val="tx2"/>
+                  </a:solidFill>
+                  <a:latin typeface="Lucida Console" panose="020B0609040504020204" pitchFamily="49" charset="0"/>
+                  <a:cs typeface="Neo Sans Intel"/>
+                </a:rPr>
+                <a:t>    </a:t>
+              </a:r>
+              <a:r>
+                <a:rPr lang="en-US" sz="1600" dirty="0">
+                  <a:solidFill>
+                    <a:schemeClr val="tx2"/>
+                  </a:solidFill>
+                  <a:latin typeface="Lucida Console" panose="020B0609040504020204" pitchFamily="49" charset="0"/>
+                  <a:cs typeface="Neo Sans Intel"/>
+                </a:rPr>
+                <a:t>}</a:t>
+              </a:r>
+            </a:p>
+            <a:p>
+              <a:r>
+                <a:rPr lang="en-US" sz="1600" dirty="0" smtClean="0">
+                  <a:solidFill>
+                    <a:schemeClr val="tx2"/>
+                  </a:solidFill>
+                  <a:latin typeface="Lucida Console" panose="020B0609040504020204" pitchFamily="49" charset="0"/>
+                  <a:cs typeface="Neo Sans Intel"/>
+                </a:rPr>
+                <a:t>  </a:t>
+              </a:r>
+              <a:r>
+                <a:rPr lang="en-US" sz="1600" dirty="0">
+                  <a:solidFill>
+                    <a:schemeClr val="tx2"/>
+                  </a:solidFill>
+                  <a:latin typeface="Lucida Console" panose="020B0609040504020204" pitchFamily="49" charset="0"/>
+                  <a:cs typeface="Neo Sans Intel"/>
+                </a:rPr>
+                <a:t>}</a:t>
+              </a:r>
+            </a:p>
+            <a:p>
+              <a:r>
+                <a:rPr lang="en-US" sz="1600" dirty="0" smtClean="0">
+                  <a:solidFill>
+                    <a:schemeClr val="tx2"/>
+                  </a:solidFill>
+                  <a:latin typeface="Lucida Console" panose="020B0609040504020204" pitchFamily="49" charset="0"/>
+                  <a:cs typeface="Neo Sans Intel"/>
+                </a:rPr>
+                <a:t>  </a:t>
+              </a:r>
+              <a:r>
+                <a:rPr lang="en-US" sz="1600" dirty="0">
+                  <a:solidFill>
+                    <a:schemeClr val="tx2"/>
+                  </a:solidFill>
+                  <a:latin typeface="Lucida Console" panose="020B0609040504020204" pitchFamily="49" charset="0"/>
+                  <a:cs typeface="Neo Sans Intel"/>
+                </a:rPr>
+                <a:t>return sum/</a:t>
+              </a:r>
+              <a:r>
+                <a:rPr lang="en-US" sz="1600" dirty="0" err="1">
+                  <a:solidFill>
+                    <a:schemeClr val="tx2"/>
+                  </a:solidFill>
+                  <a:latin typeface="Lucida Console" panose="020B0609040504020204" pitchFamily="49" charset="0"/>
+                  <a:cs typeface="Neo Sans Intel"/>
+                </a:rPr>
+                <a:t>a.length</a:t>
+              </a:r>
+              <a:r>
+                <a:rPr lang="en-US" sz="1600" dirty="0">
+                  <a:solidFill>
+                    <a:schemeClr val="tx2"/>
+                  </a:solidFill>
+                  <a:latin typeface="Lucida Console" panose="020B0609040504020204" pitchFamily="49" charset="0"/>
+                  <a:cs typeface="Neo Sans Intel"/>
+                </a:rPr>
+                <a:t>;</a:t>
+              </a:r>
+            </a:p>
+            <a:p>
+              <a:r>
+                <a:rPr lang="en-US" sz="1600" dirty="0" smtClean="0">
+                  <a:solidFill>
+                    <a:schemeClr val="tx2"/>
+                  </a:solidFill>
+                  <a:latin typeface="Lucida Console" panose="020B0609040504020204" pitchFamily="49" charset="0"/>
+                  <a:cs typeface="Neo Sans Intel"/>
+                </a:rPr>
+                <a:t>}</a:t>
+              </a:r>
+              <a:endParaRPr lang="en-US" sz="1600" dirty="0" smtClean="0">
+                <a:solidFill>
+                  <a:schemeClr val="tx2"/>
+                </a:solidFill>
+                <a:latin typeface="Lucida Console" panose="020B0609040504020204" pitchFamily="49" charset="0"/>
+                <a:cs typeface="Neo Sans Intel"/>
+              </a:endParaRPr>
+            </a:p>
+          </p:txBody>
+        </p:sp>
+        <p:sp>
+          <p:nvSpPr>
+            <p:cNvPr id="6" name="TextBox 5"/>
+            <p:cNvSpPr txBox="1"/>
+            <p:nvPr/>
+          </p:nvSpPr>
+          <p:spPr>
+            <a:xfrm>
+              <a:off x="4813726" y="1108372"/>
+              <a:ext cx="2560316" cy="461665"/>
+            </a:xfrm>
+            <a:prstGeom prst="rect">
+              <a:avLst/>
+            </a:prstGeom>
+            <a:noFill/>
+          </p:spPr>
+          <p:txBody>
+            <a:bodyPr wrap="none" rtlCol="0">
+              <a:spAutoFit/>
+            </a:bodyPr>
+            <a:lstStyle/>
+            <a:p>
+              <a:r>
+                <a:rPr lang="en-US" sz="2400" u="sng" dirty="0" smtClean="0">
+                  <a:solidFill>
+                    <a:schemeClr val="tx2"/>
+                  </a:solidFill>
+                  <a:cs typeface="Neo Sans Intel"/>
+                </a:rPr>
+                <a:t>Scalar JavaScript</a:t>
+              </a:r>
+              <a:endParaRPr lang="en-US" sz="2400" u="sng" dirty="0" smtClean="0">
+                <a:solidFill>
+                  <a:schemeClr val="tx2"/>
+                </a:solidFill>
+                <a:cs typeface="Neo Sans Intel"/>
+              </a:endParaRPr>
+            </a:p>
+          </p:txBody>
+        </p:sp>
+      </p:grpSp>
+      <p:grpSp>
+        <p:nvGrpSpPr>
+          <p:cNvPr id="8" name="Group 7"/>
+          <p:cNvGrpSpPr/>
+          <p:nvPr/>
+        </p:nvGrpSpPr>
+        <p:grpSpPr>
+          <a:xfrm>
+            <a:off x="1747516" y="3878361"/>
+            <a:ext cx="9071714" cy="2769989"/>
+            <a:chOff x="1747516" y="3564586"/>
+            <a:chExt cx="9071714" cy="2769989"/>
+          </a:xfrm>
+        </p:grpSpPr>
+        <p:sp>
+          <p:nvSpPr>
+            <p:cNvPr id="5" name="TextBox 4"/>
+            <p:cNvSpPr txBox="1"/>
+            <p:nvPr/>
+          </p:nvSpPr>
+          <p:spPr>
+            <a:xfrm>
+              <a:off x="1747516" y="4026251"/>
+              <a:ext cx="9071714" cy="2308324"/>
+            </a:xfrm>
+            <a:prstGeom prst="rect">
+              <a:avLst/>
+            </a:prstGeom>
+            <a:noFill/>
+          </p:spPr>
+          <p:txBody>
+            <a:bodyPr wrap="none" rtlCol="0">
+              <a:spAutoFit/>
+            </a:bodyPr>
+            <a:lstStyle/>
+            <a:p>
+              <a:r>
+                <a:rPr lang="en-US" sz="1600" dirty="0" smtClean="0">
+                  <a:solidFill>
+                    <a:schemeClr val="tx2"/>
+                  </a:solidFill>
+                  <a:latin typeface="Lucida Console" panose="020B0609040504020204" pitchFamily="49" charset="0"/>
+                  <a:cs typeface="Neo Sans Intel"/>
+                </a:rPr>
+                <a:t>function </a:t>
+              </a:r>
+              <a:r>
+                <a:rPr lang="en-US" sz="1600" dirty="0" err="1">
+                  <a:solidFill>
+                    <a:schemeClr val="tx2"/>
+                  </a:solidFill>
+                  <a:latin typeface="Lucida Console" panose="020B0609040504020204" pitchFamily="49" charset="0"/>
+                  <a:cs typeface="Neo Sans Intel"/>
+                </a:rPr>
+                <a:t>simdAverage</a:t>
+              </a:r>
+              <a:r>
+                <a:rPr lang="en-US" sz="1600" dirty="0">
+                  <a:solidFill>
+                    <a:schemeClr val="tx2"/>
+                  </a:solidFill>
+                  <a:latin typeface="Lucida Console" panose="020B0609040504020204" pitchFamily="49" charset="0"/>
+                  <a:cs typeface="Neo Sans Intel"/>
+                </a:rPr>
+                <a:t>(n) {</a:t>
+              </a:r>
+            </a:p>
+            <a:p>
+              <a:r>
+                <a:rPr lang="en-US" sz="1600" dirty="0" smtClean="0">
+                  <a:solidFill>
+                    <a:schemeClr val="tx2"/>
+                  </a:solidFill>
+                  <a:latin typeface="Lucida Console" panose="020B0609040504020204" pitchFamily="49" charset="0"/>
+                  <a:cs typeface="Neo Sans Intel"/>
+                </a:rPr>
+                <a:t>  </a:t>
+              </a:r>
+              <a:r>
+                <a:rPr lang="en-US" sz="1600" dirty="0">
+                  <a:solidFill>
+                    <a:schemeClr val="tx2"/>
+                  </a:solidFill>
+                  <a:latin typeface="Lucida Console" panose="020B0609040504020204" pitchFamily="49" charset="0"/>
+                  <a:cs typeface="Neo Sans Intel"/>
+                </a:rPr>
+                <a:t>for (</a:t>
+              </a:r>
+              <a:r>
+                <a:rPr lang="en-US" sz="1600" dirty="0" err="1">
+                  <a:solidFill>
+                    <a:schemeClr val="tx2"/>
+                  </a:solidFill>
+                  <a:latin typeface="Lucida Console" panose="020B0609040504020204" pitchFamily="49" charset="0"/>
+                  <a:cs typeface="Neo Sans Intel"/>
+                </a:rPr>
+                <a:t>var</a:t>
+              </a:r>
+              <a:r>
+                <a:rPr lang="en-US" sz="1600" dirty="0">
+                  <a:solidFill>
+                    <a:schemeClr val="tx2"/>
+                  </a:solidFill>
+                  <a:latin typeface="Lucida Console" panose="020B0609040504020204" pitchFamily="49" charset="0"/>
+                  <a:cs typeface="Neo Sans Intel"/>
+                </a:rPr>
+                <a:t> i = 0; i &lt; n; ++i) {</a:t>
+              </a:r>
+            </a:p>
+            <a:p>
+              <a:r>
+                <a:rPr lang="en-US" sz="1600" dirty="0" smtClean="0">
+                  <a:solidFill>
+                    <a:schemeClr val="tx2"/>
+                  </a:solidFill>
+                  <a:latin typeface="Lucida Console" panose="020B0609040504020204" pitchFamily="49" charset="0"/>
+                  <a:cs typeface="Neo Sans Intel"/>
+                </a:rPr>
+                <a:t>    </a:t>
+              </a:r>
+              <a:r>
+                <a:rPr lang="en-US" sz="1600" dirty="0" err="1">
+                  <a:solidFill>
+                    <a:schemeClr val="tx2"/>
+                  </a:solidFill>
+                  <a:latin typeface="Lucida Console" panose="020B0609040504020204" pitchFamily="49" charset="0"/>
+                  <a:cs typeface="Neo Sans Intel"/>
+                </a:rPr>
+                <a:t>var</a:t>
+              </a:r>
+              <a:r>
+                <a:rPr lang="en-US" sz="1600" dirty="0">
+                  <a:solidFill>
+                    <a:schemeClr val="tx2"/>
+                  </a:solidFill>
+                  <a:latin typeface="Lucida Console" panose="020B0609040504020204" pitchFamily="49" charset="0"/>
+                  <a:cs typeface="Neo Sans Intel"/>
+                </a:rPr>
+                <a:t> sum4 = SIMD.float32x4.splat(0.0);</a:t>
+              </a:r>
+            </a:p>
+            <a:p>
+              <a:r>
+                <a:rPr lang="en-US" sz="1600" dirty="0" smtClean="0">
+                  <a:solidFill>
+                    <a:schemeClr val="tx2"/>
+                  </a:solidFill>
+                  <a:latin typeface="Lucida Console" panose="020B0609040504020204" pitchFamily="49" charset="0"/>
+                  <a:cs typeface="Neo Sans Intel"/>
+                </a:rPr>
+                <a:t>    </a:t>
+              </a:r>
+              <a:r>
+                <a:rPr lang="en-US" sz="1600" dirty="0">
+                  <a:solidFill>
+                    <a:schemeClr val="tx2"/>
+                  </a:solidFill>
+                  <a:latin typeface="Lucida Console" panose="020B0609040504020204" pitchFamily="49" charset="0"/>
+                  <a:cs typeface="Neo Sans Intel"/>
+                </a:rPr>
+                <a:t>for (</a:t>
+              </a:r>
+              <a:r>
+                <a:rPr lang="en-US" sz="1600" dirty="0" err="1">
+                  <a:solidFill>
+                    <a:schemeClr val="tx2"/>
+                  </a:solidFill>
+                  <a:latin typeface="Lucida Console" panose="020B0609040504020204" pitchFamily="49" charset="0"/>
+                  <a:cs typeface="Neo Sans Intel"/>
+                </a:rPr>
+                <a:t>var</a:t>
+              </a:r>
+              <a:r>
+                <a:rPr lang="en-US" sz="1600" dirty="0">
+                  <a:solidFill>
+                    <a:schemeClr val="tx2"/>
+                  </a:solidFill>
+                  <a:latin typeface="Lucida Console" panose="020B0609040504020204" pitchFamily="49" charset="0"/>
+                  <a:cs typeface="Neo Sans Intel"/>
+                </a:rPr>
+                <a:t> j = 0; j &lt; </a:t>
+              </a:r>
+              <a:r>
+                <a:rPr lang="en-US" sz="1600" dirty="0" err="1">
+                  <a:solidFill>
+                    <a:schemeClr val="tx2"/>
+                  </a:solidFill>
+                  <a:latin typeface="Lucida Console" panose="020B0609040504020204" pitchFamily="49" charset="0"/>
+                  <a:cs typeface="Neo Sans Intel"/>
+                </a:rPr>
+                <a:t>a.length</a:t>
+              </a:r>
+              <a:r>
+                <a:rPr lang="en-US" sz="1600" dirty="0">
+                  <a:solidFill>
+                    <a:schemeClr val="tx2"/>
+                  </a:solidFill>
+                  <a:latin typeface="Lucida Console" panose="020B0609040504020204" pitchFamily="49" charset="0"/>
+                  <a:cs typeface="Neo Sans Intel"/>
+                </a:rPr>
+                <a:t> / 4; ++j) {</a:t>
+              </a:r>
+            </a:p>
+            <a:p>
+              <a:r>
+                <a:rPr lang="en-US" sz="1600" dirty="0" smtClean="0">
+                  <a:solidFill>
+                    <a:schemeClr val="tx2"/>
+                  </a:solidFill>
+                  <a:latin typeface="Lucida Console" panose="020B0609040504020204" pitchFamily="49" charset="0"/>
+                  <a:cs typeface="Neo Sans Intel"/>
+                </a:rPr>
+                <a:t>      </a:t>
+              </a:r>
+              <a:r>
+                <a:rPr lang="en-US" sz="1600" dirty="0">
+                  <a:solidFill>
+                    <a:schemeClr val="tx2"/>
+                  </a:solidFill>
+                  <a:latin typeface="Lucida Console" panose="020B0609040504020204" pitchFamily="49" charset="0"/>
+                  <a:cs typeface="Neo Sans Intel"/>
+                </a:rPr>
+                <a:t>sum4 = SIMD.float32x4.add(sum4, SIMD.float32x4.load(a, j &lt;&lt; 2));</a:t>
+              </a:r>
+            </a:p>
+            <a:p>
+              <a:r>
+                <a:rPr lang="en-US" sz="1600" dirty="0" smtClean="0">
+                  <a:solidFill>
+                    <a:schemeClr val="tx2"/>
+                  </a:solidFill>
+                  <a:latin typeface="Lucida Console" panose="020B0609040504020204" pitchFamily="49" charset="0"/>
+                  <a:cs typeface="Neo Sans Intel"/>
+                </a:rPr>
+                <a:t>    </a:t>
+              </a:r>
+              <a:r>
+                <a:rPr lang="en-US" sz="1600" dirty="0">
+                  <a:solidFill>
+                    <a:schemeClr val="tx2"/>
+                  </a:solidFill>
+                  <a:latin typeface="Lucida Console" panose="020B0609040504020204" pitchFamily="49" charset="0"/>
+                  <a:cs typeface="Neo Sans Intel"/>
+                </a:rPr>
+                <a:t>}</a:t>
+              </a:r>
+            </a:p>
+            <a:p>
+              <a:r>
+                <a:rPr lang="en-US" sz="1600" dirty="0" smtClean="0">
+                  <a:solidFill>
+                    <a:schemeClr val="tx2"/>
+                  </a:solidFill>
+                  <a:latin typeface="Lucida Console" panose="020B0609040504020204" pitchFamily="49" charset="0"/>
+                  <a:cs typeface="Neo Sans Intel"/>
+                </a:rPr>
+                <a:t>  </a:t>
+              </a:r>
+              <a:r>
+                <a:rPr lang="en-US" sz="1600" dirty="0">
+                  <a:solidFill>
+                    <a:schemeClr val="tx2"/>
+                  </a:solidFill>
+                  <a:latin typeface="Lucida Console" panose="020B0609040504020204" pitchFamily="49" charset="0"/>
+                  <a:cs typeface="Neo Sans Intel"/>
+                </a:rPr>
+                <a:t>}</a:t>
+              </a:r>
+            </a:p>
+            <a:p>
+              <a:r>
+                <a:rPr lang="en-US" sz="1600" dirty="0" smtClean="0">
+                  <a:solidFill>
+                    <a:schemeClr val="tx2"/>
+                  </a:solidFill>
+                  <a:latin typeface="Lucida Console" panose="020B0609040504020204" pitchFamily="49" charset="0"/>
+                  <a:cs typeface="Neo Sans Intel"/>
+                </a:rPr>
+                <a:t>  </a:t>
+              </a:r>
+              <a:r>
+                <a:rPr lang="en-US" sz="1600" dirty="0">
+                  <a:solidFill>
+                    <a:schemeClr val="tx2"/>
+                  </a:solidFill>
+                  <a:latin typeface="Lucida Console" panose="020B0609040504020204" pitchFamily="49" charset="0"/>
+                  <a:cs typeface="Neo Sans Intel"/>
+                </a:rPr>
+                <a:t>return (sum4.x + sum4.y + sum4.z + sum4.w)/</a:t>
+              </a:r>
+              <a:r>
+                <a:rPr lang="en-US" sz="1600" dirty="0" err="1">
+                  <a:solidFill>
+                    <a:schemeClr val="tx2"/>
+                  </a:solidFill>
+                  <a:latin typeface="Lucida Console" panose="020B0609040504020204" pitchFamily="49" charset="0"/>
+                  <a:cs typeface="Neo Sans Intel"/>
+                </a:rPr>
+                <a:t>a.length</a:t>
+              </a:r>
+              <a:r>
+                <a:rPr lang="en-US" sz="1600" dirty="0">
+                  <a:solidFill>
+                    <a:schemeClr val="tx2"/>
+                  </a:solidFill>
+                  <a:latin typeface="Lucida Console" panose="020B0609040504020204" pitchFamily="49" charset="0"/>
+                  <a:cs typeface="Neo Sans Intel"/>
+                </a:rPr>
+                <a:t>;</a:t>
+              </a:r>
+            </a:p>
+            <a:p>
+              <a:r>
+                <a:rPr lang="en-US" sz="1600" dirty="0" smtClean="0">
+                  <a:solidFill>
+                    <a:schemeClr val="tx2"/>
+                  </a:solidFill>
+                  <a:latin typeface="Lucida Console" panose="020B0609040504020204" pitchFamily="49" charset="0"/>
+                  <a:cs typeface="Neo Sans Intel"/>
+                </a:rPr>
+                <a:t>}</a:t>
+              </a:r>
+              <a:endParaRPr lang="en-US" sz="1600" dirty="0" smtClean="0">
+                <a:solidFill>
+                  <a:schemeClr val="tx2"/>
+                </a:solidFill>
+                <a:latin typeface="Lucida Console" panose="020B0609040504020204" pitchFamily="49" charset="0"/>
+                <a:cs typeface="Neo Sans Intel"/>
+              </a:endParaRPr>
+            </a:p>
+          </p:txBody>
+        </p:sp>
+        <p:sp>
+          <p:nvSpPr>
+            <p:cNvPr id="7" name="TextBox 6"/>
+            <p:cNvSpPr txBox="1"/>
+            <p:nvPr/>
+          </p:nvSpPr>
+          <p:spPr>
+            <a:xfrm>
+              <a:off x="4871434" y="3564586"/>
+              <a:ext cx="2444900" cy="461665"/>
+            </a:xfrm>
+            <a:prstGeom prst="rect">
+              <a:avLst/>
+            </a:prstGeom>
+            <a:noFill/>
+          </p:spPr>
+          <p:txBody>
+            <a:bodyPr wrap="none" rtlCol="0">
+              <a:spAutoFit/>
+            </a:bodyPr>
+            <a:lstStyle/>
+            <a:p>
+              <a:r>
+                <a:rPr lang="en-US" sz="2400" u="sng" dirty="0" smtClean="0">
+                  <a:solidFill>
+                    <a:schemeClr val="tx2"/>
+                  </a:solidFill>
+                  <a:cs typeface="Neo Sans Intel"/>
+                </a:rPr>
+                <a:t>SIMD JavaScript</a:t>
+              </a:r>
+              <a:endParaRPr lang="en-US" sz="2400" u="sng" dirty="0" smtClean="0">
+                <a:solidFill>
+                  <a:schemeClr val="tx2"/>
+                </a:solidFill>
+                <a:cs typeface="Neo Sans Intel"/>
+              </a:endParaRPr>
+            </a:p>
+          </p:txBody>
+        </p:sp>
+      </p:grpSp>
+    </p:spTree>
+    <p:extLst>
+      <p:ext uri="{BB962C8B-B14F-4D97-AF65-F5344CB8AC3E}">
+        <p14:creationId xmlns:p14="http://schemas.microsoft.com/office/powerpoint/2010/main" val="3026700603"/>
+      </p:ext>
+    </p:extLst>
+  </p:cSld>
+  <p:clrMapOvr>
+    <a:masterClrMapping/>
+  </p:clrMapOvr>
+</p:sld>
+</file>
+
+<file path=ppt/slides/slide21.xml><?xml version="1.0" encoding="utf-8"?>
+<p:sld xmlns:a="http://schemas.openxmlformats.org/drawingml/2006/main" xmlns:r="http://schemas.openxmlformats.org/officeDocument/2006/relationships" xmlns:p="http://schemas.openxmlformats.org/presentationml/2006/main">
+  <p:cSld>
+    <p:spTree>
+      <p:nvGrpSpPr>
+        <p:cNvPr id="1" name=""/>
+        <p:cNvGrpSpPr/>
+        <p:nvPr/>
+      </p:nvGrpSpPr>
+      <p:grpSpPr>
+        <a:xfrm>
+          <a:off x="0" y="0"/>
+          <a:ext cx="0" cy="0"/>
+          <a:chOff x="0" y="0"/>
+          <a:chExt cx="0" cy="0"/>
+        </a:xfrm>
+      </p:grpSpPr>
+      <p:sp>
+        <p:nvSpPr>
+          <p:cNvPr id="2" name="Title 1"/>
+          <p:cNvSpPr>
+            <a:spLocks noGrp="1"/>
+          </p:cNvSpPr>
+          <p:nvPr>
+            <p:ph type="title"/>
+          </p:nvPr>
+        </p:nvSpPr>
+        <p:spPr/>
+        <p:txBody>
+          <a:bodyPr/>
+          <a:lstStyle/>
+          <a:p>
+            <a:r>
+              <a:rPr lang="en-US" dirty="0"/>
+              <a:t>Benchmarks – Handwritten </a:t>
+            </a:r>
+            <a:r>
+              <a:rPr lang="en-US" dirty="0" smtClean="0"/>
+              <a:t>C++</a:t>
+            </a:r>
+            <a:endParaRPr lang="en-US" dirty="0"/>
+          </a:p>
+        </p:txBody>
+      </p:sp>
+      <p:sp>
+        <p:nvSpPr>
+          <p:cNvPr id="5" name="TextBox 4"/>
+          <p:cNvSpPr txBox="1"/>
+          <p:nvPr/>
+        </p:nvSpPr>
+        <p:spPr>
+          <a:xfrm>
+            <a:off x="1805224" y="1570037"/>
+            <a:ext cx="6109365" cy="1815882"/>
+          </a:xfrm>
+          <a:prstGeom prst="rect">
+            <a:avLst/>
+          </a:prstGeom>
+          <a:noFill/>
+        </p:spPr>
+        <p:txBody>
+          <a:bodyPr wrap="none" rtlCol="0">
+            <a:spAutoFit/>
+          </a:bodyPr>
+          <a:lstStyle/>
+          <a:p>
+            <a:r>
+              <a:rPr lang="en-US" sz="1600" dirty="0" smtClean="0">
+                <a:solidFill>
+                  <a:schemeClr val="tx2"/>
+                </a:solidFill>
+                <a:latin typeface="Lucida Console" panose="020B0609040504020204" pitchFamily="49" charset="0"/>
+                <a:cs typeface="Neo Sans Intel"/>
+              </a:rPr>
+              <a:t>static </a:t>
+            </a:r>
+            <a:r>
+              <a:rPr lang="en-US" sz="1600" dirty="0">
+                <a:solidFill>
+                  <a:schemeClr val="tx2"/>
+                </a:solidFill>
+                <a:latin typeface="Lucida Console" panose="020B0609040504020204" pitchFamily="49" charset="0"/>
+                <a:cs typeface="Neo Sans Intel"/>
+              </a:rPr>
+              <a:t>float nonSimdAverageKernel32() {</a:t>
+            </a:r>
+          </a:p>
+          <a:p>
+            <a:r>
+              <a:rPr lang="en-US" sz="1600" dirty="0" smtClean="0">
+                <a:solidFill>
+                  <a:schemeClr val="tx2"/>
+                </a:solidFill>
+                <a:latin typeface="Lucida Console" panose="020B0609040504020204" pitchFamily="49" charset="0"/>
+                <a:cs typeface="Neo Sans Intel"/>
+              </a:rPr>
+              <a:t>  float </a:t>
+            </a:r>
+            <a:r>
+              <a:rPr lang="en-US" sz="1600" dirty="0">
+                <a:solidFill>
+                  <a:schemeClr val="tx2"/>
+                </a:solidFill>
+                <a:latin typeface="Lucida Console" panose="020B0609040504020204" pitchFamily="49" charset="0"/>
+                <a:cs typeface="Neo Sans Intel"/>
+              </a:rPr>
+              <a:t>sum = 0.0;</a:t>
+            </a:r>
+          </a:p>
+          <a:p>
+            <a:r>
+              <a:rPr lang="en-US" sz="1600" dirty="0">
+                <a:solidFill>
+                  <a:schemeClr val="tx2"/>
+                </a:solidFill>
+                <a:latin typeface="Lucida Console" panose="020B0609040504020204" pitchFamily="49" charset="0"/>
+                <a:cs typeface="Neo Sans Intel"/>
+              </a:rPr>
+              <a:t>  </a:t>
+            </a:r>
+            <a:r>
+              <a:rPr lang="en-US" sz="1600" dirty="0" smtClean="0">
+                <a:solidFill>
+                  <a:schemeClr val="tx2"/>
+                </a:solidFill>
+                <a:latin typeface="Lucida Console" panose="020B0609040504020204" pitchFamily="49" charset="0"/>
+                <a:cs typeface="Neo Sans Intel"/>
+              </a:rPr>
+              <a:t>for </a:t>
+            </a:r>
+            <a:r>
+              <a:rPr lang="en-US" sz="1600" dirty="0">
+                <a:solidFill>
+                  <a:schemeClr val="tx2"/>
+                </a:solidFill>
+                <a:latin typeface="Lucida Console" panose="020B0609040504020204" pitchFamily="49" charset="0"/>
+                <a:cs typeface="Neo Sans Intel"/>
+              </a:rPr>
+              <a:t>(uint32_t j = 0, l = length; j &lt; l; ++j) {</a:t>
+            </a:r>
+          </a:p>
+          <a:p>
+            <a:r>
+              <a:rPr lang="en-US" sz="1600" dirty="0">
+                <a:solidFill>
+                  <a:schemeClr val="tx2"/>
+                </a:solidFill>
+                <a:latin typeface="Lucida Console" panose="020B0609040504020204" pitchFamily="49" charset="0"/>
+                <a:cs typeface="Neo Sans Intel"/>
+              </a:rPr>
+              <a:t>  </a:t>
+            </a:r>
+            <a:r>
+              <a:rPr lang="en-US" sz="1600" dirty="0" smtClean="0">
+                <a:solidFill>
+                  <a:schemeClr val="tx2"/>
+                </a:solidFill>
+                <a:latin typeface="Lucida Console" panose="020B0609040504020204" pitchFamily="49" charset="0"/>
+                <a:cs typeface="Neo Sans Intel"/>
+              </a:rPr>
+              <a:t>  </a:t>
+            </a:r>
+            <a:r>
+              <a:rPr lang="en-US" sz="1600" dirty="0">
+                <a:solidFill>
+                  <a:schemeClr val="tx2"/>
+                </a:solidFill>
+                <a:latin typeface="Lucida Console" panose="020B0609040504020204" pitchFamily="49" charset="0"/>
+                <a:cs typeface="Neo Sans Intel"/>
+              </a:rPr>
+              <a:t>sum += a[j];</a:t>
+            </a:r>
+          </a:p>
+          <a:p>
+            <a:r>
+              <a:rPr lang="en-US" sz="1600" dirty="0">
+                <a:solidFill>
+                  <a:schemeClr val="tx2"/>
+                </a:solidFill>
+                <a:latin typeface="Lucida Console" panose="020B0609040504020204" pitchFamily="49" charset="0"/>
+                <a:cs typeface="Neo Sans Intel"/>
+              </a:rPr>
+              <a:t>  </a:t>
+            </a:r>
+            <a:r>
+              <a:rPr lang="en-US" sz="1600" dirty="0" smtClean="0">
+                <a:solidFill>
+                  <a:schemeClr val="tx2"/>
+                </a:solidFill>
+                <a:latin typeface="Lucida Console" panose="020B0609040504020204" pitchFamily="49" charset="0"/>
+                <a:cs typeface="Neo Sans Intel"/>
+              </a:rPr>
+              <a:t>}</a:t>
+            </a:r>
+            <a:endParaRPr lang="en-US" sz="1600" dirty="0">
+              <a:solidFill>
+                <a:schemeClr val="tx2"/>
+              </a:solidFill>
+              <a:latin typeface="Lucida Console" panose="020B0609040504020204" pitchFamily="49" charset="0"/>
+              <a:cs typeface="Neo Sans Intel"/>
+            </a:endParaRPr>
+          </a:p>
+          <a:p>
+            <a:r>
+              <a:rPr lang="en-US" sz="1600" dirty="0">
+                <a:solidFill>
+                  <a:schemeClr val="tx2"/>
+                </a:solidFill>
+                <a:latin typeface="Lucida Console" panose="020B0609040504020204" pitchFamily="49" charset="0"/>
+                <a:cs typeface="Neo Sans Intel"/>
+              </a:rPr>
+              <a:t>  </a:t>
+            </a:r>
+            <a:r>
+              <a:rPr lang="en-US" sz="1600" dirty="0" smtClean="0">
+                <a:solidFill>
+                  <a:schemeClr val="tx2"/>
+                </a:solidFill>
+                <a:latin typeface="Lucida Console" panose="020B0609040504020204" pitchFamily="49" charset="0"/>
+                <a:cs typeface="Neo Sans Intel"/>
+              </a:rPr>
+              <a:t>return </a:t>
+            </a:r>
+            <a:r>
+              <a:rPr lang="en-US" sz="1600" dirty="0">
+                <a:solidFill>
+                  <a:schemeClr val="tx2"/>
+                </a:solidFill>
+                <a:latin typeface="Lucida Console" panose="020B0609040504020204" pitchFamily="49" charset="0"/>
+                <a:cs typeface="Neo Sans Intel"/>
+              </a:rPr>
+              <a:t>sum/length;</a:t>
+            </a:r>
+          </a:p>
+          <a:p>
+            <a:r>
+              <a:rPr lang="en-US" sz="1600" dirty="0" smtClean="0">
+                <a:solidFill>
+                  <a:schemeClr val="tx2"/>
+                </a:solidFill>
+                <a:latin typeface="Lucida Console" panose="020B0609040504020204" pitchFamily="49" charset="0"/>
+                <a:cs typeface="Neo Sans Intel"/>
+              </a:rPr>
+              <a:t>}</a:t>
+            </a:r>
+            <a:endParaRPr lang="en-US" sz="1600" dirty="0" smtClean="0">
+              <a:solidFill>
+                <a:schemeClr val="tx2"/>
+              </a:solidFill>
+              <a:latin typeface="Lucida Console" panose="020B0609040504020204" pitchFamily="49" charset="0"/>
+              <a:cs typeface="Neo Sans Intel"/>
+            </a:endParaRPr>
+          </a:p>
+        </p:txBody>
+      </p:sp>
+      <p:sp>
+        <p:nvSpPr>
+          <p:cNvPr id="6" name="TextBox 5"/>
+          <p:cNvSpPr txBox="1"/>
+          <p:nvPr/>
+        </p:nvSpPr>
+        <p:spPr>
+          <a:xfrm>
+            <a:off x="5069739" y="1108372"/>
+            <a:ext cx="1670650" cy="461665"/>
+          </a:xfrm>
+          <a:prstGeom prst="rect">
+            <a:avLst/>
+          </a:prstGeom>
+          <a:noFill/>
+        </p:spPr>
+        <p:txBody>
+          <a:bodyPr wrap="none" rtlCol="0">
+            <a:spAutoFit/>
+          </a:bodyPr>
+          <a:lstStyle/>
+          <a:p>
+            <a:r>
+              <a:rPr lang="en-US" sz="2400" u="sng" dirty="0" smtClean="0">
+                <a:solidFill>
+                  <a:schemeClr val="tx2"/>
+                </a:solidFill>
+                <a:cs typeface="Neo Sans Intel"/>
+              </a:rPr>
+              <a:t>Scalar C++</a:t>
+            </a:r>
+            <a:endParaRPr lang="en-US" sz="2400" u="sng" dirty="0" smtClean="0">
+              <a:solidFill>
+                <a:schemeClr val="tx2"/>
+              </a:solidFill>
+              <a:cs typeface="Neo Sans Intel"/>
+            </a:endParaRPr>
+          </a:p>
+        </p:txBody>
+      </p:sp>
+      <p:sp>
+        <p:nvSpPr>
+          <p:cNvPr id="8" name="TextBox 7"/>
+          <p:cNvSpPr txBox="1"/>
+          <p:nvPr/>
+        </p:nvSpPr>
+        <p:spPr>
+          <a:xfrm>
+            <a:off x="1805224" y="4309249"/>
+            <a:ext cx="8084264" cy="2062103"/>
+          </a:xfrm>
+          <a:prstGeom prst="rect">
+            <a:avLst/>
+          </a:prstGeom>
+          <a:noFill/>
+        </p:spPr>
+        <p:txBody>
+          <a:bodyPr wrap="none" rtlCol="0">
+            <a:spAutoFit/>
+          </a:bodyPr>
+          <a:lstStyle/>
+          <a:p>
+            <a:r>
+              <a:rPr lang="en-US" sz="1600" dirty="0" smtClean="0">
+                <a:solidFill>
+                  <a:schemeClr val="tx2"/>
+                </a:solidFill>
+                <a:latin typeface="Lucida Console" panose="020B0609040504020204" pitchFamily="49" charset="0"/>
+                <a:cs typeface="Neo Sans Intel"/>
+              </a:rPr>
+              <a:t>static </a:t>
+            </a:r>
+            <a:r>
+              <a:rPr lang="en-US" sz="1600" dirty="0">
+                <a:solidFill>
+                  <a:schemeClr val="tx2"/>
+                </a:solidFill>
+                <a:latin typeface="Lucida Console" panose="020B0609040504020204" pitchFamily="49" charset="0"/>
+                <a:cs typeface="Neo Sans Intel"/>
+              </a:rPr>
+              <a:t>float </a:t>
+            </a:r>
+            <a:r>
+              <a:rPr lang="en-US" sz="1600" dirty="0" err="1">
+                <a:solidFill>
+                  <a:schemeClr val="tx2"/>
+                </a:solidFill>
+                <a:latin typeface="Lucida Console" panose="020B0609040504020204" pitchFamily="49" charset="0"/>
+                <a:cs typeface="Neo Sans Intel"/>
+              </a:rPr>
+              <a:t>simdAverageKernel</a:t>
+            </a:r>
+            <a:r>
+              <a:rPr lang="en-US" sz="1600" dirty="0">
+                <a:solidFill>
+                  <a:schemeClr val="tx2"/>
+                </a:solidFill>
+                <a:latin typeface="Lucida Console" panose="020B0609040504020204" pitchFamily="49" charset="0"/>
+                <a:cs typeface="Neo Sans Intel"/>
+              </a:rPr>
+              <a:t>() {</a:t>
+            </a:r>
+          </a:p>
+          <a:p>
+            <a:r>
+              <a:rPr lang="en-US" sz="1600" dirty="0" smtClean="0">
+                <a:solidFill>
+                  <a:schemeClr val="tx2"/>
+                </a:solidFill>
+                <a:latin typeface="Lucida Console" panose="020B0609040504020204" pitchFamily="49" charset="0"/>
+                <a:cs typeface="Neo Sans Intel"/>
+              </a:rPr>
+              <a:t>  __</a:t>
+            </a:r>
+            <a:r>
+              <a:rPr lang="en-US" sz="1600" dirty="0">
+                <a:solidFill>
+                  <a:schemeClr val="tx2"/>
+                </a:solidFill>
+                <a:latin typeface="Lucida Console" panose="020B0609040504020204" pitchFamily="49" charset="0"/>
+                <a:cs typeface="Neo Sans Intel"/>
+              </a:rPr>
+              <a:t>m128 sumx4 = _mm_set_ps1(0.0);</a:t>
+            </a:r>
+          </a:p>
+          <a:p>
+            <a:r>
+              <a:rPr lang="en-US" sz="1600" dirty="0">
+                <a:solidFill>
+                  <a:schemeClr val="tx2"/>
+                </a:solidFill>
+                <a:latin typeface="Lucida Console" panose="020B0609040504020204" pitchFamily="49" charset="0"/>
+                <a:cs typeface="Neo Sans Intel"/>
+              </a:rPr>
+              <a:t>  </a:t>
+            </a:r>
+            <a:r>
+              <a:rPr lang="en-US" sz="1600" dirty="0" smtClean="0">
+                <a:solidFill>
+                  <a:schemeClr val="tx2"/>
+                </a:solidFill>
+                <a:latin typeface="Lucida Console" panose="020B0609040504020204" pitchFamily="49" charset="0"/>
+                <a:cs typeface="Neo Sans Intel"/>
+              </a:rPr>
+              <a:t>for </a:t>
+            </a:r>
+            <a:r>
+              <a:rPr lang="en-US" sz="1600" dirty="0">
+                <a:solidFill>
+                  <a:schemeClr val="tx2"/>
+                </a:solidFill>
+                <a:latin typeface="Lucida Console" panose="020B0609040504020204" pitchFamily="49" charset="0"/>
+                <a:cs typeface="Neo Sans Intel"/>
+              </a:rPr>
+              <a:t>(uint32_t j = 0, l = length; j &lt; l; j = j + 4) {</a:t>
+            </a:r>
+          </a:p>
+          <a:p>
+            <a:r>
+              <a:rPr lang="en-US" sz="1600" dirty="0">
+                <a:solidFill>
+                  <a:schemeClr val="tx2"/>
+                </a:solidFill>
+                <a:latin typeface="Lucida Console" panose="020B0609040504020204" pitchFamily="49" charset="0"/>
+                <a:cs typeface="Neo Sans Intel"/>
+              </a:rPr>
+              <a:t>  </a:t>
+            </a:r>
+            <a:r>
+              <a:rPr lang="en-US" sz="1600" dirty="0" smtClean="0">
+                <a:solidFill>
+                  <a:schemeClr val="tx2"/>
+                </a:solidFill>
+                <a:latin typeface="Lucida Console" panose="020B0609040504020204" pitchFamily="49" charset="0"/>
+                <a:cs typeface="Neo Sans Intel"/>
+              </a:rPr>
+              <a:t>  </a:t>
+            </a:r>
+            <a:r>
+              <a:rPr lang="en-US" sz="1600" dirty="0">
+                <a:solidFill>
+                  <a:schemeClr val="tx2"/>
+                </a:solidFill>
+                <a:latin typeface="Lucida Console" panose="020B0609040504020204" pitchFamily="49" charset="0"/>
+                <a:cs typeface="Neo Sans Intel"/>
+              </a:rPr>
+              <a:t>sumx4 = _</a:t>
+            </a:r>
+            <a:r>
+              <a:rPr lang="en-US" sz="1600" dirty="0" err="1">
+                <a:solidFill>
+                  <a:schemeClr val="tx2"/>
+                </a:solidFill>
+                <a:latin typeface="Lucida Console" panose="020B0609040504020204" pitchFamily="49" charset="0"/>
+                <a:cs typeface="Neo Sans Intel"/>
+              </a:rPr>
+              <a:t>mm_add_ps</a:t>
+            </a:r>
+            <a:r>
+              <a:rPr lang="en-US" sz="1600" dirty="0">
+                <a:solidFill>
+                  <a:schemeClr val="tx2"/>
+                </a:solidFill>
+                <a:latin typeface="Lucida Console" panose="020B0609040504020204" pitchFamily="49" charset="0"/>
+                <a:cs typeface="Neo Sans Intel"/>
+              </a:rPr>
+              <a:t>(sumx4, _</a:t>
+            </a:r>
+            <a:r>
+              <a:rPr lang="en-US" sz="1600" dirty="0" err="1">
+                <a:solidFill>
+                  <a:schemeClr val="tx2"/>
+                </a:solidFill>
+                <a:latin typeface="Lucida Console" panose="020B0609040504020204" pitchFamily="49" charset="0"/>
+                <a:cs typeface="Neo Sans Intel"/>
+              </a:rPr>
+              <a:t>mm_loadu_ps</a:t>
+            </a:r>
+            <a:r>
+              <a:rPr lang="en-US" sz="1600" dirty="0">
+                <a:solidFill>
+                  <a:schemeClr val="tx2"/>
+                </a:solidFill>
+                <a:latin typeface="Lucida Console" panose="020B0609040504020204" pitchFamily="49" charset="0"/>
+                <a:cs typeface="Neo Sans Intel"/>
+              </a:rPr>
+              <a:t>(&amp;(a[j])));</a:t>
+            </a:r>
+          </a:p>
+          <a:p>
+            <a:r>
+              <a:rPr lang="en-US" sz="1600" dirty="0">
+                <a:solidFill>
+                  <a:schemeClr val="tx2"/>
+                </a:solidFill>
+                <a:latin typeface="Lucida Console" panose="020B0609040504020204" pitchFamily="49" charset="0"/>
+                <a:cs typeface="Neo Sans Intel"/>
+              </a:rPr>
+              <a:t>  </a:t>
+            </a:r>
+            <a:r>
+              <a:rPr lang="en-US" sz="1600" dirty="0" smtClean="0">
+                <a:solidFill>
+                  <a:schemeClr val="tx2"/>
+                </a:solidFill>
+                <a:latin typeface="Lucida Console" panose="020B0609040504020204" pitchFamily="49" charset="0"/>
+                <a:cs typeface="Neo Sans Intel"/>
+              </a:rPr>
+              <a:t>}</a:t>
+            </a:r>
+            <a:endParaRPr lang="en-US" sz="1600" dirty="0">
+              <a:solidFill>
+                <a:schemeClr val="tx2"/>
+              </a:solidFill>
+              <a:latin typeface="Lucida Console" panose="020B0609040504020204" pitchFamily="49" charset="0"/>
+              <a:cs typeface="Neo Sans Intel"/>
+            </a:endParaRPr>
+          </a:p>
+          <a:p>
+            <a:r>
+              <a:rPr lang="en-US" sz="1600" dirty="0">
+                <a:solidFill>
+                  <a:schemeClr val="tx2"/>
+                </a:solidFill>
+                <a:latin typeface="Lucida Console" panose="020B0609040504020204" pitchFamily="49" charset="0"/>
+                <a:cs typeface="Neo Sans Intel"/>
+              </a:rPr>
+              <a:t>  </a:t>
+            </a:r>
+            <a:r>
+              <a:rPr lang="en-US" sz="1600" dirty="0" smtClean="0">
+                <a:solidFill>
+                  <a:schemeClr val="tx2"/>
+                </a:solidFill>
+                <a:latin typeface="Lucida Console" panose="020B0609040504020204" pitchFamily="49" charset="0"/>
+                <a:cs typeface="Neo Sans Intel"/>
+              </a:rPr>
+              <a:t>Base</a:t>
+            </a:r>
+            <a:r>
+              <a:rPr lang="en-US" sz="1600" dirty="0">
+                <a:solidFill>
+                  <a:schemeClr val="tx2"/>
+                </a:solidFill>
+                <a:latin typeface="Lucida Console" panose="020B0609040504020204" pitchFamily="49" charset="0"/>
+                <a:cs typeface="Neo Sans Intel"/>
+              </a:rPr>
+              <a:t>::Lanes&lt;__m128, float&gt; lanes(sumx4);</a:t>
+            </a:r>
+          </a:p>
+          <a:p>
+            <a:r>
+              <a:rPr lang="en-US" sz="1600" dirty="0">
+                <a:solidFill>
+                  <a:schemeClr val="tx2"/>
+                </a:solidFill>
+                <a:latin typeface="Lucida Console" panose="020B0609040504020204" pitchFamily="49" charset="0"/>
+                <a:cs typeface="Neo Sans Intel"/>
+              </a:rPr>
+              <a:t>  </a:t>
+            </a:r>
+            <a:r>
+              <a:rPr lang="en-US" sz="1600" dirty="0" smtClean="0">
+                <a:solidFill>
+                  <a:schemeClr val="tx2"/>
+                </a:solidFill>
+                <a:latin typeface="Lucida Console" panose="020B0609040504020204" pitchFamily="49" charset="0"/>
+                <a:cs typeface="Neo Sans Intel"/>
+              </a:rPr>
+              <a:t>return </a:t>
+            </a:r>
+            <a:r>
+              <a:rPr lang="en-US" sz="1600" dirty="0">
+                <a:solidFill>
+                  <a:schemeClr val="tx2"/>
+                </a:solidFill>
+                <a:latin typeface="Lucida Console" panose="020B0609040504020204" pitchFamily="49" charset="0"/>
+                <a:cs typeface="Neo Sans Intel"/>
+              </a:rPr>
+              <a:t>(</a:t>
+            </a:r>
+            <a:r>
+              <a:rPr lang="en-US" sz="1600" dirty="0" err="1">
+                <a:solidFill>
+                  <a:schemeClr val="tx2"/>
+                </a:solidFill>
+                <a:latin typeface="Lucida Console" panose="020B0609040504020204" pitchFamily="49" charset="0"/>
+                <a:cs typeface="Neo Sans Intel"/>
+              </a:rPr>
+              <a:t>lanes.x</a:t>
+            </a:r>
+            <a:r>
+              <a:rPr lang="en-US" sz="1600" dirty="0">
+                <a:solidFill>
+                  <a:schemeClr val="tx2"/>
+                </a:solidFill>
+                <a:latin typeface="Lucida Console" panose="020B0609040504020204" pitchFamily="49" charset="0"/>
+                <a:cs typeface="Neo Sans Intel"/>
+              </a:rPr>
+              <a:t>() + </a:t>
+            </a:r>
+            <a:r>
+              <a:rPr lang="en-US" sz="1600" dirty="0" err="1">
+                <a:solidFill>
+                  <a:schemeClr val="tx2"/>
+                </a:solidFill>
+                <a:latin typeface="Lucida Console" panose="020B0609040504020204" pitchFamily="49" charset="0"/>
+                <a:cs typeface="Neo Sans Intel"/>
+              </a:rPr>
+              <a:t>lanes.y</a:t>
+            </a:r>
+            <a:r>
+              <a:rPr lang="en-US" sz="1600" dirty="0">
+                <a:solidFill>
+                  <a:schemeClr val="tx2"/>
+                </a:solidFill>
+                <a:latin typeface="Lucida Console" panose="020B0609040504020204" pitchFamily="49" charset="0"/>
+                <a:cs typeface="Neo Sans Intel"/>
+              </a:rPr>
+              <a:t>() + </a:t>
+            </a:r>
+            <a:r>
+              <a:rPr lang="en-US" sz="1600" dirty="0" err="1">
+                <a:solidFill>
+                  <a:schemeClr val="tx2"/>
+                </a:solidFill>
+                <a:latin typeface="Lucida Console" panose="020B0609040504020204" pitchFamily="49" charset="0"/>
+                <a:cs typeface="Neo Sans Intel"/>
+              </a:rPr>
+              <a:t>lanes.z</a:t>
+            </a:r>
+            <a:r>
+              <a:rPr lang="en-US" sz="1600" dirty="0">
+                <a:solidFill>
+                  <a:schemeClr val="tx2"/>
+                </a:solidFill>
+                <a:latin typeface="Lucida Console" panose="020B0609040504020204" pitchFamily="49" charset="0"/>
+                <a:cs typeface="Neo Sans Intel"/>
+              </a:rPr>
+              <a:t>() + </a:t>
+            </a:r>
+            <a:r>
+              <a:rPr lang="en-US" sz="1600" dirty="0" err="1">
+                <a:solidFill>
+                  <a:schemeClr val="tx2"/>
+                </a:solidFill>
+                <a:latin typeface="Lucida Console" panose="020B0609040504020204" pitchFamily="49" charset="0"/>
+                <a:cs typeface="Neo Sans Intel"/>
+              </a:rPr>
+              <a:t>lanes.w</a:t>
+            </a:r>
+            <a:r>
+              <a:rPr lang="en-US" sz="1600" dirty="0">
+                <a:solidFill>
+                  <a:schemeClr val="tx2"/>
+                </a:solidFill>
+                <a:latin typeface="Lucida Console" panose="020B0609040504020204" pitchFamily="49" charset="0"/>
+                <a:cs typeface="Neo Sans Intel"/>
+              </a:rPr>
+              <a:t>())/length</a:t>
+            </a:r>
+            <a:r>
+              <a:rPr lang="en-US" sz="1600" dirty="0" smtClean="0">
+                <a:solidFill>
+                  <a:schemeClr val="tx2"/>
+                </a:solidFill>
+                <a:latin typeface="Lucida Console" panose="020B0609040504020204" pitchFamily="49" charset="0"/>
+                <a:cs typeface="Neo Sans Intel"/>
+              </a:rPr>
+              <a:t>;</a:t>
+            </a:r>
+          </a:p>
+          <a:p>
+            <a:r>
+              <a:rPr lang="en-US" sz="1600" dirty="0">
+                <a:solidFill>
+                  <a:schemeClr val="tx2"/>
+                </a:solidFill>
+                <a:latin typeface="Lucida Console" panose="020B0609040504020204" pitchFamily="49" charset="0"/>
+                <a:cs typeface="Neo Sans Intel"/>
+              </a:rPr>
+              <a:t>}</a:t>
+            </a:r>
+            <a:endParaRPr lang="en-US" sz="1600" dirty="0" smtClean="0">
+              <a:solidFill>
+                <a:schemeClr val="tx2"/>
+              </a:solidFill>
+              <a:latin typeface="Lucida Console" panose="020B0609040504020204" pitchFamily="49" charset="0"/>
+              <a:cs typeface="Neo Sans Intel"/>
+            </a:endParaRPr>
+          </a:p>
+        </p:txBody>
+      </p:sp>
+      <p:sp>
+        <p:nvSpPr>
+          <p:cNvPr id="9" name="TextBox 8"/>
+          <p:cNvSpPr txBox="1"/>
+          <p:nvPr/>
+        </p:nvSpPr>
+        <p:spPr>
+          <a:xfrm>
+            <a:off x="5069739" y="3847584"/>
+            <a:ext cx="1555234" cy="461665"/>
+          </a:xfrm>
+          <a:prstGeom prst="rect">
+            <a:avLst/>
+          </a:prstGeom>
+          <a:noFill/>
+        </p:spPr>
+        <p:txBody>
+          <a:bodyPr wrap="none" rtlCol="0">
+            <a:spAutoFit/>
+          </a:bodyPr>
+          <a:lstStyle/>
+          <a:p>
+            <a:r>
+              <a:rPr lang="en-US" sz="2400" u="sng" dirty="0" smtClean="0">
+                <a:solidFill>
+                  <a:schemeClr val="tx2"/>
+                </a:solidFill>
+                <a:cs typeface="Neo Sans Intel"/>
+              </a:rPr>
+              <a:t>SIMD C++</a:t>
+            </a:r>
+            <a:endParaRPr lang="en-US" sz="2400" u="sng" dirty="0" smtClean="0">
+              <a:solidFill>
+                <a:schemeClr val="tx2"/>
+              </a:solidFill>
+              <a:cs typeface="Neo Sans Intel"/>
+            </a:endParaRPr>
+          </a:p>
+        </p:txBody>
+      </p:sp>
+    </p:spTree>
+    <p:extLst>
+      <p:ext uri="{BB962C8B-B14F-4D97-AF65-F5344CB8AC3E}">
+        <p14:creationId xmlns:p14="http://schemas.microsoft.com/office/powerpoint/2010/main" val="2362999345"/>
+      </p:ext>
+    </p:extLst>
+  </p:cSld>
+  <p:clrMapOvr>
+    <a:masterClrMapping/>
+  </p:clrMapOvr>
+</p:sld>
+</file>
+
+<file path=ppt/slides/slide22.xml><?xml version="1.0" encoding="utf-8"?>
+<p:sld xmlns:a="http://schemas.openxmlformats.org/drawingml/2006/main" xmlns:r="http://schemas.openxmlformats.org/officeDocument/2006/relationships" xmlns:p="http://schemas.openxmlformats.org/presentationml/2006/main">
+  <p:cSld>
+    <p:spTree>
+      <p:nvGrpSpPr>
+        <p:cNvPr id="1" name=""/>
+        <p:cNvGrpSpPr/>
+        <p:nvPr/>
+      </p:nvGrpSpPr>
+      <p:grpSpPr>
+        <a:xfrm>
+          <a:off x="0" y="0"/>
+          <a:ext cx="0" cy="0"/>
+          <a:chOff x="0" y="0"/>
+          <a:chExt cx="0" cy="0"/>
+        </a:xfrm>
+      </p:grpSpPr>
+      <p:sp>
+        <p:nvSpPr>
+          <p:cNvPr id="2" name="Title 1"/>
+          <p:cNvSpPr>
+            <a:spLocks noGrp="1"/>
+          </p:cNvSpPr>
+          <p:nvPr>
+            <p:ph type="title"/>
+          </p:nvPr>
+        </p:nvSpPr>
+        <p:spPr/>
+        <p:txBody>
+          <a:bodyPr/>
+          <a:lstStyle/>
+          <a:p>
+            <a:r>
+              <a:rPr lang="en-US" dirty="0" smtClean="0"/>
+              <a:t>Benchmark Results – SIMD vs. Scalar Speedups</a:t>
+            </a:r>
+            <a:endParaRPr lang="en-US" dirty="0"/>
+          </a:p>
+        </p:txBody>
+      </p:sp>
+      <p:pic>
+        <p:nvPicPr>
+          <p:cNvPr id="4" name="Picture 3"/>
+          <p:cNvPicPr>
+            <a:picLocks noChangeAspect="1"/>
+          </p:cNvPicPr>
+          <p:nvPr/>
+        </p:nvPicPr>
+        <p:blipFill>
+          <a:blip r:embed="rId2">
+            <a:extLst>
+              <a:ext uri="{28A0092B-C50C-407E-A947-70E740481C1C}">
+                <a14:useLocalDpi xmlns:a14="http://schemas.microsoft.com/office/drawing/2010/main" val="0"/>
+              </a:ext>
+            </a:extLst>
+          </a:blip>
+          <a:stretch>
+            <a:fillRect/>
+          </a:stretch>
+        </p:blipFill>
+        <p:spPr>
+          <a:xfrm>
+            <a:off x="607484" y="1140030"/>
+            <a:ext cx="5827994" cy="5498276"/>
+          </a:xfrm>
+          <a:prstGeom prst="rect">
+            <a:avLst/>
+          </a:prstGeom>
+        </p:spPr>
+      </p:pic>
+      <p:sp>
+        <p:nvSpPr>
+          <p:cNvPr id="5" name="TextBox 4"/>
+          <p:cNvSpPr txBox="1"/>
+          <p:nvPr/>
+        </p:nvSpPr>
+        <p:spPr>
+          <a:xfrm>
+            <a:off x="6502531" y="1140030"/>
+            <a:ext cx="4950621" cy="3785652"/>
+          </a:xfrm>
+          <a:prstGeom prst="rect">
+            <a:avLst/>
+          </a:prstGeom>
+          <a:noFill/>
+        </p:spPr>
+        <p:txBody>
+          <a:bodyPr wrap="square" rtlCol="0">
+            <a:spAutoFit/>
+          </a:bodyPr>
+          <a:lstStyle/>
+          <a:p>
+            <a:r>
+              <a:rPr lang="en-US" sz="2400" b="1" u="sng" dirty="0" smtClean="0">
+                <a:solidFill>
+                  <a:schemeClr val="tx2"/>
+                </a:solidFill>
+                <a:cs typeface="Neo Sans Intel"/>
+              </a:rPr>
+              <a:t>Observations:</a:t>
+            </a:r>
+          </a:p>
+          <a:p>
+            <a:pPr marL="342900" indent="-342900">
+              <a:buFont typeface="Arial" panose="020B0604020202020204" pitchFamily="34" charset="0"/>
+              <a:buChar char="•"/>
+            </a:pPr>
+            <a:r>
+              <a:rPr lang="en-US" sz="2400" b="1" dirty="0" smtClean="0">
+                <a:solidFill>
+                  <a:schemeClr val="tx2"/>
+                </a:solidFill>
+                <a:cs typeface="Neo Sans Intel"/>
+              </a:rPr>
+              <a:t>Average speedups are in the expected ~4x range</a:t>
+            </a:r>
+          </a:p>
+          <a:p>
+            <a:pPr marL="342900" indent="-342900">
+              <a:buFont typeface="Arial" panose="020B0604020202020204" pitchFamily="34" charset="0"/>
+              <a:buChar char="•"/>
+            </a:pPr>
+            <a:r>
+              <a:rPr lang="en-US" sz="2400" dirty="0" smtClean="0">
+                <a:solidFill>
+                  <a:schemeClr val="tx2"/>
+                </a:solidFill>
+                <a:cs typeface="Neo Sans Intel"/>
+              </a:rPr>
+              <a:t>Higher speedups for ‘JS Handwritten Chrome’ is due to slow scalar kernel (64-bit FP operations</a:t>
+            </a:r>
+          </a:p>
+          <a:p>
+            <a:pPr marL="342900" indent="-342900">
+              <a:buFont typeface="Arial" panose="020B0604020202020204" pitchFamily="34" charset="0"/>
+              <a:buChar char="•"/>
+            </a:pPr>
+            <a:r>
+              <a:rPr lang="en-US" sz="2400" dirty="0" smtClean="0">
+                <a:solidFill>
+                  <a:schemeClr val="tx2"/>
+                </a:solidFill>
+                <a:cs typeface="Neo Sans Intel"/>
+              </a:rPr>
+              <a:t>Super linear speedups for </a:t>
+            </a:r>
+            <a:r>
+              <a:rPr lang="en-US" sz="2400" dirty="0" err="1" smtClean="0">
+                <a:solidFill>
+                  <a:schemeClr val="tx2"/>
+                </a:solidFill>
+                <a:cs typeface="Neo Sans Intel"/>
+              </a:rPr>
+              <a:t>MatrixInverse</a:t>
+            </a:r>
+            <a:r>
+              <a:rPr lang="en-US" sz="2400" dirty="0" smtClean="0">
+                <a:solidFill>
+                  <a:schemeClr val="tx2"/>
+                </a:solidFill>
+                <a:cs typeface="Neo Sans Intel"/>
+              </a:rPr>
+              <a:t> most likely due to slower scalar kernel as well.</a:t>
+            </a:r>
+            <a:endParaRPr lang="en-US" sz="2400" dirty="0" smtClean="0">
+              <a:solidFill>
+                <a:schemeClr val="tx2"/>
+              </a:solidFill>
+              <a:cs typeface="Neo Sans Intel"/>
+            </a:endParaRPr>
+          </a:p>
+        </p:txBody>
+      </p:sp>
+    </p:spTree>
+    <p:extLst>
+      <p:ext uri="{BB962C8B-B14F-4D97-AF65-F5344CB8AC3E}">
+        <p14:creationId xmlns:p14="http://schemas.microsoft.com/office/powerpoint/2010/main" val="729326348"/>
+      </p:ext>
+    </p:extLst>
+  </p:cSld>
+  <p:clrMapOvr>
+    <a:masterClrMapping/>
+  </p:clrMapOvr>
+</p:sld>
+</file>
+
+<file path=ppt/slides/slide23.xml><?xml version="1.0" encoding="utf-8"?>
+<p:sld xmlns:a="http://schemas.openxmlformats.org/drawingml/2006/main" xmlns:r="http://schemas.openxmlformats.org/officeDocument/2006/relationships" xmlns:p="http://schemas.openxmlformats.org/presentationml/2006/main">
+  <p:cSld>
+    <p:spTree>
+      <p:nvGrpSpPr>
+        <p:cNvPr id="1" name=""/>
+        <p:cNvGrpSpPr/>
+        <p:nvPr/>
+      </p:nvGrpSpPr>
+      <p:grpSpPr>
+        <a:xfrm>
+          <a:off x="0" y="0"/>
+          <a:ext cx="0" cy="0"/>
+          <a:chOff x="0" y="0"/>
+          <a:chExt cx="0" cy="0"/>
+        </a:xfrm>
+      </p:grpSpPr>
+      <p:sp>
+        <p:nvSpPr>
+          <p:cNvPr id="2" name="Title 1"/>
+          <p:cNvSpPr>
+            <a:spLocks noGrp="1"/>
+          </p:cNvSpPr>
+          <p:nvPr>
+            <p:ph type="title"/>
+          </p:nvPr>
+        </p:nvSpPr>
+        <p:spPr/>
+        <p:txBody>
+          <a:bodyPr/>
+          <a:lstStyle/>
+          <a:p>
+            <a:r>
+              <a:rPr lang="en-US" dirty="0" smtClean="0"/>
+              <a:t>Benchmark Results – Scalar C++ vs. Scalar JS</a:t>
+            </a:r>
+            <a:endParaRPr lang="en-US" dirty="0"/>
+          </a:p>
+        </p:txBody>
+      </p:sp>
+      <p:pic>
+        <p:nvPicPr>
+          <p:cNvPr id="7" name="Picture 6"/>
+          <p:cNvPicPr>
+            <a:picLocks noChangeAspect="1"/>
+          </p:cNvPicPr>
+          <p:nvPr/>
+        </p:nvPicPr>
+        <p:blipFill>
+          <a:blip r:embed="rId2">
+            <a:extLst>
+              <a:ext uri="{28A0092B-C50C-407E-A947-70E740481C1C}">
+                <a14:useLocalDpi xmlns:a14="http://schemas.microsoft.com/office/drawing/2010/main" val="0"/>
+              </a:ext>
+            </a:extLst>
+          </a:blip>
+          <a:stretch>
+            <a:fillRect/>
+          </a:stretch>
+        </p:blipFill>
+        <p:spPr>
+          <a:xfrm>
+            <a:off x="607484" y="1002792"/>
+            <a:ext cx="5767915" cy="5644631"/>
+          </a:xfrm>
+          <a:prstGeom prst="rect">
+            <a:avLst/>
+          </a:prstGeom>
+        </p:spPr>
+      </p:pic>
+      <p:sp>
+        <p:nvSpPr>
+          <p:cNvPr id="10" name="TextBox 9"/>
+          <p:cNvSpPr txBox="1"/>
+          <p:nvPr/>
+        </p:nvSpPr>
+        <p:spPr>
+          <a:xfrm>
+            <a:off x="6502531" y="1140030"/>
+            <a:ext cx="4950621" cy="4893647"/>
+          </a:xfrm>
+          <a:prstGeom prst="rect">
+            <a:avLst/>
+          </a:prstGeom>
+          <a:noFill/>
+        </p:spPr>
+        <p:txBody>
+          <a:bodyPr wrap="square" rtlCol="0">
+            <a:spAutoFit/>
+          </a:bodyPr>
+          <a:lstStyle/>
+          <a:p>
+            <a:r>
+              <a:rPr lang="en-US" sz="2400" b="1" u="sng" dirty="0" smtClean="0">
+                <a:solidFill>
+                  <a:schemeClr val="tx2"/>
+                </a:solidFill>
+                <a:cs typeface="Neo Sans Intel"/>
+              </a:rPr>
+              <a:t>Observations:</a:t>
+            </a:r>
+          </a:p>
+          <a:p>
+            <a:pPr marL="342900" indent="-342900">
+              <a:buFont typeface="Arial" panose="020B0604020202020204" pitchFamily="34" charset="0"/>
+              <a:buChar char="•"/>
+            </a:pPr>
+            <a:r>
+              <a:rPr lang="en-US" sz="2400" b="1" dirty="0" smtClean="0">
+                <a:solidFill>
+                  <a:schemeClr val="tx2"/>
+                </a:solidFill>
+                <a:cs typeface="Neo Sans Intel"/>
+              </a:rPr>
+              <a:t>Average JS performance is roughly 60% of native C++</a:t>
+            </a:r>
+            <a:endParaRPr lang="en-US" sz="2400" b="1" dirty="0" smtClean="0">
+              <a:solidFill>
+                <a:schemeClr val="tx2"/>
+              </a:solidFill>
+              <a:cs typeface="Neo Sans Intel"/>
+            </a:endParaRPr>
+          </a:p>
+          <a:p>
+            <a:pPr marL="342900" indent="-342900">
+              <a:buFont typeface="Arial" panose="020B0604020202020204" pitchFamily="34" charset="0"/>
+              <a:buChar char="•"/>
+            </a:pPr>
+            <a:r>
+              <a:rPr lang="en-US" sz="2400" dirty="0" smtClean="0">
+                <a:solidFill>
+                  <a:schemeClr val="tx2"/>
+                </a:solidFill>
+                <a:cs typeface="Neo Sans Intel"/>
+              </a:rPr>
+              <a:t>Handwritten JS code is slightly faster than Emscripten generated JS</a:t>
+            </a:r>
+          </a:p>
+          <a:p>
+            <a:pPr marL="342900" indent="-342900">
+              <a:buFont typeface="Arial" panose="020B0604020202020204" pitchFamily="34" charset="0"/>
+              <a:buChar char="•"/>
+            </a:pPr>
+            <a:r>
+              <a:rPr lang="en-US" sz="2400" dirty="0" err="1" smtClean="0">
+                <a:solidFill>
+                  <a:schemeClr val="tx2"/>
+                </a:solidFill>
+                <a:cs typeface="Neo Sans Intel"/>
+              </a:rPr>
+              <a:t>SpiderMonkey</a:t>
+            </a:r>
+            <a:r>
+              <a:rPr lang="en-US" sz="2400" dirty="0" smtClean="0">
+                <a:solidFill>
+                  <a:schemeClr val="tx2"/>
+                </a:solidFill>
+                <a:cs typeface="Neo Sans Intel"/>
+              </a:rPr>
+              <a:t>/</a:t>
+            </a:r>
+            <a:r>
+              <a:rPr lang="en-US" sz="2400" dirty="0" err="1" smtClean="0">
+                <a:solidFill>
+                  <a:schemeClr val="tx2"/>
+                </a:solidFill>
+                <a:cs typeface="Neo Sans Intel"/>
+              </a:rPr>
+              <a:t>OdinMonkey</a:t>
+            </a:r>
+            <a:r>
+              <a:rPr lang="en-US" sz="2400" dirty="0" smtClean="0">
+                <a:solidFill>
+                  <a:schemeClr val="tx2"/>
+                </a:solidFill>
+                <a:cs typeface="Neo Sans Intel"/>
+              </a:rPr>
+              <a:t> is slightly faster than Chromium on Emscripten generated JS</a:t>
+            </a:r>
+          </a:p>
+          <a:p>
+            <a:pPr marL="342900" indent="-342900">
+              <a:buFont typeface="Arial" panose="020B0604020202020204" pitchFamily="34" charset="0"/>
+              <a:buChar char="•"/>
+            </a:pPr>
+            <a:r>
+              <a:rPr lang="en-US" sz="2400" dirty="0" smtClean="0">
+                <a:solidFill>
+                  <a:schemeClr val="tx2"/>
+                </a:solidFill>
+                <a:cs typeface="Neo Sans Intel"/>
+              </a:rPr>
+              <a:t>Chromium has ‘slow JIT’ overhead that </a:t>
+            </a:r>
+            <a:r>
+              <a:rPr lang="en-US" sz="2400" dirty="0" err="1" smtClean="0">
+                <a:solidFill>
+                  <a:schemeClr val="tx2"/>
+                </a:solidFill>
+                <a:cs typeface="Neo Sans Intel"/>
+              </a:rPr>
+              <a:t>OdinMonkey</a:t>
+            </a:r>
+            <a:r>
+              <a:rPr lang="en-US" sz="2400" dirty="0" smtClean="0">
+                <a:solidFill>
+                  <a:schemeClr val="tx2"/>
+                </a:solidFill>
+                <a:cs typeface="Neo Sans Intel"/>
+              </a:rPr>
+              <a:t> doesn’t</a:t>
+            </a:r>
+          </a:p>
+          <a:p>
+            <a:pPr marL="342900" indent="-342900">
+              <a:buFont typeface="Arial" panose="020B0604020202020204" pitchFamily="34" charset="0"/>
+              <a:buChar char="•"/>
+            </a:pPr>
+            <a:endParaRPr lang="en-US" sz="2400" dirty="0" smtClean="0">
+              <a:solidFill>
+                <a:schemeClr val="tx2"/>
+              </a:solidFill>
+              <a:cs typeface="Neo Sans Intel"/>
+            </a:endParaRPr>
+          </a:p>
+        </p:txBody>
+      </p:sp>
+    </p:spTree>
+    <p:extLst>
+      <p:ext uri="{BB962C8B-B14F-4D97-AF65-F5344CB8AC3E}">
+        <p14:creationId xmlns:p14="http://schemas.microsoft.com/office/powerpoint/2010/main" val="1927586629"/>
+      </p:ext>
+    </p:extLst>
+  </p:cSld>
+  <p:clrMapOvr>
+    <a:masterClrMapping/>
+  </p:clrMapOvr>
+</p:sld>
+</file>
+
+<file path=ppt/slides/slide24.xml><?xml version="1.0" encoding="utf-8"?>
+<p:sld xmlns:a="http://schemas.openxmlformats.org/drawingml/2006/main" xmlns:r="http://schemas.openxmlformats.org/officeDocument/2006/relationships" xmlns:p="http://schemas.openxmlformats.org/presentationml/2006/main">
+  <p:cSld>
+    <p:spTree>
+      <p:nvGrpSpPr>
+        <p:cNvPr id="1" name=""/>
+        <p:cNvGrpSpPr/>
+        <p:nvPr/>
+      </p:nvGrpSpPr>
+      <p:grpSpPr>
+        <a:xfrm>
+          <a:off x="0" y="0"/>
+          <a:ext cx="0" cy="0"/>
+          <a:chOff x="0" y="0"/>
+          <a:chExt cx="0" cy="0"/>
+        </a:xfrm>
+      </p:grpSpPr>
+      <p:sp>
+        <p:nvSpPr>
+          <p:cNvPr id="2" name="Title 1"/>
+          <p:cNvSpPr>
+            <a:spLocks noGrp="1"/>
+          </p:cNvSpPr>
+          <p:nvPr>
+            <p:ph type="title"/>
+          </p:nvPr>
+        </p:nvSpPr>
+        <p:spPr/>
+        <p:txBody>
+          <a:bodyPr/>
+          <a:lstStyle/>
+          <a:p>
+            <a:r>
+              <a:rPr lang="en-US" dirty="0" smtClean="0"/>
+              <a:t>Benchmark Results – SIMD C++ vs. SIMD JS</a:t>
+            </a:r>
+            <a:endParaRPr lang="en-US" dirty="0"/>
+          </a:p>
+        </p:txBody>
+      </p:sp>
+      <p:pic>
+        <p:nvPicPr>
+          <p:cNvPr id="4" name="Picture 3"/>
+          <p:cNvPicPr>
+            <a:picLocks noChangeAspect="1"/>
+          </p:cNvPicPr>
+          <p:nvPr/>
+        </p:nvPicPr>
+        <p:blipFill>
+          <a:blip r:embed="rId2">
+            <a:extLst>
+              <a:ext uri="{28A0092B-C50C-407E-A947-70E740481C1C}">
+                <a14:useLocalDpi xmlns:a14="http://schemas.microsoft.com/office/drawing/2010/main" val="0"/>
+              </a:ext>
+            </a:extLst>
+          </a:blip>
+          <a:stretch>
+            <a:fillRect/>
+          </a:stretch>
+        </p:blipFill>
+        <p:spPr>
+          <a:xfrm>
+            <a:off x="607484" y="1151905"/>
+            <a:ext cx="5627061" cy="5566369"/>
+          </a:xfrm>
+          <a:prstGeom prst="rect">
+            <a:avLst/>
+          </a:prstGeom>
+        </p:spPr>
+      </p:pic>
+      <p:sp>
+        <p:nvSpPr>
+          <p:cNvPr id="5" name="TextBox 4"/>
+          <p:cNvSpPr txBox="1"/>
+          <p:nvPr/>
+        </p:nvSpPr>
+        <p:spPr>
+          <a:xfrm>
+            <a:off x="6502531" y="1140030"/>
+            <a:ext cx="4950621" cy="4524315"/>
+          </a:xfrm>
+          <a:prstGeom prst="rect">
+            <a:avLst/>
+          </a:prstGeom>
+          <a:noFill/>
+        </p:spPr>
+        <p:txBody>
+          <a:bodyPr wrap="square" rtlCol="0">
+            <a:spAutoFit/>
+          </a:bodyPr>
+          <a:lstStyle/>
+          <a:p>
+            <a:r>
+              <a:rPr lang="en-US" sz="2400" b="1" u="sng" dirty="0" smtClean="0">
+                <a:solidFill>
+                  <a:schemeClr val="tx2"/>
+                </a:solidFill>
+                <a:cs typeface="Neo Sans Intel"/>
+              </a:rPr>
+              <a:t>Observations:</a:t>
+            </a:r>
+          </a:p>
+          <a:p>
+            <a:pPr marL="342900" indent="-342900">
+              <a:buFont typeface="Arial" panose="020B0604020202020204" pitchFamily="34" charset="0"/>
+              <a:buChar char="•"/>
+            </a:pPr>
+            <a:r>
+              <a:rPr lang="en-US" sz="2400" dirty="0" smtClean="0">
+                <a:solidFill>
+                  <a:schemeClr val="tx2"/>
+                </a:solidFill>
+                <a:cs typeface="Neo Sans Intel"/>
+              </a:rPr>
+              <a:t>Handwritten JS performance is ~85% of native C++ on Chromium!</a:t>
+            </a:r>
+          </a:p>
+          <a:p>
+            <a:pPr marL="342900" indent="-342900">
+              <a:buFont typeface="Arial" panose="020B0604020202020204" pitchFamily="34" charset="0"/>
+              <a:buChar char="•"/>
+            </a:pPr>
+            <a:r>
+              <a:rPr lang="en-US" sz="2400" dirty="0" smtClean="0">
+                <a:solidFill>
+                  <a:schemeClr val="tx2"/>
+                </a:solidFill>
+                <a:cs typeface="Neo Sans Intel"/>
+              </a:rPr>
+              <a:t>Emscripten generated JS performance is ~60% of native C++ on both Chromium and </a:t>
+            </a:r>
+            <a:r>
+              <a:rPr lang="en-US" sz="2400" dirty="0" err="1" smtClean="0">
+                <a:solidFill>
+                  <a:schemeClr val="tx2"/>
+                </a:solidFill>
+                <a:cs typeface="Neo Sans Intel"/>
+              </a:rPr>
+              <a:t>OdinMonkey</a:t>
+            </a:r>
+            <a:endParaRPr lang="en-US" sz="2400" dirty="0" smtClean="0">
+              <a:solidFill>
+                <a:schemeClr val="tx2"/>
+              </a:solidFill>
+              <a:cs typeface="Neo Sans Intel"/>
+            </a:endParaRPr>
+          </a:p>
+          <a:p>
+            <a:pPr marL="342900" indent="-342900">
+              <a:buFont typeface="Arial" panose="020B0604020202020204" pitchFamily="34" charset="0"/>
+              <a:buChar char="•"/>
+            </a:pPr>
+            <a:r>
+              <a:rPr lang="en-US" sz="2400" dirty="0" smtClean="0">
+                <a:solidFill>
+                  <a:schemeClr val="tx2"/>
+                </a:solidFill>
+                <a:cs typeface="Neo Sans Intel"/>
+              </a:rPr>
+              <a:t>C++/JS performance for SIMD code is roughly the same as it is for Scalar code</a:t>
+            </a:r>
+          </a:p>
+          <a:p>
+            <a:pPr marL="342900" indent="-342900">
+              <a:buFont typeface="Arial" panose="020B0604020202020204" pitchFamily="34" charset="0"/>
+              <a:buChar char="•"/>
+            </a:pPr>
+            <a:endParaRPr lang="en-US" sz="2400" dirty="0" smtClean="0">
+              <a:solidFill>
+                <a:schemeClr val="tx2"/>
+              </a:solidFill>
+              <a:cs typeface="Neo Sans Intel"/>
+            </a:endParaRPr>
+          </a:p>
+        </p:txBody>
+      </p:sp>
+    </p:spTree>
+    <p:extLst>
+      <p:ext uri="{BB962C8B-B14F-4D97-AF65-F5344CB8AC3E}">
+        <p14:creationId xmlns:p14="http://schemas.microsoft.com/office/powerpoint/2010/main" val="2427440855"/>
+      </p:ext>
+    </p:extLst>
+  </p:cSld>
+  <p:clrMapOvr>
+    <a:masterClrMapping/>
+  </p:clrMapOvr>
+</p:sld>
+</file>
+
+<file path=ppt/slides/slide25.xml><?xml version="1.0" encoding="utf-8"?>
+<p:sld xmlns:a="http://schemas.openxmlformats.org/drawingml/2006/main" xmlns:r="http://schemas.openxmlformats.org/officeDocument/2006/relationships" xmlns:p="http://schemas.openxmlformats.org/presentationml/2006/main">
+  <p:cSld>
+    <p:spTree>
+      <p:nvGrpSpPr>
+        <p:cNvPr id="1" name=""/>
+        <p:cNvGrpSpPr/>
+        <p:nvPr/>
+      </p:nvGrpSpPr>
+      <p:grpSpPr>
+        <a:xfrm>
+          <a:off x="0" y="0"/>
+          <a:ext cx="0" cy="0"/>
+          <a:chOff x="0" y="0"/>
+          <a:chExt cx="0" cy="0"/>
+        </a:xfrm>
+      </p:grpSpPr>
+      <p:sp>
+        <p:nvSpPr>
+          <p:cNvPr id="2" name="Title 1"/>
+          <p:cNvSpPr>
+            <a:spLocks noGrp="1"/>
+          </p:cNvSpPr>
+          <p:nvPr>
+            <p:ph type="title"/>
+          </p:nvPr>
+        </p:nvSpPr>
+        <p:spPr/>
+        <p:txBody>
+          <a:bodyPr/>
+          <a:lstStyle/>
+          <a:p>
+            <a:r>
+              <a:rPr lang="en-US" dirty="0" smtClean="0"/>
+              <a:t>Summary</a:t>
+            </a:r>
+            <a:endParaRPr lang="en-US" dirty="0"/>
+          </a:p>
+        </p:txBody>
+      </p:sp>
+      <p:sp>
+        <p:nvSpPr>
+          <p:cNvPr id="3" name="Content Placeholder 2"/>
+          <p:cNvSpPr>
+            <a:spLocks noGrp="1"/>
+          </p:cNvSpPr>
+          <p:nvPr>
+            <p:ph sz="quarter" idx="13"/>
+          </p:nvPr>
+        </p:nvSpPr>
+        <p:spPr/>
+        <p:txBody>
+          <a:bodyPr/>
+          <a:lstStyle/>
+          <a:p>
+            <a:r>
+              <a:rPr lang="en-US" dirty="0" smtClean="0"/>
+              <a:t>SIMD.JS bridges the hardware/software gap for JavaScript programs</a:t>
+            </a:r>
+          </a:p>
+          <a:p>
+            <a:r>
+              <a:rPr lang="en-US" dirty="0" smtClean="0"/>
+              <a:t>SIMD.JS makes ~4x speedup of performance critical code possible</a:t>
+            </a:r>
+          </a:p>
+          <a:p>
+            <a:r>
+              <a:rPr lang="en-US" dirty="0" smtClean="0"/>
+              <a:t>Emscripten now compiles SIMD C++ vector code</a:t>
+            </a:r>
+          </a:p>
+          <a:p>
+            <a:r>
+              <a:rPr lang="en-US" dirty="0" smtClean="0"/>
+              <a:t>The performance gap between native C/C++ code and JavaScript code keeps getting smaller</a:t>
+            </a:r>
+          </a:p>
+          <a:p>
+            <a:r>
+              <a:rPr lang="en-US" dirty="0" smtClean="0"/>
+              <a:t>HTML5/JavaScript is rapidly becoming a viable cross platform</a:t>
+            </a:r>
+            <a:endParaRPr lang="en-US" dirty="0"/>
+          </a:p>
+        </p:txBody>
+      </p:sp>
+      <p:sp>
+        <p:nvSpPr>
+          <p:cNvPr id="4" name="TextBox 3"/>
+          <p:cNvSpPr txBox="1"/>
+          <p:nvPr/>
+        </p:nvSpPr>
+        <p:spPr>
+          <a:xfrm>
+            <a:off x="1089263" y="4987439"/>
+            <a:ext cx="10007124" cy="923330"/>
+          </a:xfrm>
+          <a:prstGeom prst="rect">
+            <a:avLst/>
+          </a:prstGeom>
+          <a:solidFill>
+            <a:srgbClr val="FF0000"/>
+          </a:solidFill>
+          <a:effectLst>
+            <a:reflection blurRad="6350" stA="50000" endA="300" endPos="55000" dir="5400000" sy="-100000" algn="bl" rotWithShape="0"/>
+          </a:effectLst>
+          <a:scene3d>
+            <a:camera prst="orthographicFront"/>
+            <a:lightRig rig="threePt" dir="t"/>
+          </a:scene3d>
+          <a:sp3d>
+            <a:bevelT/>
+          </a:sp3d>
+        </p:spPr>
+        <p:txBody>
+          <a:bodyPr wrap="square" tIns="182880" bIns="182880" rtlCol="0">
+            <a:spAutoFit/>
+          </a:bodyPr>
+          <a:lstStyle/>
+          <a:p>
+            <a:pPr algn="ctr"/>
+            <a:r>
+              <a:rPr lang="en-US" sz="3600" b="1" dirty="0" smtClean="0">
+                <a:solidFill>
+                  <a:schemeClr val="bg1"/>
+                </a:solidFill>
+                <a:cs typeface="Neo Sans Intel"/>
+              </a:rPr>
+              <a:t>THANK YOU </a:t>
+            </a:r>
+            <a:endParaRPr lang="en-US" sz="3600" b="1" dirty="0" smtClean="0">
+              <a:solidFill>
+                <a:schemeClr val="bg1"/>
+              </a:solidFill>
+              <a:cs typeface="Neo Sans Intel"/>
+            </a:endParaRPr>
+          </a:p>
+        </p:txBody>
+      </p:sp>
+    </p:spTree>
+    <p:extLst>
+      <p:ext uri="{BB962C8B-B14F-4D97-AF65-F5344CB8AC3E}">
+        <p14:creationId xmlns:p14="http://schemas.microsoft.com/office/powerpoint/2010/main" val="638239788"/>
+      </p:ext>
+    </p:extLst>
+  </p:cSld>
+  <p:clrMapOvr>
+    <a:masterClrMapping/>
+  </p:clrMapOvr>
+</p:sld>
+</file>
+
+<file path=ppt/slides/slide26.xml><?xml version="1.0" encoding="utf-8"?>
+<p:sld xmlns:a="http://schemas.openxmlformats.org/drawingml/2006/main" xmlns:r="http://schemas.openxmlformats.org/officeDocument/2006/relationships" xmlns:p="http://schemas.openxmlformats.org/presentationml/2006/main">
+  <p:cSld>
+    <p:spTree>
+      <p:nvGrpSpPr>
+        <p:cNvPr id="1" name=""/>
+        <p:cNvGrpSpPr/>
+        <p:nvPr/>
+      </p:nvGrpSpPr>
+      <p:grpSpPr>
+        <a:xfrm>
+          <a:off x="0" y="0"/>
+          <a:ext cx="0" cy="0"/>
+          <a:chOff x="0" y="0"/>
+          <a:chExt cx="0" cy="0"/>
+        </a:xfrm>
+      </p:grpSpPr>
+      <p:sp>
+        <p:nvSpPr>
+          <p:cNvPr id="2" name="Title 1"/>
+          <p:cNvSpPr>
+            <a:spLocks noGrp="1"/>
+          </p:cNvSpPr>
+          <p:nvPr>
+            <p:ph type="title"/>
+          </p:nvPr>
+        </p:nvSpPr>
+        <p:spPr/>
+        <p:txBody>
+          <a:bodyPr/>
+          <a:lstStyle/>
+          <a:p>
+            <a:r>
+              <a:rPr lang="en-US" dirty="0" smtClean="0"/>
+              <a:t>References</a:t>
+            </a:r>
+            <a:endParaRPr lang="en-US" dirty="0"/>
+          </a:p>
+        </p:txBody>
+      </p:sp>
+      <p:sp>
+        <p:nvSpPr>
+          <p:cNvPr id="3" name="Content Placeholder 2"/>
+          <p:cNvSpPr>
+            <a:spLocks noGrp="1"/>
+          </p:cNvSpPr>
+          <p:nvPr>
+            <p:ph sz="quarter" idx="13"/>
+          </p:nvPr>
+        </p:nvSpPr>
+        <p:spPr/>
+        <p:txBody>
+          <a:bodyPr/>
+          <a:lstStyle/>
+          <a:p>
+            <a:r>
+              <a:rPr lang="en-US" dirty="0" smtClean="0"/>
+              <a:t>SIMD.JS </a:t>
+            </a:r>
+            <a:r>
+              <a:rPr lang="en-US" dirty="0" err="1" smtClean="0"/>
+              <a:t>polyfill</a:t>
+            </a:r>
+            <a:r>
+              <a:rPr lang="en-US" dirty="0" smtClean="0"/>
+              <a:t>/spec and handwritten JS benchmarks:</a:t>
+            </a:r>
+          </a:p>
+          <a:p>
+            <a:pPr lvl="1"/>
+            <a:r>
+              <a:rPr lang="en-US" dirty="0">
+                <a:hlinkClick r:id="rId2"/>
+              </a:rPr>
+              <a:t>https://github.com/johnmccutchan/ecmascript_simd</a:t>
+            </a:r>
+            <a:endParaRPr lang="en-US" dirty="0" smtClean="0"/>
+          </a:p>
+          <a:p>
+            <a:r>
+              <a:rPr lang="en-US" dirty="0" smtClean="0"/>
+              <a:t>Emscripten:</a:t>
+            </a:r>
+          </a:p>
+          <a:p>
+            <a:pPr lvl="1"/>
+            <a:r>
+              <a:rPr lang="en-US" dirty="0">
+                <a:hlinkClick r:id="rId3"/>
+              </a:rPr>
+              <a:t>https://</a:t>
+            </a:r>
+            <a:r>
+              <a:rPr lang="en-US" dirty="0" smtClean="0">
+                <a:hlinkClick r:id="rId3"/>
+              </a:rPr>
+              <a:t>github.com/kripken/emscripten/wiki</a:t>
+            </a:r>
+            <a:endParaRPr lang="en-US" dirty="0" smtClean="0"/>
+          </a:p>
+          <a:p>
+            <a:r>
+              <a:rPr lang="en-US" dirty="0" smtClean="0"/>
+              <a:t>C++ benchmarks:</a:t>
+            </a:r>
+          </a:p>
+          <a:p>
+            <a:pPr lvl="1"/>
+            <a:r>
+              <a:rPr lang="en-US" dirty="0">
+                <a:hlinkClick r:id="rId4"/>
+              </a:rPr>
+              <a:t>https://</a:t>
+            </a:r>
+            <a:r>
+              <a:rPr lang="en-US" dirty="0" smtClean="0">
+                <a:hlinkClick r:id="rId4"/>
+              </a:rPr>
+              <a:t>github.com/PeterJensen/benchcpp</a:t>
+            </a:r>
+            <a:endParaRPr lang="en-US" dirty="0" smtClean="0"/>
+          </a:p>
+          <a:p>
+            <a:r>
+              <a:rPr lang="en-US" dirty="0" smtClean="0"/>
+              <a:t>This Presentation:</a:t>
+            </a:r>
+          </a:p>
+          <a:p>
+            <a:pPr lvl="1"/>
+            <a:r>
+              <a:rPr lang="en-US" dirty="0">
+                <a:hlinkClick r:id="rId5"/>
+              </a:rPr>
+              <a:t>https://github.com/PeterJensen/wpmvp2015</a:t>
+            </a:r>
+            <a:endParaRPr lang="en-US" dirty="0"/>
+          </a:p>
+          <a:p>
+            <a:endParaRPr lang="en-US" dirty="0"/>
+          </a:p>
+        </p:txBody>
+      </p:sp>
+    </p:spTree>
+    <p:extLst>
+      <p:ext uri="{BB962C8B-B14F-4D97-AF65-F5344CB8AC3E}">
+        <p14:creationId xmlns:p14="http://schemas.microsoft.com/office/powerpoint/2010/main" val="3178510465"/>
       </p:ext>
     </p:extLst>
   </p:cSld>
@@ -10988,7 +13670,26 @@
               <a:rPr lang="en-US" dirty="0" err="1" smtClean="0"/>
               <a:t>intrinsics</a:t>
             </a:r>
-            <a:endParaRPr lang="en-US" dirty="0"/>
+            <a:endParaRPr lang="en-US" dirty="0" smtClean="0"/>
+          </a:p>
+          <a:p>
+            <a:pPr marL="342900" indent="-342900">
+              <a:buFont typeface="Arial" panose="020B0604020202020204" pitchFamily="34" charset="0"/>
+              <a:buChar char="•"/>
+            </a:pPr>
+            <a:r>
+              <a:rPr lang="en-US" b="1" dirty="0" smtClean="0"/>
+              <a:t>Standardization (TC39) underway for inclusion of SIMD.JS in </a:t>
+            </a:r>
+            <a:r>
+              <a:rPr lang="en-US" b="1" dirty="0" err="1" smtClean="0"/>
+              <a:t>EcmaScript</a:t>
+            </a:r>
+            <a:r>
+              <a:rPr lang="en-US" b="1" dirty="0" smtClean="0"/>
+              <a:t> 7</a:t>
+            </a:r>
+            <a:endParaRPr lang="en-US" b="1" dirty="0"/>
           </a:p>
         </p:txBody>
       </p:sp>

</xml_diff>

<commit_message>
Included suggestions from Ivan
</commit_message>
<xml_diff>
--- a/simdjs-presentation.pptx
+++ b/simdjs-presentation.pptx
@@ -723,7 +723,7 @@
           <a:noFill/>
           <a:extLst>
             <a:ext uri="{909E8E84-426E-40dd-AFC4-6F175D3DCCD1}">
-              <a14:hiddenFill xmlns="" xmlns:a14="http://schemas.microsoft.com/office/drawing/2010/main">
+              <a14:hiddenFill xmlns:a14="http://schemas.microsoft.com/office/drawing/2010/main" xmlns="">
                 <a:solidFill>
                   <a:srgbClr val="FFFFFF"/>
                 </a:solidFill>
@@ -764,7 +764,7 @@
           <a:noFill/>
           <a:extLst>
             <a:ext uri="{909E8E84-426E-40dd-AFC4-6F175D3DCCD1}">
-              <a14:hiddenFill xmlns="" xmlns:a14="http://schemas.microsoft.com/office/drawing/2010/main">
+              <a14:hiddenFill xmlns:a14="http://schemas.microsoft.com/office/drawing/2010/main" xmlns="">
                 <a:solidFill>
                   <a:srgbClr val="FFFFFF"/>
                 </a:solidFill>
@@ -1087,7 +1087,7 @@
           <a:noFill/>
           <a:extLst>
             <a:ext uri="{909E8E84-426E-40dd-AFC4-6F175D3DCCD1}">
-              <a14:hiddenFill xmlns="" xmlns:a14="http://schemas.microsoft.com/office/drawing/2010/main">
+              <a14:hiddenFill xmlns:a14="http://schemas.microsoft.com/office/drawing/2010/main" xmlns="">
                 <a:solidFill>
                   <a:srgbClr val="FFFFFF"/>
                 </a:solidFill>
@@ -1373,7 +1373,7 @@
           <a:noFill/>
           <a:extLst>
             <a:ext uri="{909E8E84-426E-40dd-AFC4-6F175D3DCCD1}">
-              <a14:hiddenFill xmlns="" xmlns:a14="http://schemas.microsoft.com/office/drawing/2010/main">
+              <a14:hiddenFill xmlns:a14="http://schemas.microsoft.com/office/drawing/2010/main" xmlns="">
                 <a:solidFill>
                   <a:srgbClr val="FFFFFF"/>
                 </a:solidFill>
@@ -1982,7 +1982,7 @@
           <a:noFill/>
           <a:extLst>
             <a:ext uri="{909E8E84-426E-40dd-AFC4-6F175D3DCCD1}">
-              <a14:hiddenFill xmlns="" xmlns:a14="http://schemas.microsoft.com/office/drawing/2010/main">
+              <a14:hiddenFill xmlns:a14="http://schemas.microsoft.com/office/drawing/2010/main" xmlns="">
                 <a:solidFill>
                   <a:srgbClr val="FFFFFF"/>
                 </a:solidFill>
@@ -2920,7 +2920,7 @@
           <a:noFill/>
           <a:extLst>
             <a:ext uri="{909E8E84-426E-40dd-AFC4-6F175D3DCCD1}">
-              <a14:hiddenFill xmlns="" xmlns:a14="http://schemas.microsoft.com/office/drawing/2010/main">
+              <a14:hiddenFill xmlns:a14="http://schemas.microsoft.com/office/drawing/2010/main" xmlns="">
                 <a:solidFill>
                   <a:srgbClr val="FFFFFF"/>
                 </a:solidFill>
@@ -5016,7 +5016,7 @@
           <a:noFill/>
           <a:extLst>
             <a:ext uri="{909E8E84-426E-40dd-AFC4-6F175D3DCCD1}">
-              <a14:hiddenFill xmlns="" xmlns:a14="http://schemas.microsoft.com/office/drawing/2010/main">
+              <a14:hiddenFill xmlns:a14="http://schemas.microsoft.com/office/drawing/2010/main" xmlns="">
                 <a:solidFill>
                   <a:srgbClr val="FFFFFF"/>
                 </a:solidFill>
@@ -7810,7 +7810,15 @@
           <a:p>
             <a:r>
               <a:rPr lang="en-US" dirty="0" smtClean="0"/>
-              <a:t>Architecture specific extensions are in the works, for example</a:t>
+              <a:t>Architecture specific extensions are </a:t>
+            </a:r>
+            <a:r>
+              <a:rPr lang="en-US" dirty="0" smtClean="0"/>
+              <a:t>being discussed, </a:t>
+            </a:r>
+            <a:r>
+              <a:rPr lang="en-US" dirty="0" smtClean="0"/>
+              <a:t>for example</a:t>
             </a:r>
           </a:p>
           <a:p>
@@ -13285,7 +13293,19 @@
           <a:p>
             <a:r>
               <a:rPr lang="en-US" dirty="0" smtClean="0"/>
-              <a:t>HTML5/JavaScript is rapidly becoming a viable cross platform</a:t>
+              <a:t>HTML5/JavaScript </a:t>
+            </a:r>
+            <a:r>
+              <a:rPr lang="en-US" dirty="0" smtClean="0"/>
+              <a:t>becomes an increasingly capable</a:t>
+            </a:r>
+            <a:r>
+              <a:rPr lang="en-US" dirty="0" smtClean="0"/>
+              <a:t> </a:t>
+            </a:r>
+            <a:r>
+              <a:rPr lang="en-US" dirty="0" smtClean="0"/>
+              <a:t>cross platform</a:t>
             </a:r>
             <a:endParaRPr lang="en-US" dirty="0"/>
           </a:p>

</xml_diff>